<commit_message>
Add Changes -> Präsi Karsten
</commit_message>
<xml_diff>
--- a/documents/projectmanagement/Praesentationen/Abschlusspräsentation_Karsten.pptx
+++ b/documents/projectmanagement/Praesentationen/Abschlusspräsentation_Karsten.pptx
@@ -5,7 +5,7 @@
     <p:sldMasterId id="2147483648" r:id="rId1"/>
   </p:sldMasterIdLst>
   <p:notesMasterIdLst>
-    <p:notesMasterId r:id="rId18"/>
+    <p:notesMasterId r:id="rId20"/>
   </p:notesMasterIdLst>
   <p:sldIdLst>
     <p:sldId id="256" r:id="rId2"/>
@@ -18,12 +18,14 @@
     <p:sldId id="287" r:id="rId9"/>
     <p:sldId id="304" r:id="rId10"/>
     <p:sldId id="294" r:id="rId11"/>
-    <p:sldId id="295" r:id="rId12"/>
-    <p:sldId id="290" r:id="rId13"/>
-    <p:sldId id="289" r:id="rId14"/>
-    <p:sldId id="291" r:id="rId15"/>
-    <p:sldId id="296" r:id="rId16"/>
-    <p:sldId id="292" r:id="rId17"/>
+    <p:sldId id="305" r:id="rId12"/>
+    <p:sldId id="307" r:id="rId13"/>
+    <p:sldId id="306" r:id="rId14"/>
+    <p:sldId id="295" r:id="rId15"/>
+    <p:sldId id="290" r:id="rId16"/>
+    <p:sldId id="291" r:id="rId17"/>
+    <p:sldId id="296" r:id="rId18"/>
+    <p:sldId id="292" r:id="rId19"/>
   </p:sldIdLst>
   <p:sldSz cx="12192000" cy="6858000"/>
   <p:notesSz cx="6858000" cy="9144000"/>
@@ -8420,13 +8422,6 @@
         </dgm:presLayoutVars>
       </dgm:prSet>
       <dgm:spPr/>
-      <dgm:t>
-        <a:bodyPr/>
-        <a:lstStyle/>
-        <a:p>
-          <a:endParaRPr lang="de-DE"/>
-        </a:p>
-      </dgm:t>
     </dgm:pt>
     <dgm:pt modelId="{E69F6897-FA44-4D33-95A1-02C61B3B37CC}" type="pres">
       <dgm:prSet presAssocID="{41296BC6-2EBB-497E-96C8-769DF938FF6B}" presName="composite" presStyleCnt="0"/>
@@ -8457,13 +8452,6 @@
         </dgm:presLayoutVars>
       </dgm:prSet>
       <dgm:spPr/>
-      <dgm:t>
-        <a:bodyPr/>
-        <a:lstStyle/>
-        <a:p>
-          <a:endParaRPr lang="de-DE"/>
-        </a:p>
-      </dgm:t>
     </dgm:pt>
   </dgm:ptLst>
   <dgm:cxnLst>
@@ -8480,7 +8468,7 @@
   <dgm:whole/>
   <dgm:extLst>
     <a:ext uri="http://schemas.microsoft.com/office/drawing/2008/diagram">
-      <dsp:dataModelExt xmlns:dsp="http://schemas.microsoft.com/office/drawing/2008/diagram" relId="rId7" minVer="http://schemas.openxmlformats.org/drawingml/2006/diagram"/>
+      <dsp:dataModelExt xmlns:dsp="http://schemas.microsoft.com/office/drawing/2008/diagram" relId="rId8" minVer="http://schemas.openxmlformats.org/drawingml/2006/diagram"/>
     </a:ext>
   </dgm:extLst>
 </dgm:dataModel>
@@ -8726,13 +8714,6 @@
     <dgm:pt modelId="{0DEF2705-2132-4518-B146-F8EE3B04A480}" type="pres">
       <dgm:prSet presAssocID="{D284276E-0B24-4B41-A1DC-742B330585DF}" presName="bkgdShape" presStyleLbl="node1" presStyleIdx="0" presStyleCnt="5"/>
       <dgm:spPr/>
-      <dgm:t>
-        <a:bodyPr/>
-        <a:lstStyle/>
-        <a:p>
-          <a:endParaRPr lang="de-DE"/>
-        </a:p>
-      </dgm:t>
     </dgm:pt>
     <dgm:pt modelId="{2B067435-A646-4502-8080-8057C03B06D4}" type="pres">
       <dgm:prSet presAssocID="{D284276E-0B24-4B41-A1DC-742B330585DF}" presName="nodeTx" presStyleLbl="node1" presStyleIdx="0" presStyleCnt="5">
@@ -8741,13 +8722,6 @@
         </dgm:presLayoutVars>
       </dgm:prSet>
       <dgm:spPr/>
-      <dgm:t>
-        <a:bodyPr/>
-        <a:lstStyle/>
-        <a:p>
-          <a:endParaRPr lang="de-DE"/>
-        </a:p>
-      </dgm:t>
     </dgm:pt>
     <dgm:pt modelId="{D8C4D372-6991-47DD-B3D6-1321029A4997}" type="pres">
       <dgm:prSet presAssocID="{D284276E-0B24-4B41-A1DC-742B330585DF}" presName="invisiNode" presStyleLbl="node1" presStyleIdx="0" presStyleCnt="5"/>
@@ -8774,13 +8748,6 @@
     <dgm:pt modelId="{39AB0950-6831-4B26-B0A1-CE18D8FEA0A8}" type="pres">
       <dgm:prSet presAssocID="{B6CD0483-C4A2-41F4-8D5B-83C014C8DB89}" presName="sibTrans" presStyleLbl="sibTrans2D1" presStyleIdx="0" presStyleCnt="0"/>
       <dgm:spPr/>
-      <dgm:t>
-        <a:bodyPr/>
-        <a:lstStyle/>
-        <a:p>
-          <a:endParaRPr lang="de-DE"/>
-        </a:p>
-      </dgm:t>
     </dgm:pt>
     <dgm:pt modelId="{22642FD7-463F-49BE-9ED8-8AB66652CA11}" type="pres">
       <dgm:prSet presAssocID="{F9295A0E-A9F5-40D7-973C-7BEE1C22BF81}" presName="compNode" presStyleCnt="0"/>
@@ -8789,13 +8756,6 @@
     <dgm:pt modelId="{6FE94BFF-A6B8-4895-AD7F-E390B2692CD0}" type="pres">
       <dgm:prSet presAssocID="{F9295A0E-A9F5-40D7-973C-7BEE1C22BF81}" presName="bkgdShape" presStyleLbl="node1" presStyleIdx="1" presStyleCnt="5"/>
       <dgm:spPr/>
-      <dgm:t>
-        <a:bodyPr/>
-        <a:lstStyle/>
-        <a:p>
-          <a:endParaRPr lang="de-DE"/>
-        </a:p>
-      </dgm:t>
     </dgm:pt>
     <dgm:pt modelId="{C90EFC58-6A6B-4E3E-AE2E-BB0E05B45978}" type="pres">
       <dgm:prSet presAssocID="{F9295A0E-A9F5-40D7-973C-7BEE1C22BF81}" presName="nodeTx" presStyleLbl="node1" presStyleIdx="1" presStyleCnt="5">
@@ -8804,13 +8764,6 @@
         </dgm:presLayoutVars>
       </dgm:prSet>
       <dgm:spPr/>
-      <dgm:t>
-        <a:bodyPr/>
-        <a:lstStyle/>
-        <a:p>
-          <a:endParaRPr lang="de-DE"/>
-        </a:p>
-      </dgm:t>
     </dgm:pt>
     <dgm:pt modelId="{86144F4F-1458-456B-814C-0F2C4F831D80}" type="pres">
       <dgm:prSet presAssocID="{F9295A0E-A9F5-40D7-973C-7BEE1C22BF81}" presName="invisiNode" presStyleLbl="node1" presStyleIdx="1" presStyleCnt="5"/>
@@ -8837,13 +8790,6 @@
     <dgm:pt modelId="{7FA1F5FF-9D16-4966-B88A-1237E8A406F3}" type="pres">
       <dgm:prSet presAssocID="{0C83F384-CAEA-41D8-B597-F0BC9C17BEEC}" presName="sibTrans" presStyleLbl="sibTrans2D1" presStyleIdx="0" presStyleCnt="0"/>
       <dgm:spPr/>
-      <dgm:t>
-        <a:bodyPr/>
-        <a:lstStyle/>
-        <a:p>
-          <a:endParaRPr lang="de-DE"/>
-        </a:p>
-      </dgm:t>
     </dgm:pt>
     <dgm:pt modelId="{D9A6ACB2-F7E6-4999-96D7-035E4971A654}" type="pres">
       <dgm:prSet presAssocID="{EED5BED8-5768-416A-8914-19D13A565395}" presName="compNode" presStyleCnt="0"/>
@@ -8852,13 +8798,6 @@
     <dgm:pt modelId="{492193C1-F6A3-46C9-8AD0-3FC16D212958}" type="pres">
       <dgm:prSet presAssocID="{EED5BED8-5768-416A-8914-19D13A565395}" presName="bkgdShape" presStyleLbl="node1" presStyleIdx="2" presStyleCnt="5"/>
       <dgm:spPr/>
-      <dgm:t>
-        <a:bodyPr/>
-        <a:lstStyle/>
-        <a:p>
-          <a:endParaRPr lang="de-DE"/>
-        </a:p>
-      </dgm:t>
     </dgm:pt>
     <dgm:pt modelId="{12600276-960C-409C-9ED8-15D192C55F70}" type="pres">
       <dgm:prSet presAssocID="{EED5BED8-5768-416A-8914-19D13A565395}" presName="nodeTx" presStyleLbl="node1" presStyleIdx="2" presStyleCnt="5">
@@ -8867,13 +8806,6 @@
         </dgm:presLayoutVars>
       </dgm:prSet>
       <dgm:spPr/>
-      <dgm:t>
-        <a:bodyPr/>
-        <a:lstStyle/>
-        <a:p>
-          <a:endParaRPr lang="de-DE"/>
-        </a:p>
-      </dgm:t>
     </dgm:pt>
     <dgm:pt modelId="{122083A7-F62E-457B-B915-2199F9737903}" type="pres">
       <dgm:prSet presAssocID="{EED5BED8-5768-416A-8914-19D13A565395}" presName="invisiNode" presStyleLbl="node1" presStyleIdx="2" presStyleCnt="5"/>
@@ -8900,13 +8832,6 @@
     <dgm:pt modelId="{289B95B0-76B7-4694-B2C3-09CB600879E7}" type="pres">
       <dgm:prSet presAssocID="{CF800B3B-9BB8-4346-BBC4-261EFFC78F95}" presName="sibTrans" presStyleLbl="sibTrans2D1" presStyleIdx="0" presStyleCnt="0"/>
       <dgm:spPr/>
-      <dgm:t>
-        <a:bodyPr/>
-        <a:lstStyle/>
-        <a:p>
-          <a:endParaRPr lang="de-DE"/>
-        </a:p>
-      </dgm:t>
     </dgm:pt>
     <dgm:pt modelId="{644780DD-012C-4D72-BD0E-AAF7FD9B6C67}" type="pres">
       <dgm:prSet presAssocID="{212C4C3F-B2BC-46BD-B7E2-49BF2D3A9CD2}" presName="compNode" presStyleCnt="0"/>
@@ -8915,13 +8840,6 @@
     <dgm:pt modelId="{6C3E15DF-0AB3-4817-9D0B-10294FEB9639}" type="pres">
       <dgm:prSet presAssocID="{212C4C3F-B2BC-46BD-B7E2-49BF2D3A9CD2}" presName="bkgdShape" presStyleLbl="node1" presStyleIdx="3" presStyleCnt="5"/>
       <dgm:spPr/>
-      <dgm:t>
-        <a:bodyPr/>
-        <a:lstStyle/>
-        <a:p>
-          <a:endParaRPr lang="de-DE"/>
-        </a:p>
-      </dgm:t>
     </dgm:pt>
     <dgm:pt modelId="{681AE190-7CE1-437F-9FC3-D34407CAD7DE}" type="pres">
       <dgm:prSet presAssocID="{212C4C3F-B2BC-46BD-B7E2-49BF2D3A9CD2}" presName="nodeTx" presStyleLbl="node1" presStyleIdx="3" presStyleCnt="5">
@@ -8930,13 +8848,6 @@
         </dgm:presLayoutVars>
       </dgm:prSet>
       <dgm:spPr/>
-      <dgm:t>
-        <a:bodyPr/>
-        <a:lstStyle/>
-        <a:p>
-          <a:endParaRPr lang="de-DE"/>
-        </a:p>
-      </dgm:t>
     </dgm:pt>
     <dgm:pt modelId="{A2B5C136-D03B-4E9E-8E7E-2CAD7941BD8A}" type="pres">
       <dgm:prSet presAssocID="{212C4C3F-B2BC-46BD-B7E2-49BF2D3A9CD2}" presName="invisiNode" presStyleLbl="node1" presStyleIdx="3" presStyleCnt="5"/>
@@ -8963,13 +8874,6 @@
     <dgm:pt modelId="{E14E1273-1C4A-4A69-9E99-7A59F329F47C}" type="pres">
       <dgm:prSet presAssocID="{015805E6-8D1E-44B1-9EF3-42E285A8A86F}" presName="sibTrans" presStyleLbl="sibTrans2D1" presStyleIdx="0" presStyleCnt="0"/>
       <dgm:spPr/>
-      <dgm:t>
-        <a:bodyPr/>
-        <a:lstStyle/>
-        <a:p>
-          <a:endParaRPr lang="de-DE"/>
-        </a:p>
-      </dgm:t>
     </dgm:pt>
     <dgm:pt modelId="{EE389596-78F7-48D1-89CB-7F16954A729C}" type="pres">
       <dgm:prSet presAssocID="{9582269A-5383-4875-B584-D1FCA7B3A081}" presName="compNode" presStyleCnt="0"/>
@@ -8978,13 +8882,6 @@
     <dgm:pt modelId="{259A8A00-97D5-4FB9-A1AF-C361C40F5EF9}" type="pres">
       <dgm:prSet presAssocID="{9582269A-5383-4875-B584-D1FCA7B3A081}" presName="bkgdShape" presStyleLbl="node1" presStyleIdx="4" presStyleCnt="5"/>
       <dgm:spPr/>
-      <dgm:t>
-        <a:bodyPr/>
-        <a:lstStyle/>
-        <a:p>
-          <a:endParaRPr lang="de-DE"/>
-        </a:p>
-      </dgm:t>
     </dgm:pt>
     <dgm:pt modelId="{EBADB602-D542-4ECC-AFA1-51F9C27D40A0}" type="pres">
       <dgm:prSet presAssocID="{9582269A-5383-4875-B584-D1FCA7B3A081}" presName="nodeTx" presStyleLbl="node1" presStyleIdx="4" presStyleCnt="5">
@@ -8993,13 +8890,6 @@
         </dgm:presLayoutVars>
       </dgm:prSet>
       <dgm:spPr/>
-      <dgm:t>
-        <a:bodyPr/>
-        <a:lstStyle/>
-        <a:p>
-          <a:endParaRPr lang="de-DE"/>
-        </a:p>
-      </dgm:t>
     </dgm:pt>
     <dgm:pt modelId="{2995DC13-CA99-4483-B607-980094DDFFF1}" type="pres">
       <dgm:prSet presAssocID="{9582269A-5383-4875-B584-D1FCA7B3A081}" presName="invisiNode" presStyleLbl="node1" presStyleIdx="4" presStyleCnt="5"/>
@@ -9339,13 +9229,6 @@
         </dgm:presLayoutVars>
       </dgm:prSet>
       <dgm:spPr/>
-      <dgm:t>
-        <a:bodyPr/>
-        <a:lstStyle/>
-        <a:p>
-          <a:endParaRPr lang="de-DE"/>
-        </a:p>
-      </dgm:t>
     </dgm:pt>
     <dgm:pt modelId="{DA099EED-4F5D-4058-929B-91D547FCECAF}" type="pres">
       <dgm:prSet presAssocID="{815A21B8-640D-4A0A-BC78-F13870CC4C58}" presName="circleA" presStyleLbl="node1" presStyleIdx="0" presStyleCnt="3"/>
@@ -9370,13 +9253,6 @@
         </dgm:presLayoutVars>
       </dgm:prSet>
       <dgm:spPr/>
-      <dgm:t>
-        <a:bodyPr/>
-        <a:lstStyle/>
-        <a:p>
-          <a:endParaRPr lang="de-DE"/>
-        </a:p>
-      </dgm:t>
     </dgm:pt>
     <dgm:pt modelId="{77162A5F-071C-48C6-B77C-972F8D3E479B}" type="pres">
       <dgm:prSet presAssocID="{D7BC0203-36C7-4DE6-8BF5-40F3B353FD4A}" presName="circleB" presStyleLbl="node1" presStyleIdx="1" presStyleCnt="3"/>
@@ -9401,13 +9277,6 @@
         </dgm:presLayoutVars>
       </dgm:prSet>
       <dgm:spPr/>
-      <dgm:t>
-        <a:bodyPr/>
-        <a:lstStyle/>
-        <a:p>
-          <a:endParaRPr lang="de-DE"/>
-        </a:p>
-      </dgm:t>
     </dgm:pt>
     <dgm:pt modelId="{24D016FC-27A0-40B2-81C4-613E6EA1A617}" type="pres">
       <dgm:prSet presAssocID="{D7DC21AD-EF37-4265-A5AF-B48B72C7E8DA}" presName="circleA" presStyleLbl="node1" presStyleIdx="2" presStyleCnt="3"/>
@@ -9521,13 +9390,6 @@
         </dgm:presLayoutVars>
       </dgm:prSet>
       <dgm:spPr/>
-      <dgm:t>
-        <a:bodyPr/>
-        <a:lstStyle/>
-        <a:p>
-          <a:endParaRPr lang="de-DE"/>
-        </a:p>
-      </dgm:t>
     </dgm:pt>
     <dgm:pt modelId="{E69F6897-FA44-4D33-95A1-02C61B3B37CC}" type="pres">
       <dgm:prSet presAssocID="{41296BC6-2EBB-497E-96C8-769DF938FF6B}" presName="composite" presStyleCnt="0"/>
@@ -9558,13 +9420,6 @@
         </dgm:presLayoutVars>
       </dgm:prSet>
       <dgm:spPr/>
-      <dgm:t>
-        <a:bodyPr/>
-        <a:lstStyle/>
-        <a:p>
-          <a:endParaRPr lang="de-DE"/>
-        </a:p>
-      </dgm:t>
     </dgm:pt>
   </dgm:ptLst>
   <dgm:cxnLst>
@@ -9581,7 +9436,7 @@
   <dgm:whole/>
   <dgm:extLst>
     <a:ext uri="http://schemas.microsoft.com/office/drawing/2008/diagram">
-      <dsp:dataModelExt xmlns:dsp="http://schemas.microsoft.com/office/drawing/2008/diagram" relId="rId12" minVer="http://schemas.openxmlformats.org/drawingml/2006/diagram"/>
+      <dsp:dataModelExt xmlns:dsp="http://schemas.microsoft.com/office/drawing/2008/diagram" relId="rId13" minVer="http://schemas.openxmlformats.org/drawingml/2006/diagram"/>
     </a:ext>
   </dgm:extLst>
 </dgm:dataModel>
@@ -9649,13 +9504,6 @@
         </dgm:presLayoutVars>
       </dgm:prSet>
       <dgm:spPr/>
-      <dgm:t>
-        <a:bodyPr/>
-        <a:lstStyle/>
-        <a:p>
-          <a:endParaRPr lang="de-DE"/>
-        </a:p>
-      </dgm:t>
     </dgm:pt>
     <dgm:pt modelId="{E69F6897-FA44-4D33-95A1-02C61B3B37CC}" type="pres">
       <dgm:prSet presAssocID="{41296BC6-2EBB-497E-96C8-769DF938FF6B}" presName="composite" presStyleCnt="0"/>
@@ -9686,13 +9534,6 @@
         </dgm:presLayoutVars>
       </dgm:prSet>
       <dgm:spPr/>
-      <dgm:t>
-        <a:bodyPr/>
-        <a:lstStyle/>
-        <a:p>
-          <a:endParaRPr lang="de-DE"/>
-        </a:p>
-      </dgm:t>
     </dgm:pt>
   </dgm:ptLst>
   <dgm:cxnLst>
@@ -9709,7 +9550,7 @@
   <dgm:whole/>
   <dgm:extLst>
     <a:ext uri="http://schemas.microsoft.com/office/drawing/2008/diagram">
-      <dsp:dataModelExt xmlns:dsp="http://schemas.microsoft.com/office/drawing/2008/diagram" relId="rId17" minVer="http://schemas.openxmlformats.org/drawingml/2006/diagram"/>
+      <dsp:dataModelExt xmlns:dsp="http://schemas.microsoft.com/office/drawing/2008/diagram" relId="rId18" minVer="http://schemas.openxmlformats.org/drawingml/2006/diagram"/>
     </a:ext>
   </dgm:extLst>
 </dgm:dataModel>
@@ -9777,13 +9618,6 @@
         </dgm:presLayoutVars>
       </dgm:prSet>
       <dgm:spPr/>
-      <dgm:t>
-        <a:bodyPr/>
-        <a:lstStyle/>
-        <a:p>
-          <a:endParaRPr lang="de-DE"/>
-        </a:p>
-      </dgm:t>
     </dgm:pt>
     <dgm:pt modelId="{E69F6897-FA44-4D33-95A1-02C61B3B37CC}" type="pres">
       <dgm:prSet presAssocID="{41296BC6-2EBB-497E-96C8-769DF938FF6B}" presName="composite" presStyleCnt="0"/>
@@ -9814,13 +9648,6 @@
         </dgm:presLayoutVars>
       </dgm:prSet>
       <dgm:spPr/>
-      <dgm:t>
-        <a:bodyPr/>
-        <a:lstStyle/>
-        <a:p>
-          <a:endParaRPr lang="de-DE"/>
-        </a:p>
-      </dgm:t>
     </dgm:pt>
   </dgm:ptLst>
   <dgm:cxnLst>
@@ -9837,7 +9664,7 @@
   <dgm:whole/>
   <dgm:extLst>
     <a:ext uri="http://schemas.microsoft.com/office/drawing/2008/diagram">
-      <dsp:dataModelExt xmlns:dsp="http://schemas.microsoft.com/office/drawing/2008/diagram" relId="rId22" minVer="http://schemas.openxmlformats.org/drawingml/2006/diagram"/>
+      <dsp:dataModelExt xmlns:dsp="http://schemas.microsoft.com/office/drawing/2008/diagram" relId="rId23" minVer="http://schemas.openxmlformats.org/drawingml/2006/diagram"/>
     </a:ext>
   </dgm:extLst>
 </dgm:dataModel>
@@ -9905,13 +9732,6 @@
         </dgm:presLayoutVars>
       </dgm:prSet>
       <dgm:spPr/>
-      <dgm:t>
-        <a:bodyPr/>
-        <a:lstStyle/>
-        <a:p>
-          <a:endParaRPr lang="de-DE"/>
-        </a:p>
-      </dgm:t>
     </dgm:pt>
     <dgm:pt modelId="{E69F6897-FA44-4D33-95A1-02C61B3B37CC}" type="pres">
       <dgm:prSet presAssocID="{41296BC6-2EBB-497E-96C8-769DF938FF6B}" presName="composite" presStyleCnt="0"/>
@@ -9942,13 +9762,6 @@
         </dgm:presLayoutVars>
       </dgm:prSet>
       <dgm:spPr/>
-      <dgm:t>
-        <a:bodyPr/>
-        <a:lstStyle/>
-        <a:p>
-          <a:endParaRPr lang="de-DE"/>
-        </a:p>
-      </dgm:t>
     </dgm:pt>
   </dgm:ptLst>
   <dgm:cxnLst>
@@ -9965,7 +9778,7 @@
   <dgm:whole/>
   <dgm:extLst>
     <a:ext uri="http://schemas.microsoft.com/office/drawing/2008/diagram">
-      <dsp:dataModelExt xmlns:dsp="http://schemas.microsoft.com/office/drawing/2008/diagram" relId="rId27" minVer="http://schemas.openxmlformats.org/drawingml/2006/diagram"/>
+      <dsp:dataModelExt xmlns:dsp="http://schemas.microsoft.com/office/drawing/2008/diagram" relId="rId28" minVer="http://schemas.openxmlformats.org/drawingml/2006/diagram"/>
     </a:ext>
   </dgm:extLst>
 </dgm:dataModel>
@@ -9997,10 +9810,9 @@
         <a:lstStyle/>
         <a:p>
           <a:r>
-            <a:rPr lang="de-DE" sz="3300" dirty="0" smtClean="0"/>
+            <a:rPr lang="de-DE" sz="3300" dirty="0"/>
             <a:t>Angepasst</a:t>
           </a:r>
-          <a:endParaRPr lang="de-DE" sz="3300" dirty="0"/>
         </a:p>
       </dgm:t>
     </dgm:pt>
@@ -10034,13 +9846,6 @@
         </dgm:presLayoutVars>
       </dgm:prSet>
       <dgm:spPr/>
-      <dgm:t>
-        <a:bodyPr/>
-        <a:lstStyle/>
-        <a:p>
-          <a:endParaRPr lang="de-DE"/>
-        </a:p>
-      </dgm:t>
     </dgm:pt>
     <dgm:pt modelId="{E69F6897-FA44-4D33-95A1-02C61B3B37CC}" type="pres">
       <dgm:prSet presAssocID="{41296BC6-2EBB-497E-96C8-769DF938FF6B}" presName="composite" presStyleCnt="0"/>
@@ -10071,13 +9876,6 @@
         </dgm:presLayoutVars>
       </dgm:prSet>
       <dgm:spPr/>
-      <dgm:t>
-        <a:bodyPr/>
-        <a:lstStyle/>
-        <a:p>
-          <a:endParaRPr lang="de-DE"/>
-        </a:p>
-      </dgm:t>
     </dgm:pt>
   </dgm:ptLst>
   <dgm:cxnLst>
@@ -10094,7 +9892,7 @@
   <dgm:whole/>
   <dgm:extLst>
     <a:ext uri="http://schemas.microsoft.com/office/drawing/2008/diagram">
-      <dsp:dataModelExt xmlns:dsp="http://schemas.microsoft.com/office/drawing/2008/diagram" relId="rId32" minVer="http://schemas.openxmlformats.org/drawingml/2006/diagram"/>
+      <dsp:dataModelExt xmlns:dsp="http://schemas.microsoft.com/office/drawing/2008/diagram" relId="rId33" minVer="http://schemas.openxmlformats.org/drawingml/2006/diagram"/>
     </a:ext>
   </dgm:extLst>
 </dgm:dataModel>
@@ -10246,13 +10044,6 @@
         </dgm:presLayoutVars>
       </dgm:prSet>
       <dgm:spPr/>
-      <dgm:t>
-        <a:bodyPr/>
-        <a:lstStyle/>
-        <a:p>
-          <a:endParaRPr lang="de-DE"/>
-        </a:p>
-      </dgm:t>
     </dgm:pt>
     <dgm:pt modelId="{E69F6897-FA44-4D33-95A1-02C61B3B37CC}" type="pres">
       <dgm:prSet presAssocID="{41296BC6-2EBB-497E-96C8-769DF938FF6B}" presName="composite" presStyleCnt="0"/>
@@ -10283,13 +10074,6 @@
         </dgm:presLayoutVars>
       </dgm:prSet>
       <dgm:spPr/>
-      <dgm:t>
-        <a:bodyPr/>
-        <a:lstStyle/>
-        <a:p>
-          <a:endParaRPr lang="de-DE"/>
-        </a:p>
-      </dgm:t>
     </dgm:pt>
     <dgm:pt modelId="{E25B1FA2-E17C-42C5-8FAF-3BC9E8DAEA7A}" type="pres">
       <dgm:prSet presAssocID="{73489C6D-C5FA-4460-9736-20B51B764A5C}" presName="spacing" presStyleCnt="0"/>
@@ -10324,13 +10108,6 @@
         </dgm:presLayoutVars>
       </dgm:prSet>
       <dgm:spPr/>
-      <dgm:t>
-        <a:bodyPr/>
-        <a:lstStyle/>
-        <a:p>
-          <a:endParaRPr lang="de-DE"/>
-        </a:p>
-      </dgm:t>
     </dgm:pt>
     <dgm:pt modelId="{E30D30DE-40BD-4C10-983A-674632778F02}" type="pres">
       <dgm:prSet presAssocID="{4D36172C-3601-4628-B433-8657B8238583}" presName="spacing" presStyleCnt="0"/>
@@ -10365,13 +10142,6 @@
         </dgm:presLayoutVars>
       </dgm:prSet>
       <dgm:spPr/>
-      <dgm:t>
-        <a:bodyPr/>
-        <a:lstStyle/>
-        <a:p>
-          <a:endParaRPr lang="de-DE"/>
-        </a:p>
-      </dgm:t>
     </dgm:pt>
   </dgm:ptLst>
   <dgm:cxnLst>
@@ -10506,13 +10276,6 @@
         </dgm:presLayoutVars>
       </dgm:prSet>
       <dgm:spPr/>
-      <dgm:t>
-        <a:bodyPr/>
-        <a:lstStyle/>
-        <a:p>
-          <a:endParaRPr lang="de-DE"/>
-        </a:p>
-      </dgm:t>
     </dgm:pt>
     <dgm:pt modelId="{E69F6897-FA44-4D33-95A1-02C61B3B37CC}" type="pres">
       <dgm:prSet presAssocID="{41296BC6-2EBB-497E-96C8-769DF938FF6B}" presName="composite" presStyleCnt="0"/>
@@ -10543,13 +10306,6 @@
         </dgm:presLayoutVars>
       </dgm:prSet>
       <dgm:spPr/>
-      <dgm:t>
-        <a:bodyPr/>
-        <a:lstStyle/>
-        <a:p>
-          <a:endParaRPr lang="de-DE"/>
-        </a:p>
-      </dgm:t>
     </dgm:pt>
     <dgm:pt modelId="{E25B1FA2-E17C-42C5-8FAF-3BC9E8DAEA7A}" type="pres">
       <dgm:prSet presAssocID="{73489C6D-C5FA-4460-9736-20B51B764A5C}" presName="spacing" presStyleCnt="0"/>
@@ -10584,13 +10340,6 @@
         </dgm:presLayoutVars>
       </dgm:prSet>
       <dgm:spPr/>
-      <dgm:t>
-        <a:bodyPr/>
-        <a:lstStyle/>
-        <a:p>
-          <a:endParaRPr lang="de-DE"/>
-        </a:p>
-      </dgm:t>
     </dgm:pt>
   </dgm:ptLst>
   <dgm:cxnLst>
@@ -10645,10 +10394,9 @@
         <a:lstStyle/>
         <a:p>
           <a:r>
-            <a:rPr lang="de-DE" dirty="0" smtClean="0"/>
-            <a:t>Analyse</a:t>
+            <a:rPr lang="de-DE" dirty="0"/>
+            <a:t>Usability</a:t>
           </a:r>
-          <a:endParaRPr lang="de-DE" dirty="0"/>
         </a:p>
       </dgm:t>
     </dgm:pt>
@@ -10686,14 +10434,13 @@
         <a:lstStyle/>
         <a:p>
           <a:r>
-            <a:rPr lang="de-DE" sz="1600" dirty="0" err="1" smtClean="0"/>
+            <a:rPr lang="de-DE" sz="1600" dirty="0" err="1"/>
             <a:t>Responsive</a:t>
           </a:r>
           <a:r>
-            <a:rPr lang="de-DE" sz="1600" dirty="0" smtClean="0"/>
+            <a:rPr lang="de-DE" sz="1600" dirty="0"/>
             <a:t> Design</a:t>
           </a:r>
-          <a:endParaRPr lang="de-DE" sz="1600" dirty="0"/>
         </a:p>
       </dgm:t>
     </dgm:pt>
@@ -10731,10 +10478,9 @@
         <a:lstStyle/>
         <a:p>
           <a:r>
-            <a:rPr lang="de-DE" dirty="0" smtClean="0"/>
+            <a:rPr lang="de-DE" dirty="0"/>
             <a:t>Flexible Anpassung</a:t>
           </a:r>
-          <a:endParaRPr lang="de-DE" dirty="0"/>
         </a:p>
       </dgm:t>
     </dgm:pt>
@@ -10768,18 +10514,13 @@
         <a:lstStyle/>
         <a:p>
           <a:r>
-            <a:rPr lang="de-DE" dirty="0" smtClean="0">
+            <a:rPr lang="de-DE" dirty="0">
               <a:solidFill>
                 <a:schemeClr val="tx1"/>
               </a:solidFill>
             </a:rPr>
             <a:t>PAMS</a:t>
           </a:r>
-          <a:endParaRPr lang="de-DE" dirty="0">
-            <a:solidFill>
-              <a:schemeClr val="tx1"/>
-            </a:solidFill>
-          </a:endParaRPr>
         </a:p>
       </dgm:t>
     </dgm:pt>
@@ -10849,13 +10590,6 @@
         </dgm:presLayoutVars>
       </dgm:prSet>
       <dgm:spPr/>
-      <dgm:t>
-        <a:bodyPr/>
-        <a:lstStyle/>
-        <a:p>
-          <a:endParaRPr lang="de-DE"/>
-        </a:p>
-      </dgm:t>
     </dgm:pt>
     <dgm:pt modelId="{48627F83-5CD4-4A3E-A578-EF51E842456F}" type="pres">
       <dgm:prSet presAssocID="{145EDB80-7DA2-4750-BA22-979B6E7D8D80}" presName="item3" presStyleLbl="node1" presStyleIdx="2" presStyleCnt="3" custScaleX="117665" custScaleY="117665" custLinFactNeighborX="19451" custLinFactNeighborY="-3890">
@@ -10868,38 +10602,31 @@
     <dgm:pt modelId="{6A0FE239-3E43-42DC-8A6C-5B40328B4FDA}" type="pres">
       <dgm:prSet presAssocID="{716DE4C0-36ED-48BF-9177-CE1A225AB5EB}" presName="funnel" presStyleLbl="trAlignAcc1" presStyleIdx="0" presStyleCnt="1" custScaleX="111075" custScaleY="122324" custLinFactNeighborY="-288"/>
       <dgm:spPr/>
-      <dgm:t>
-        <a:bodyPr/>
-        <a:lstStyle/>
-        <a:p>
-          <a:endParaRPr lang="de-DE"/>
-        </a:p>
-      </dgm:t>
     </dgm:pt>
   </dgm:ptLst>
   <dgm:cxnLst>
+    <dgm:cxn modelId="{66E0546B-82F6-4C31-98B2-463BF8385191}" srcId="{716DE4C0-36ED-48BF-9177-CE1A225AB5EB}" destId="{09EDEBC0-C86F-45B3-B036-D774B9D73600}" srcOrd="1" destOrd="0" parTransId="{694C9327-7606-4272-9E3A-37703691F615}" sibTransId="{A1817934-91F2-4AC6-8D53-82C7251A9115}"/>
+    <dgm:cxn modelId="{D67B52B7-1F44-4780-9320-C384DF5824A6}" type="presOf" srcId="{145EDB80-7DA2-4750-BA22-979B6E7D8D80}" destId="{E78AFB32-4716-47F2-952A-51413CA0FDD0}" srcOrd="0" destOrd="0" presId="urn:microsoft.com/office/officeart/2005/8/layout/funnel1"/>
+    <dgm:cxn modelId="{16D7C8B9-C3F3-4303-A664-6763AAF3200B}" type="presOf" srcId="{9701A48A-21AF-4583-A4C9-CE7AE8EFB7F8}" destId="{FB48EB3C-A6B0-4713-B23F-AA21270918BA}" srcOrd="0" destOrd="0" presId="urn:microsoft.com/office/officeart/2005/8/layout/funnel1"/>
+    <dgm:cxn modelId="{D1CE1428-F2D3-4960-B9D1-61908A1027EF}" srcId="{716DE4C0-36ED-48BF-9177-CE1A225AB5EB}" destId="{42BAD6EC-9A39-4496-BFB0-BC95750D1363}" srcOrd="0" destOrd="0" parTransId="{81F97FB2-4CA9-4727-B59D-866099AF7B6C}" sibTransId="{6AF545E4-7046-42B8-8F76-E1B5EED48CF0}"/>
+    <dgm:cxn modelId="{413AFB3E-57D7-445B-AA0A-C21133D8C5A3}" srcId="{716DE4C0-36ED-48BF-9177-CE1A225AB5EB}" destId="{9701A48A-21AF-4583-A4C9-CE7AE8EFB7F8}" srcOrd="2" destOrd="0" parTransId="{969091E6-9F6B-40A7-9F6C-757C992E38CE}" sibTransId="{BAEDE4C1-DD0E-420E-A36E-47977BB67708}"/>
     <dgm:cxn modelId="{A41DAC79-7DCF-4E96-9709-D90ACC874DD1}" srcId="{716DE4C0-36ED-48BF-9177-CE1A225AB5EB}" destId="{145EDB80-7DA2-4750-BA22-979B6E7D8D80}" srcOrd="3" destOrd="0" parTransId="{6A3090B2-6F60-4F30-AB90-770F7E527715}" sibTransId="{F31F062A-B3C1-4B62-B21A-779B77736BE8}"/>
-    <dgm:cxn modelId="{413AFB3E-57D7-445B-AA0A-C21133D8C5A3}" srcId="{716DE4C0-36ED-48BF-9177-CE1A225AB5EB}" destId="{9701A48A-21AF-4583-A4C9-CE7AE8EFB7F8}" srcOrd="2" destOrd="0" parTransId="{969091E6-9F6B-40A7-9F6C-757C992E38CE}" sibTransId="{BAEDE4C1-DD0E-420E-A36E-47977BB67708}"/>
+    <dgm:cxn modelId="{9A464E91-7D06-4163-90B5-AB48DE868EDC}" type="presOf" srcId="{42BAD6EC-9A39-4496-BFB0-BC95750D1363}" destId="{48627F83-5CD4-4A3E-A578-EF51E842456F}" srcOrd="0" destOrd="0" presId="urn:microsoft.com/office/officeart/2005/8/layout/funnel1"/>
+    <dgm:cxn modelId="{8ADFA2DA-7CD5-4F65-A827-EDE1BE8E94D1}" type="presOf" srcId="{716DE4C0-36ED-48BF-9177-CE1A225AB5EB}" destId="{BCD23E71-2207-412F-B605-BBE849ADC69B}" srcOrd="0" destOrd="0" presId="urn:microsoft.com/office/officeart/2005/8/layout/funnel1"/>
     <dgm:cxn modelId="{A24D968A-5056-48B6-9C1B-8C23C10728A8}" type="presOf" srcId="{09EDEBC0-C86F-45B3-B036-D774B9D73600}" destId="{637E9EA4-BE55-4A56-999F-C6DD8073753E}" srcOrd="0" destOrd="0" presId="urn:microsoft.com/office/officeart/2005/8/layout/funnel1"/>
-    <dgm:cxn modelId="{D1CE1428-F2D3-4960-B9D1-61908A1027EF}" srcId="{716DE4C0-36ED-48BF-9177-CE1A225AB5EB}" destId="{42BAD6EC-9A39-4496-BFB0-BC95750D1363}" srcOrd="0" destOrd="0" parTransId="{81F97FB2-4CA9-4727-B59D-866099AF7B6C}" sibTransId="{6AF545E4-7046-42B8-8F76-E1B5EED48CF0}"/>
-    <dgm:cxn modelId="{66E0546B-82F6-4C31-98B2-463BF8385191}" srcId="{716DE4C0-36ED-48BF-9177-CE1A225AB5EB}" destId="{09EDEBC0-C86F-45B3-B036-D774B9D73600}" srcOrd="1" destOrd="0" parTransId="{694C9327-7606-4272-9E3A-37703691F615}" sibTransId="{A1817934-91F2-4AC6-8D53-82C7251A9115}"/>
-    <dgm:cxn modelId="{57DB5E1D-500C-4D80-9284-BBC0396FD5FA}" type="presOf" srcId="{145EDB80-7DA2-4750-BA22-979B6E7D8D80}" destId="{E78AFB32-4716-47F2-952A-51413CA0FDD0}" srcOrd="0" destOrd="0" presId="urn:microsoft.com/office/officeart/2005/8/layout/funnel1"/>
-    <dgm:cxn modelId="{8ADFA2DA-7CD5-4F65-A827-EDE1BE8E94D1}" type="presOf" srcId="{716DE4C0-36ED-48BF-9177-CE1A225AB5EB}" destId="{BCD23E71-2207-412F-B605-BBE849ADC69B}" srcOrd="0" destOrd="0" presId="urn:microsoft.com/office/officeart/2005/8/layout/funnel1"/>
-    <dgm:cxn modelId="{B249DC12-F9B4-45F9-8EF8-CC54D4E2F5EA}" type="presOf" srcId="{42BAD6EC-9A39-4496-BFB0-BC95750D1363}" destId="{48627F83-5CD4-4A3E-A578-EF51E842456F}" srcOrd="0" destOrd="0" presId="urn:microsoft.com/office/officeart/2005/8/layout/funnel1"/>
-    <dgm:cxn modelId="{16D7C8B9-C3F3-4303-A664-6763AAF3200B}" type="presOf" srcId="{9701A48A-21AF-4583-A4C9-CE7AE8EFB7F8}" destId="{FB48EB3C-A6B0-4713-B23F-AA21270918BA}" srcOrd="0" destOrd="0" presId="urn:microsoft.com/office/officeart/2005/8/layout/funnel1"/>
     <dgm:cxn modelId="{ADAEDB10-F098-4688-8E69-573E3BEA5372}" type="presParOf" srcId="{BCD23E71-2207-412F-B605-BBE849ADC69B}" destId="{40C13C18-9F6E-4C35-AF01-26055ECF05BC}" srcOrd="0" destOrd="0" presId="urn:microsoft.com/office/officeart/2005/8/layout/funnel1"/>
     <dgm:cxn modelId="{311A49F5-3A49-4B0F-BCDD-F9BF00BCD55F}" type="presParOf" srcId="{BCD23E71-2207-412F-B605-BBE849ADC69B}" destId="{79E6F908-FEEA-4FCD-ADEB-097953564440}" srcOrd="1" destOrd="0" presId="urn:microsoft.com/office/officeart/2005/8/layout/funnel1"/>
     <dgm:cxn modelId="{2694D426-E225-4CB5-A7B3-B72BE8C8088F}" type="presParOf" srcId="{BCD23E71-2207-412F-B605-BBE849ADC69B}" destId="{E78AFB32-4716-47F2-952A-51413CA0FDD0}" srcOrd="2" destOrd="0" presId="urn:microsoft.com/office/officeart/2005/8/layout/funnel1"/>
     <dgm:cxn modelId="{4C5C33F4-FF5E-465F-837C-977B1606D7D1}" type="presParOf" srcId="{BCD23E71-2207-412F-B605-BBE849ADC69B}" destId="{FB48EB3C-A6B0-4713-B23F-AA21270918BA}" srcOrd="3" destOrd="0" presId="urn:microsoft.com/office/officeart/2005/8/layout/funnel1"/>
     <dgm:cxn modelId="{B49E2BE1-9857-48B4-8608-FFE6D943C05C}" type="presParOf" srcId="{BCD23E71-2207-412F-B605-BBE849ADC69B}" destId="{637E9EA4-BE55-4A56-999F-C6DD8073753E}" srcOrd="4" destOrd="0" presId="urn:microsoft.com/office/officeart/2005/8/layout/funnel1"/>
-    <dgm:cxn modelId="{4321EFE6-6361-4B09-B4D3-D91A18FBAC32}" type="presParOf" srcId="{BCD23E71-2207-412F-B605-BBE849ADC69B}" destId="{48627F83-5CD4-4A3E-A578-EF51E842456F}" srcOrd="5" destOrd="0" presId="urn:microsoft.com/office/officeart/2005/8/layout/funnel1"/>
+    <dgm:cxn modelId="{E4B65D92-D6E3-4FA1-87F2-0167B8B41174}" type="presParOf" srcId="{BCD23E71-2207-412F-B605-BBE849ADC69B}" destId="{48627F83-5CD4-4A3E-A578-EF51E842456F}" srcOrd="5" destOrd="0" presId="urn:microsoft.com/office/officeart/2005/8/layout/funnel1"/>
     <dgm:cxn modelId="{1687D22E-616E-4990-AE2E-EF076D4BDF85}" type="presParOf" srcId="{BCD23E71-2207-412F-B605-BBE849ADC69B}" destId="{6A0FE239-3E43-42DC-8A6C-5B40328B4FDA}" srcOrd="6" destOrd="0" presId="urn:microsoft.com/office/officeart/2005/8/layout/funnel1"/>
   </dgm:cxnLst>
   <dgm:bg/>
   <dgm:whole/>
   <dgm:extLst>
     <a:ext uri="http://schemas.microsoft.com/office/drawing/2008/diagram">
-      <dsp:dataModelExt xmlns:dsp="http://schemas.microsoft.com/office/drawing/2008/diagram" relId="rId6" minVer="http://schemas.openxmlformats.org/drawingml/2006/diagram"/>
+      <dsp:dataModelExt xmlns:dsp="http://schemas.microsoft.com/office/drawing/2008/diagram" relId="rId7" minVer="http://schemas.openxmlformats.org/drawingml/2006/diagram"/>
     </a:ext>
   </dgm:extLst>
 </dgm:dataModel>
@@ -10963,7 +10690,7 @@
         </a:bodyPr>
         <a:lstStyle/>
         <a:p>
-          <a:pPr lvl="0" algn="ctr" defTabSz="1466850">
+          <a:pPr marL="0" lvl="0" indent="0" algn="ctr" defTabSz="1466850">
             <a:lnSpc>
               <a:spcPct val="90000"/>
             </a:lnSpc>
@@ -10973,6 +10700,7 @@
             <a:spcAft>
               <a:spcPct val="35000"/>
             </a:spcAft>
+            <a:buNone/>
           </a:pPr>
           <a:r>
             <a:rPr lang="de-DE" sz="3300" kern="1200" dirty="0"/>
@@ -11102,7 +10830,7 @@
         </a:bodyPr>
         <a:lstStyle/>
         <a:p>
-          <a:pPr lvl="0" algn="ctr" defTabSz="800100">
+          <a:pPr marL="0" lvl="0" indent="0" algn="ctr" defTabSz="800100">
             <a:lnSpc>
               <a:spcPct val="90000"/>
             </a:lnSpc>
@@ -11112,6 +10840,7 @@
             <a:spcAft>
               <a:spcPct val="35000"/>
             </a:spcAft>
+            <a:buNone/>
           </a:pPr>
           <a:r>
             <a:rPr lang="de-DE" sz="1800" kern="1200" dirty="0"/>
@@ -11229,7 +10958,7 @@
         </a:bodyPr>
         <a:lstStyle/>
         <a:p>
-          <a:pPr lvl="0" algn="ctr" defTabSz="800100">
+          <a:pPr marL="0" lvl="0" indent="0" algn="ctr" defTabSz="800100">
             <a:lnSpc>
               <a:spcPct val="90000"/>
             </a:lnSpc>
@@ -11239,6 +10968,7 @@
             <a:spcAft>
               <a:spcPct val="35000"/>
             </a:spcAft>
+            <a:buNone/>
           </a:pPr>
           <a:r>
             <a:rPr lang="de-DE" sz="1800" kern="1200" dirty="0"/>
@@ -11356,7 +11086,7 @@
         </a:bodyPr>
         <a:lstStyle/>
         <a:p>
-          <a:pPr lvl="0" algn="ctr" defTabSz="800100">
+          <a:pPr marL="0" lvl="0" indent="0" algn="ctr" defTabSz="800100">
             <a:lnSpc>
               <a:spcPct val="90000"/>
             </a:lnSpc>
@@ -11366,6 +11096,7 @@
             <a:spcAft>
               <a:spcPct val="35000"/>
             </a:spcAft>
+            <a:buNone/>
           </a:pPr>
           <a:r>
             <a:rPr lang="de-DE" sz="1800" kern="1200" dirty="0"/>
@@ -11483,7 +11214,7 @@
         </a:bodyPr>
         <a:lstStyle/>
         <a:p>
-          <a:pPr lvl="0" algn="ctr" defTabSz="800100">
+          <a:pPr marL="0" lvl="0" indent="0" algn="ctr" defTabSz="800100">
             <a:lnSpc>
               <a:spcPct val="90000"/>
             </a:lnSpc>
@@ -11493,6 +11224,7 @@
             <a:spcAft>
               <a:spcPct val="35000"/>
             </a:spcAft>
+            <a:buNone/>
           </a:pPr>
           <a:r>
             <a:rPr lang="de-DE" sz="1800" kern="1200" dirty="0"/>
@@ -11610,7 +11342,7 @@
         </a:bodyPr>
         <a:lstStyle/>
         <a:p>
-          <a:pPr lvl="0" algn="ctr" defTabSz="800100">
+          <a:pPr marL="0" lvl="0" indent="0" algn="ctr" defTabSz="800100">
             <a:lnSpc>
               <a:spcPct val="90000"/>
             </a:lnSpc>
@@ -11620,6 +11352,7 @@
             <a:spcAft>
               <a:spcPct val="35000"/>
             </a:spcAft>
+            <a:buNone/>
           </a:pPr>
           <a:r>
             <a:rPr lang="de-DE" sz="1800" kern="1200" dirty="0"/>
@@ -11806,7 +11539,7 @@
         </a:bodyPr>
         <a:lstStyle/>
         <a:p>
-          <a:pPr lvl="0" algn="l" defTabSz="1155700">
+          <a:pPr marL="0" lvl="0" indent="0" algn="l" defTabSz="1155700">
             <a:lnSpc>
               <a:spcPct val="90000"/>
             </a:lnSpc>
@@ -11816,6 +11549,7 @@
             <a:spcAft>
               <a:spcPct val="35000"/>
             </a:spcAft>
+            <a:buNone/>
           </a:pPr>
           <a:r>
             <a:rPr lang="de-DE" sz="2600" kern="1200" dirty="0"/>
@@ -11833,7 +11567,7 @@
             <a:spcAft>
               <a:spcPct val="15000"/>
             </a:spcAft>
-            <a:buChar char="••"/>
+            <a:buChar char="•"/>
           </a:pPr>
           <a:r>
             <a:rPr lang="de-DE" sz="2000" kern="1200" dirty="0"/>
@@ -11933,7 +11667,7 @@
         </a:bodyPr>
         <a:lstStyle/>
         <a:p>
-          <a:pPr lvl="0" algn="l" defTabSz="1155700">
+          <a:pPr marL="0" lvl="0" indent="0" algn="l" defTabSz="1155700">
             <a:lnSpc>
               <a:spcPct val="90000"/>
             </a:lnSpc>
@@ -11943,6 +11677,7 @@
             <a:spcAft>
               <a:spcPct val="35000"/>
             </a:spcAft>
+            <a:buNone/>
           </a:pPr>
           <a:r>
             <a:rPr lang="de-DE" sz="2600" kern="1200" dirty="0"/>
@@ -11960,7 +11695,7 @@
             <a:spcAft>
               <a:spcPct val="15000"/>
             </a:spcAft>
-            <a:buChar char="••"/>
+            <a:buChar char="•"/>
           </a:pPr>
           <a:r>
             <a:rPr lang="de-DE" sz="2000" kern="1200" dirty="0"/>
@@ -12060,7 +11795,7 @@
         </a:bodyPr>
         <a:lstStyle/>
         <a:p>
-          <a:pPr lvl="0" algn="l" defTabSz="1155700">
+          <a:pPr marL="0" lvl="0" indent="0" algn="l" defTabSz="1155700">
             <a:lnSpc>
               <a:spcPct val="90000"/>
             </a:lnSpc>
@@ -12070,6 +11805,7 @@
             <a:spcAft>
               <a:spcPct val="35000"/>
             </a:spcAft>
+            <a:buNone/>
           </a:pPr>
           <a:r>
             <a:rPr lang="de-DE" sz="2600" kern="1200" dirty="0"/>
@@ -12087,7 +11823,7 @@
             <a:spcAft>
               <a:spcPct val="15000"/>
             </a:spcAft>
-            <a:buChar char="••"/>
+            <a:buChar char="•"/>
           </a:pPr>
           <a:endParaRPr lang="de-DE" sz="2000" kern="1200" dirty="0"/>
         </a:p>
@@ -12209,7 +11945,7 @@
         </a:bodyPr>
         <a:lstStyle/>
         <a:p>
-          <a:pPr lvl="0" algn="ctr" defTabSz="1466850">
+          <a:pPr marL="0" lvl="0" indent="0" algn="ctr" defTabSz="1466850">
             <a:lnSpc>
               <a:spcPct val="90000"/>
             </a:lnSpc>
@@ -12219,6 +11955,7 @@
             <a:spcAft>
               <a:spcPct val="35000"/>
             </a:spcAft>
+            <a:buNone/>
           </a:pPr>
           <a:r>
             <a:rPr lang="de-DE" sz="3300" kern="1200" dirty="0"/>
@@ -12346,7 +12083,7 @@
         </a:bodyPr>
         <a:lstStyle/>
         <a:p>
-          <a:pPr lvl="0" algn="ctr" defTabSz="1466850">
+          <a:pPr marL="0" lvl="0" indent="0" algn="ctr" defTabSz="1466850">
             <a:lnSpc>
               <a:spcPct val="90000"/>
             </a:lnSpc>
@@ -12356,6 +12093,7 @@
             <a:spcAft>
               <a:spcPct val="35000"/>
             </a:spcAft>
+            <a:buNone/>
           </a:pPr>
           <a:r>
             <a:rPr lang="de-DE" sz="3300" kern="1200" dirty="0"/>
@@ -12483,7 +12221,7 @@
         </a:bodyPr>
         <a:lstStyle/>
         <a:p>
-          <a:pPr lvl="0" algn="ctr" defTabSz="1466850">
+          <a:pPr marL="0" lvl="0" indent="0" algn="ctr" defTabSz="1466850">
             <a:lnSpc>
               <a:spcPct val="90000"/>
             </a:lnSpc>
@@ -12493,6 +12231,7 @@
             <a:spcAft>
               <a:spcPct val="35000"/>
             </a:spcAft>
+            <a:buNone/>
           </a:pPr>
           <a:r>
             <a:rPr lang="de-DE" sz="3300" kern="1200" dirty="0"/>
@@ -12620,7 +12359,7 @@
         </a:bodyPr>
         <a:lstStyle/>
         <a:p>
-          <a:pPr lvl="0" algn="ctr" defTabSz="1466850">
+          <a:pPr marL="0" lvl="0" indent="0" algn="ctr" defTabSz="1466850">
             <a:lnSpc>
               <a:spcPct val="90000"/>
             </a:lnSpc>
@@ -12630,6 +12369,7 @@
             <a:spcAft>
               <a:spcPct val="35000"/>
             </a:spcAft>
+            <a:buNone/>
           </a:pPr>
           <a:r>
             <a:rPr lang="de-DE" sz="3300" kern="1200" dirty="0"/>
@@ -12757,7 +12497,7 @@
         </a:bodyPr>
         <a:lstStyle/>
         <a:p>
-          <a:pPr lvl="0" algn="ctr" defTabSz="1466850">
+          <a:pPr marL="0" lvl="0" indent="0" algn="ctr" defTabSz="1466850">
             <a:lnSpc>
               <a:spcPct val="90000"/>
             </a:lnSpc>
@@ -12767,12 +12507,12 @@
             <a:spcAft>
               <a:spcPct val="35000"/>
             </a:spcAft>
+            <a:buNone/>
           </a:pPr>
           <a:r>
-            <a:rPr lang="de-DE" sz="3300" kern="1200" dirty="0" smtClean="0"/>
+            <a:rPr lang="de-DE" sz="3300" kern="1200" dirty="0"/>
             <a:t>Angepasst</a:t>
           </a:r>
-          <a:endParaRPr lang="de-DE" sz="3300" kern="1200" dirty="0"/>
         </a:p>
       </dsp:txBody>
       <dsp:txXfrm rot="10800000">
@@ -12895,7 +12635,7 @@
         </a:bodyPr>
         <a:lstStyle/>
         <a:p>
-          <a:pPr lvl="0" algn="ctr" defTabSz="1466850">
+          <a:pPr marL="0" lvl="0" indent="0" algn="ctr" defTabSz="1466850">
             <a:lnSpc>
               <a:spcPct val="90000"/>
             </a:lnSpc>
@@ -12905,6 +12645,7 @@
             <a:spcAft>
               <a:spcPct val="35000"/>
             </a:spcAft>
+            <a:buNone/>
           </a:pPr>
           <a:r>
             <a:rPr lang="de-DE" sz="3300" kern="1200" dirty="0"/>
@@ -13020,7 +12761,7 @@
         </a:bodyPr>
         <a:lstStyle/>
         <a:p>
-          <a:pPr lvl="0" algn="ctr" defTabSz="1466850">
+          <a:pPr marL="0" lvl="0" indent="0" algn="ctr" defTabSz="1466850">
             <a:lnSpc>
               <a:spcPct val="90000"/>
             </a:lnSpc>
@@ -13030,6 +12771,7 @@
             <a:spcAft>
               <a:spcPct val="35000"/>
             </a:spcAft>
+            <a:buNone/>
           </a:pPr>
           <a:r>
             <a:rPr lang="de-DE" sz="3300" kern="1200" dirty="0"/>
@@ -13145,7 +12887,7 @@
         </a:bodyPr>
         <a:lstStyle/>
         <a:p>
-          <a:pPr lvl="0" algn="ctr" defTabSz="1466850">
+          <a:pPr marL="0" lvl="0" indent="0" algn="ctr" defTabSz="1466850">
             <a:lnSpc>
               <a:spcPct val="90000"/>
             </a:lnSpc>
@@ -13155,6 +12897,7 @@
             <a:spcAft>
               <a:spcPct val="35000"/>
             </a:spcAft>
+            <a:buNone/>
           </a:pPr>
           <a:r>
             <a:rPr lang="de-DE" sz="3300" kern="1200" dirty="0" err="1"/>
@@ -13286,7 +13029,7 @@
         </a:bodyPr>
         <a:lstStyle/>
         <a:p>
-          <a:pPr lvl="0" algn="ctr" defTabSz="1466850">
+          <a:pPr marL="0" lvl="0" indent="0" algn="ctr" defTabSz="1466850">
             <a:lnSpc>
               <a:spcPct val="90000"/>
             </a:lnSpc>
@@ -13296,6 +13039,7 @@
             <a:spcAft>
               <a:spcPct val="35000"/>
             </a:spcAft>
+            <a:buNone/>
           </a:pPr>
           <a:r>
             <a:rPr lang="de-DE" sz="3300" kern="1200" dirty="0"/>
@@ -13411,7 +13155,7 @@
         </a:bodyPr>
         <a:lstStyle/>
         <a:p>
-          <a:pPr lvl="0" algn="ctr" defTabSz="1466850">
+          <a:pPr marL="0" lvl="0" indent="0" algn="ctr" defTabSz="1466850">
             <a:lnSpc>
               <a:spcPct val="90000"/>
             </a:lnSpc>
@@ -13421,6 +13165,7 @@
             <a:spcAft>
               <a:spcPct val="35000"/>
             </a:spcAft>
+            <a:buNone/>
           </a:pPr>
           <a:r>
             <a:rPr lang="de-DE" sz="3300" kern="1200" dirty="0"/>
@@ -13619,7 +13364,7 @@
         </a:bodyPr>
         <a:lstStyle/>
         <a:p>
-          <a:pPr lvl="0" algn="ctr" defTabSz="1377950">
+          <a:pPr marL="0" lvl="0" indent="0" algn="ctr" defTabSz="1377950">
             <a:lnSpc>
               <a:spcPct val="90000"/>
             </a:lnSpc>
@@ -13629,20 +13374,16 @@
             <a:spcAft>
               <a:spcPct val="35000"/>
             </a:spcAft>
+            <a:buNone/>
           </a:pPr>
           <a:r>
-            <a:rPr lang="de-DE" sz="3100" kern="1200" dirty="0" smtClean="0">
+            <a:rPr lang="de-DE" sz="3100" kern="1200" dirty="0">
               <a:solidFill>
                 <a:schemeClr val="tx1"/>
               </a:solidFill>
             </a:rPr>
             <a:t>PAMS</a:t>
           </a:r>
-          <a:endParaRPr lang="de-DE" sz="3100" kern="1200" dirty="0">
-            <a:solidFill>
-              <a:schemeClr val="tx1"/>
-            </a:solidFill>
-          </a:endParaRPr>
         </a:p>
       </dsp:txBody>
       <dsp:txXfrm>
@@ -13700,7 +13441,7 @@
         </a:bodyPr>
         <a:lstStyle/>
         <a:p>
-          <a:pPr lvl="0" algn="ctr" defTabSz="755650">
+          <a:pPr marL="0" lvl="0" indent="0" algn="ctr" defTabSz="755650">
             <a:lnSpc>
               <a:spcPct val="90000"/>
             </a:lnSpc>
@@ -13710,12 +13451,12 @@
             <a:spcAft>
               <a:spcPct val="35000"/>
             </a:spcAft>
+            <a:buNone/>
           </a:pPr>
           <a:r>
-            <a:rPr lang="de-DE" sz="1700" kern="1200" dirty="0" smtClean="0"/>
+            <a:rPr lang="de-DE" sz="1700" kern="1200" dirty="0"/>
             <a:t>Flexible Anpassung</a:t>
           </a:r>
-          <a:endParaRPr lang="de-DE" sz="1700" kern="1200" dirty="0"/>
         </a:p>
       </dsp:txBody>
       <dsp:txXfrm>
@@ -13773,7 +13514,7 @@
         </a:bodyPr>
         <a:lstStyle/>
         <a:p>
-          <a:pPr lvl="0" algn="ctr" defTabSz="711200">
+          <a:pPr marL="0" lvl="0" indent="0" algn="ctr" defTabSz="711200">
             <a:lnSpc>
               <a:spcPct val="90000"/>
             </a:lnSpc>
@@ -13783,16 +13524,16 @@
             <a:spcAft>
               <a:spcPct val="35000"/>
             </a:spcAft>
+            <a:buNone/>
           </a:pPr>
           <a:r>
-            <a:rPr lang="de-DE" sz="1600" kern="1200" dirty="0" err="1" smtClean="0"/>
+            <a:rPr lang="de-DE" sz="1600" kern="1200" dirty="0" err="1"/>
             <a:t>Responsive</a:t>
           </a:r>
           <a:r>
-            <a:rPr lang="de-DE" sz="1600" kern="1200" dirty="0" smtClean="0"/>
+            <a:rPr lang="de-DE" sz="1600" kern="1200" dirty="0"/>
             <a:t> Design</a:t>
           </a:r>
-          <a:endParaRPr lang="de-DE" sz="1600" kern="1200" dirty="0"/>
         </a:p>
       </dsp:txBody>
       <dsp:txXfrm>
@@ -13850,7 +13591,7 @@
         </a:bodyPr>
         <a:lstStyle/>
         <a:p>
-          <a:pPr lvl="0" algn="ctr" defTabSz="755650">
+          <a:pPr marL="0" lvl="0" indent="0" algn="ctr" defTabSz="755650">
             <a:lnSpc>
               <a:spcPct val="90000"/>
             </a:lnSpc>
@@ -13860,12 +13601,12 @@
             <a:spcAft>
               <a:spcPct val="35000"/>
             </a:spcAft>
+            <a:buNone/>
           </a:pPr>
           <a:r>
-            <a:rPr lang="de-DE" sz="1700" kern="1200" dirty="0" smtClean="0"/>
-            <a:t>Analyse</a:t>
+            <a:rPr lang="de-DE" sz="1700" kern="1200" dirty="0"/>
+            <a:t>Usability</a:t>
           </a:r>
-          <a:endParaRPr lang="de-DE" sz="1700" kern="1200" dirty="0"/>
         </a:p>
       </dsp:txBody>
       <dsp:txXfrm>
@@ -27471,7 +27212,7 @@
           <a:p>
             <a:fld id="{BC5D3495-D642-4B9C-A4D9-ABBA71EA56ED}" type="datetimeFigureOut">
               <a:rPr lang="de-DE" smtClean="0"/>
-              <a:t>07.09.2016</a:t>
+              <a:t>08.09.2016</a:t>
             </a:fld>
             <a:endParaRPr lang="de-DE"/>
           </a:p>
@@ -27738,6 +27479,1078 @@
 </p:notesMaster>
 </file>
 
+<file path=ppt/notesSlides/notesSlide1.xml><?xml version="1.0" encoding="utf-8"?>
+<p:notes xmlns:a="http://schemas.openxmlformats.org/drawingml/2006/main" xmlns:r="http://schemas.openxmlformats.org/officeDocument/2006/relationships" xmlns:p="http://schemas.openxmlformats.org/presentationml/2006/main">
+  <p:cSld>
+    <p:spTree>
+      <p:nvGrpSpPr>
+        <p:cNvPr id="1" name=""/>
+        <p:cNvGrpSpPr/>
+        <p:nvPr/>
+      </p:nvGrpSpPr>
+      <p:grpSpPr>
+        <a:xfrm>
+          <a:off x="0" y="0"/>
+          <a:ext cx="0" cy="0"/>
+          <a:chOff x="0" y="0"/>
+          <a:chExt cx="0" cy="0"/>
+        </a:xfrm>
+      </p:grpSpPr>
+      <p:sp>
+        <p:nvSpPr>
+          <p:cNvPr id="2" name="Folienbildplatzhalter 1"/>
+          <p:cNvSpPr>
+            <a:spLocks noGrp="1" noRot="1" noChangeAspect="1"/>
+          </p:cNvSpPr>
+          <p:nvPr>
+            <p:ph type="sldImg"/>
+          </p:nvPr>
+        </p:nvSpPr>
+        <p:spPr/>
+      </p:sp>
+      <p:sp>
+        <p:nvSpPr>
+          <p:cNvPr id="3" name="Notizenplatzhalter 2"/>
+          <p:cNvSpPr>
+            <a:spLocks noGrp="1"/>
+          </p:cNvSpPr>
+          <p:nvPr>
+            <p:ph type="body" idx="1"/>
+          </p:nvPr>
+        </p:nvSpPr>
+        <p:spPr/>
+        <p:txBody>
+          <a:bodyPr/>
+          <a:lstStyle/>
+          <a:p>
+            <a:r>
+              <a:rPr lang="de-DE" dirty="0"/>
+              <a:t>Im Namen der </a:t>
+            </a:r>
+            <a:r>
+              <a:rPr lang="de-DE" dirty="0" err="1"/>
+              <a:t>Red</a:t>
+            </a:r>
+            <a:r>
+              <a:rPr lang="de-DE" baseline="0" dirty="0"/>
+              <a:t> Stag GmbH, darf ich h</a:t>
+            </a:r>
+            <a:r>
+              <a:rPr lang="de-DE" dirty="0"/>
+              <a:t>erzlich </a:t>
+            </a:r>
+            <a:r>
+              <a:rPr lang="de-DE" baseline="0" dirty="0"/>
+              <a:t>die Unternehmensvertreter der Supernova AG – Herrn Frederik Frey und Herrn Daniel </a:t>
+            </a:r>
+            <a:r>
+              <a:rPr lang="de-DE" baseline="0" dirty="0" err="1"/>
+              <a:t>Trefzer</a:t>
+            </a:r>
+            <a:r>
+              <a:rPr lang="de-DE" baseline="0" dirty="0"/>
+              <a:t> begrüßen.</a:t>
+            </a:r>
+            <a:endParaRPr lang="de-DE" dirty="0"/>
+          </a:p>
+        </p:txBody>
+      </p:sp>
+      <p:sp>
+        <p:nvSpPr>
+          <p:cNvPr id="4" name="Foliennummernplatzhalter 3"/>
+          <p:cNvSpPr>
+            <a:spLocks noGrp="1"/>
+          </p:cNvSpPr>
+          <p:nvPr>
+            <p:ph type="sldNum" sz="quarter" idx="10"/>
+          </p:nvPr>
+        </p:nvSpPr>
+        <p:spPr/>
+        <p:txBody>
+          <a:bodyPr/>
+          <a:lstStyle/>
+          <a:p>
+            <a:fld id="{9FC0BF00-B122-482A-9408-566B5D066A28}" type="slidenum">
+              <a:rPr lang="de-DE" smtClean="0"/>
+              <a:t>1</a:t>
+            </a:fld>
+            <a:endParaRPr lang="de-DE"/>
+          </a:p>
+        </p:txBody>
+      </p:sp>
+    </p:spTree>
+    <p:extLst>
+      <p:ext uri="{BB962C8B-B14F-4D97-AF65-F5344CB8AC3E}">
+        <p14:creationId xmlns:p14="http://schemas.microsoft.com/office/powerpoint/2010/main" val="70576773"/>
+      </p:ext>
+    </p:extLst>
+  </p:cSld>
+  <p:clrMapOvr>
+    <a:masterClrMapping/>
+  </p:clrMapOvr>
+</p:notes>
+</file>
+
+<file path=ppt/notesSlides/notesSlide10.xml><?xml version="1.0" encoding="utf-8"?>
+<p:notes xmlns:a="http://schemas.openxmlformats.org/drawingml/2006/main" xmlns:r="http://schemas.openxmlformats.org/officeDocument/2006/relationships" xmlns:p="http://schemas.openxmlformats.org/presentationml/2006/main">
+  <p:cSld>
+    <p:spTree>
+      <p:nvGrpSpPr>
+        <p:cNvPr id="1" name=""/>
+        <p:cNvGrpSpPr/>
+        <p:nvPr/>
+      </p:nvGrpSpPr>
+      <p:grpSpPr>
+        <a:xfrm>
+          <a:off x="0" y="0"/>
+          <a:ext cx="0" cy="0"/>
+          <a:chOff x="0" y="0"/>
+          <a:chExt cx="0" cy="0"/>
+        </a:xfrm>
+      </p:grpSpPr>
+      <p:sp>
+        <p:nvSpPr>
+          <p:cNvPr id="2" name="Folienbildplatzhalter 1"/>
+          <p:cNvSpPr>
+            <a:spLocks noGrp="1" noRot="1" noChangeAspect="1"/>
+          </p:cNvSpPr>
+          <p:nvPr>
+            <p:ph type="sldImg"/>
+          </p:nvPr>
+        </p:nvSpPr>
+        <p:spPr/>
+      </p:sp>
+      <p:sp>
+        <p:nvSpPr>
+          <p:cNvPr id="3" name="Notizenplatzhalter 2"/>
+          <p:cNvSpPr>
+            <a:spLocks noGrp="1"/>
+          </p:cNvSpPr>
+          <p:nvPr>
+            <p:ph type="body" idx="1"/>
+          </p:nvPr>
+        </p:nvSpPr>
+        <p:spPr/>
+        <p:txBody>
+          <a:bodyPr/>
+          <a:lstStyle/>
+          <a:p>
+            <a:endParaRPr lang="de-DE" dirty="0"/>
+          </a:p>
+        </p:txBody>
+      </p:sp>
+      <p:sp>
+        <p:nvSpPr>
+          <p:cNvPr id="4" name="Foliennummernplatzhalter 3"/>
+          <p:cNvSpPr>
+            <a:spLocks noGrp="1"/>
+          </p:cNvSpPr>
+          <p:nvPr>
+            <p:ph type="sldNum" sz="quarter" idx="10"/>
+          </p:nvPr>
+        </p:nvSpPr>
+        <p:spPr/>
+        <p:txBody>
+          <a:bodyPr/>
+          <a:lstStyle/>
+          <a:p>
+            <a:fld id="{9FC0BF00-B122-482A-9408-566B5D066A28}" type="slidenum">
+              <a:rPr lang="de-DE" smtClean="0"/>
+              <a:t>12</a:t>
+            </a:fld>
+            <a:endParaRPr lang="de-DE"/>
+          </a:p>
+        </p:txBody>
+      </p:sp>
+    </p:spTree>
+    <p:extLst>
+      <p:ext uri="{BB962C8B-B14F-4D97-AF65-F5344CB8AC3E}">
+        <p14:creationId xmlns:p14="http://schemas.microsoft.com/office/powerpoint/2010/main" val="3709399439"/>
+      </p:ext>
+    </p:extLst>
+  </p:cSld>
+  <p:clrMapOvr>
+    <a:masterClrMapping/>
+  </p:clrMapOvr>
+</p:notes>
+</file>
+
+<file path=ppt/notesSlides/notesSlide11.xml><?xml version="1.0" encoding="utf-8"?>
+<p:notes xmlns:a="http://schemas.openxmlformats.org/drawingml/2006/main" xmlns:r="http://schemas.openxmlformats.org/officeDocument/2006/relationships" xmlns:p="http://schemas.openxmlformats.org/presentationml/2006/main">
+  <p:cSld>
+    <p:spTree>
+      <p:nvGrpSpPr>
+        <p:cNvPr id="1" name=""/>
+        <p:cNvGrpSpPr/>
+        <p:nvPr/>
+      </p:nvGrpSpPr>
+      <p:grpSpPr>
+        <a:xfrm>
+          <a:off x="0" y="0"/>
+          <a:ext cx="0" cy="0"/>
+          <a:chOff x="0" y="0"/>
+          <a:chExt cx="0" cy="0"/>
+        </a:xfrm>
+      </p:grpSpPr>
+      <p:sp>
+        <p:nvSpPr>
+          <p:cNvPr id="2" name="Folienbildplatzhalter 1"/>
+          <p:cNvSpPr>
+            <a:spLocks noGrp="1" noRot="1" noChangeAspect="1"/>
+          </p:cNvSpPr>
+          <p:nvPr>
+            <p:ph type="sldImg"/>
+          </p:nvPr>
+        </p:nvSpPr>
+        <p:spPr/>
+      </p:sp>
+      <p:sp>
+        <p:nvSpPr>
+          <p:cNvPr id="3" name="Notizenplatzhalter 2"/>
+          <p:cNvSpPr>
+            <a:spLocks noGrp="1"/>
+          </p:cNvSpPr>
+          <p:nvPr>
+            <p:ph type="body" idx="1"/>
+          </p:nvPr>
+        </p:nvSpPr>
+        <p:spPr/>
+        <p:txBody>
+          <a:bodyPr/>
+          <a:lstStyle/>
+          <a:p>
+            <a:r>
+              <a:rPr lang="de-DE" dirty="0"/>
+              <a:t>Fabian</a:t>
+            </a:r>
+            <a:r>
+              <a:rPr lang="de-DE" baseline="0" dirty="0"/>
+              <a:t> </a:t>
+            </a:r>
+            <a:r>
+              <a:rPr lang="de-DE" dirty="0"/>
+              <a:t>denkt stark an Expansion. Entsprechend muss</a:t>
+            </a:r>
+            <a:r>
+              <a:rPr lang="de-DE" baseline="0" dirty="0"/>
+              <a:t> sich das Umfeld des PAMS erweitern. Wie schnell und einfach Stammdaten hinzugefügt werden können, zeigen wir Ihnen am Beispiel.</a:t>
+            </a:r>
+            <a:endParaRPr lang="de-DE" dirty="0"/>
+          </a:p>
+        </p:txBody>
+      </p:sp>
+      <p:sp>
+        <p:nvSpPr>
+          <p:cNvPr id="4" name="Foliennummernplatzhalter 3"/>
+          <p:cNvSpPr>
+            <a:spLocks noGrp="1"/>
+          </p:cNvSpPr>
+          <p:nvPr>
+            <p:ph type="sldNum" sz="quarter" idx="10"/>
+          </p:nvPr>
+        </p:nvSpPr>
+        <p:spPr/>
+        <p:txBody>
+          <a:bodyPr/>
+          <a:lstStyle/>
+          <a:p>
+            <a:fld id="{9FC0BF00-B122-482A-9408-566B5D066A28}" type="slidenum">
+              <a:rPr lang="de-DE" smtClean="0"/>
+              <a:t>13</a:t>
+            </a:fld>
+            <a:endParaRPr lang="de-DE"/>
+          </a:p>
+        </p:txBody>
+      </p:sp>
+    </p:spTree>
+    <p:extLst>
+      <p:ext uri="{BB962C8B-B14F-4D97-AF65-F5344CB8AC3E}">
+        <p14:creationId xmlns:p14="http://schemas.microsoft.com/office/powerpoint/2010/main" val="2752290496"/>
+      </p:ext>
+    </p:extLst>
+  </p:cSld>
+  <p:clrMapOvr>
+    <a:masterClrMapping/>
+  </p:clrMapOvr>
+</p:notes>
+</file>
+
+<file path=ppt/notesSlides/notesSlide2.xml><?xml version="1.0" encoding="utf-8"?>
+<p:notes xmlns:a="http://schemas.openxmlformats.org/drawingml/2006/main" xmlns:r="http://schemas.openxmlformats.org/officeDocument/2006/relationships" xmlns:p="http://schemas.openxmlformats.org/presentationml/2006/main">
+  <p:cSld>
+    <p:spTree>
+      <p:nvGrpSpPr>
+        <p:cNvPr id="1" name=""/>
+        <p:cNvGrpSpPr/>
+        <p:nvPr/>
+      </p:nvGrpSpPr>
+      <p:grpSpPr>
+        <a:xfrm>
+          <a:off x="0" y="0"/>
+          <a:ext cx="0" cy="0"/>
+          <a:chOff x="0" y="0"/>
+          <a:chExt cx="0" cy="0"/>
+        </a:xfrm>
+      </p:grpSpPr>
+      <p:sp>
+        <p:nvSpPr>
+          <p:cNvPr id="2" name="Folienbildplatzhalter 1"/>
+          <p:cNvSpPr>
+            <a:spLocks noGrp="1" noRot="1" noChangeAspect="1"/>
+          </p:cNvSpPr>
+          <p:nvPr>
+            <p:ph type="sldImg"/>
+          </p:nvPr>
+        </p:nvSpPr>
+        <p:spPr/>
+      </p:sp>
+      <p:sp>
+        <p:nvSpPr>
+          <p:cNvPr id="3" name="Notizenplatzhalter 2"/>
+          <p:cNvSpPr>
+            <a:spLocks noGrp="1"/>
+          </p:cNvSpPr>
+          <p:nvPr>
+            <p:ph type="body" idx="1"/>
+          </p:nvPr>
+        </p:nvSpPr>
+        <p:spPr/>
+        <p:txBody>
+          <a:bodyPr/>
+          <a:lstStyle/>
+          <a:p>
+            <a:r>
+              <a:rPr lang="de-DE" dirty="0"/>
+              <a:t>Willkommen in einem neuen Zeitalter der Projektantragserfassung!</a:t>
+            </a:r>
+          </a:p>
+        </p:txBody>
+      </p:sp>
+      <p:sp>
+        <p:nvSpPr>
+          <p:cNvPr id="4" name="Foliennummernplatzhalter 3"/>
+          <p:cNvSpPr>
+            <a:spLocks noGrp="1"/>
+          </p:cNvSpPr>
+          <p:nvPr>
+            <p:ph type="sldNum" sz="quarter" idx="10"/>
+          </p:nvPr>
+        </p:nvSpPr>
+        <p:spPr/>
+        <p:txBody>
+          <a:bodyPr/>
+          <a:lstStyle/>
+          <a:p>
+            <a:fld id="{9FC0BF00-B122-482A-9408-566B5D066A28}" type="slidenum">
+              <a:rPr lang="de-DE" smtClean="0"/>
+              <a:t>2</a:t>
+            </a:fld>
+            <a:endParaRPr lang="de-DE"/>
+          </a:p>
+        </p:txBody>
+      </p:sp>
+    </p:spTree>
+    <p:extLst>
+      <p:ext uri="{BB962C8B-B14F-4D97-AF65-F5344CB8AC3E}">
+        <p14:creationId xmlns:p14="http://schemas.microsoft.com/office/powerpoint/2010/main" val="4111070985"/>
+      </p:ext>
+    </p:extLst>
+  </p:cSld>
+  <p:clrMapOvr>
+    <a:masterClrMapping/>
+  </p:clrMapOvr>
+</p:notes>
+</file>
+
+<file path=ppt/notesSlides/notesSlide3.xml><?xml version="1.0" encoding="utf-8"?>
+<p:notes xmlns:a="http://schemas.openxmlformats.org/drawingml/2006/main" xmlns:r="http://schemas.openxmlformats.org/officeDocument/2006/relationships" xmlns:p="http://schemas.openxmlformats.org/presentationml/2006/main">
+  <p:cSld>
+    <p:spTree>
+      <p:nvGrpSpPr>
+        <p:cNvPr id="1" name=""/>
+        <p:cNvGrpSpPr/>
+        <p:nvPr/>
+      </p:nvGrpSpPr>
+      <p:grpSpPr>
+        <a:xfrm>
+          <a:off x="0" y="0"/>
+          <a:ext cx="0" cy="0"/>
+          <a:chOff x="0" y="0"/>
+          <a:chExt cx="0" cy="0"/>
+        </a:xfrm>
+      </p:grpSpPr>
+      <p:sp>
+        <p:nvSpPr>
+          <p:cNvPr id="2" name="Folienbildplatzhalter 1"/>
+          <p:cNvSpPr>
+            <a:spLocks noGrp="1" noRot="1" noChangeAspect="1"/>
+          </p:cNvSpPr>
+          <p:nvPr>
+            <p:ph type="sldImg"/>
+          </p:nvPr>
+        </p:nvSpPr>
+        <p:spPr/>
+      </p:sp>
+      <p:sp>
+        <p:nvSpPr>
+          <p:cNvPr id="3" name="Notizenplatzhalter 2"/>
+          <p:cNvSpPr>
+            <a:spLocks noGrp="1"/>
+          </p:cNvSpPr>
+          <p:nvPr>
+            <p:ph type="body" idx="1"/>
+          </p:nvPr>
+        </p:nvSpPr>
+        <p:spPr/>
+        <p:txBody>
+          <a:bodyPr/>
+          <a:lstStyle/>
+          <a:p>
+            <a:r>
+              <a:rPr lang="de-DE" dirty="0"/>
+              <a:t>Derzeit befindet sich</a:t>
+            </a:r>
+            <a:r>
+              <a:rPr lang="de-DE" baseline="0" dirty="0"/>
+              <a:t> die Supernova AG auf einem kurvigen Weg. </a:t>
+            </a:r>
+          </a:p>
+          <a:p>
+            <a:pPr marL="228600" indent="-228600">
+              <a:buAutoNum type="arabicPeriod"/>
+            </a:pPr>
+            <a:r>
+              <a:rPr lang="de-DE" baseline="0" dirty="0"/>
+              <a:t>Es gibt keine ganzheitliche Erfassung aller Projekte – die Dunkelziffer an Projekten die innerhalb des Unternehmens laufen ist enorm. </a:t>
+            </a:r>
+          </a:p>
+          <a:p>
+            <a:pPr marL="228600" indent="-228600">
+              <a:buAutoNum type="arabicPeriod"/>
+            </a:pPr>
+            <a:r>
+              <a:rPr lang="de-DE" baseline="0" dirty="0"/>
+              <a:t>Sie besitzen kein IT gestütztes Tool zur Anzeige und Übersicht ihrer Projekte!</a:t>
+            </a:r>
+          </a:p>
+          <a:p>
+            <a:pPr marL="228600" indent="-228600">
+              <a:buAutoNum type="arabicPeriod"/>
+            </a:pPr>
+            <a:r>
+              <a:rPr lang="de-DE" baseline="0" dirty="0"/>
+              <a:t>Es gibt keine Auswertemöglichkeiten und daraus ableitend keine Übersicht über die wichtigsten Kennzahlen der laufenden Projekte</a:t>
+            </a:r>
+          </a:p>
+          <a:p>
+            <a:pPr marL="228600" indent="-228600">
+              <a:buAutoNum type="arabicPeriod"/>
+            </a:pPr>
+            <a:r>
+              <a:rPr lang="de-DE" baseline="0" dirty="0"/>
+              <a:t>Dies sind nur ein paar Punkte die wir hier aufgegriffen haben – im allgemeinen können wir sagen – derzeit sind Sie Orientierungslos was ihr Projektantragsmanagement angeht.</a:t>
+            </a:r>
+          </a:p>
+          <a:p>
+            <a:pPr marL="0" indent="0">
+              <a:buNone/>
+            </a:pPr>
+            <a:endParaRPr lang="de-DE" baseline="0" dirty="0"/>
+          </a:p>
+        </p:txBody>
+      </p:sp>
+      <p:sp>
+        <p:nvSpPr>
+          <p:cNvPr id="4" name="Foliennummernplatzhalter 3"/>
+          <p:cNvSpPr>
+            <a:spLocks noGrp="1"/>
+          </p:cNvSpPr>
+          <p:nvPr>
+            <p:ph type="sldNum" sz="quarter" idx="10"/>
+          </p:nvPr>
+        </p:nvSpPr>
+        <p:spPr/>
+        <p:txBody>
+          <a:bodyPr/>
+          <a:lstStyle/>
+          <a:p>
+            <a:fld id="{9FC0BF00-B122-482A-9408-566B5D066A28}" type="slidenum">
+              <a:rPr lang="de-DE" smtClean="0"/>
+              <a:t>3</a:t>
+            </a:fld>
+            <a:endParaRPr lang="de-DE"/>
+          </a:p>
+        </p:txBody>
+      </p:sp>
+    </p:spTree>
+    <p:extLst>
+      <p:ext uri="{BB962C8B-B14F-4D97-AF65-F5344CB8AC3E}">
+        <p14:creationId xmlns:p14="http://schemas.microsoft.com/office/powerpoint/2010/main" val="647668142"/>
+      </p:ext>
+    </p:extLst>
+  </p:cSld>
+  <p:clrMapOvr>
+    <a:masterClrMapping/>
+  </p:clrMapOvr>
+</p:notes>
+</file>
+
+<file path=ppt/notesSlides/notesSlide4.xml><?xml version="1.0" encoding="utf-8"?>
+<p:notes xmlns:a="http://schemas.openxmlformats.org/drawingml/2006/main" xmlns:r="http://schemas.openxmlformats.org/officeDocument/2006/relationships" xmlns:p="http://schemas.openxmlformats.org/presentationml/2006/main">
+  <p:cSld>
+    <p:spTree>
+      <p:nvGrpSpPr>
+        <p:cNvPr id="1" name=""/>
+        <p:cNvGrpSpPr/>
+        <p:nvPr/>
+      </p:nvGrpSpPr>
+      <p:grpSpPr>
+        <a:xfrm>
+          <a:off x="0" y="0"/>
+          <a:ext cx="0" cy="0"/>
+          <a:chOff x="0" y="0"/>
+          <a:chExt cx="0" cy="0"/>
+        </a:xfrm>
+      </p:grpSpPr>
+      <p:sp>
+        <p:nvSpPr>
+          <p:cNvPr id="2" name="Folienbildplatzhalter 1"/>
+          <p:cNvSpPr>
+            <a:spLocks noGrp="1" noRot="1" noChangeAspect="1"/>
+          </p:cNvSpPr>
+          <p:nvPr>
+            <p:ph type="sldImg"/>
+          </p:nvPr>
+        </p:nvSpPr>
+        <p:spPr/>
+      </p:sp>
+      <p:sp>
+        <p:nvSpPr>
+          <p:cNvPr id="3" name="Notizenplatzhalter 2"/>
+          <p:cNvSpPr>
+            <a:spLocks noGrp="1"/>
+          </p:cNvSpPr>
+          <p:nvPr>
+            <p:ph type="body" idx="1"/>
+          </p:nvPr>
+        </p:nvSpPr>
+        <p:spPr/>
+        <p:txBody>
+          <a:bodyPr/>
+          <a:lstStyle/>
+          <a:p>
+            <a:r>
+              <a:rPr lang="de-DE" dirty="0"/>
+              <a:t>Hier kommt die </a:t>
+            </a:r>
+            <a:r>
+              <a:rPr lang="de-DE" dirty="0" err="1"/>
+              <a:t>Red</a:t>
+            </a:r>
+            <a:r>
+              <a:rPr lang="de-DE" dirty="0"/>
+              <a:t> Stag GmbH ins Spiel – Wir helfen Ihnen sich zu orientieren</a:t>
+            </a:r>
+            <a:r>
+              <a:rPr lang="de-DE" baseline="0" dirty="0"/>
+              <a:t> und ihren kurvigen Weg zu begradigen!</a:t>
+            </a:r>
+            <a:endParaRPr lang="de-DE" dirty="0"/>
+          </a:p>
+        </p:txBody>
+      </p:sp>
+      <p:sp>
+        <p:nvSpPr>
+          <p:cNvPr id="4" name="Foliennummernplatzhalter 3"/>
+          <p:cNvSpPr>
+            <a:spLocks noGrp="1"/>
+          </p:cNvSpPr>
+          <p:nvPr>
+            <p:ph type="sldNum" sz="quarter" idx="10"/>
+          </p:nvPr>
+        </p:nvSpPr>
+        <p:spPr/>
+        <p:txBody>
+          <a:bodyPr/>
+          <a:lstStyle/>
+          <a:p>
+            <a:fld id="{9FC0BF00-B122-482A-9408-566B5D066A28}" type="slidenum">
+              <a:rPr lang="de-DE" smtClean="0"/>
+              <a:t>4</a:t>
+            </a:fld>
+            <a:endParaRPr lang="de-DE"/>
+          </a:p>
+        </p:txBody>
+      </p:sp>
+    </p:spTree>
+    <p:extLst>
+      <p:ext uri="{BB962C8B-B14F-4D97-AF65-F5344CB8AC3E}">
+        <p14:creationId xmlns:p14="http://schemas.microsoft.com/office/powerpoint/2010/main" val="3209034498"/>
+      </p:ext>
+    </p:extLst>
+  </p:cSld>
+  <p:clrMapOvr>
+    <a:masterClrMapping/>
+  </p:clrMapOvr>
+</p:notes>
+</file>
+
+<file path=ppt/notesSlides/notesSlide5.xml><?xml version="1.0" encoding="utf-8"?>
+<p:notes xmlns:a="http://schemas.openxmlformats.org/drawingml/2006/main" xmlns:r="http://schemas.openxmlformats.org/officeDocument/2006/relationships" xmlns:p="http://schemas.openxmlformats.org/presentationml/2006/main">
+  <p:cSld>
+    <p:spTree>
+      <p:nvGrpSpPr>
+        <p:cNvPr id="1" name=""/>
+        <p:cNvGrpSpPr/>
+        <p:nvPr/>
+      </p:nvGrpSpPr>
+      <p:grpSpPr>
+        <a:xfrm>
+          <a:off x="0" y="0"/>
+          <a:ext cx="0" cy="0"/>
+          <a:chOff x="0" y="0"/>
+          <a:chExt cx="0" cy="0"/>
+        </a:xfrm>
+      </p:grpSpPr>
+      <p:sp>
+        <p:nvSpPr>
+          <p:cNvPr id="2" name="Folienbildplatzhalter 1"/>
+          <p:cNvSpPr>
+            <a:spLocks noGrp="1" noRot="1" noChangeAspect="1"/>
+          </p:cNvSpPr>
+          <p:nvPr>
+            <p:ph type="sldImg"/>
+          </p:nvPr>
+        </p:nvSpPr>
+        <p:spPr/>
+      </p:sp>
+      <p:sp>
+        <p:nvSpPr>
+          <p:cNvPr id="3" name="Notizenplatzhalter 2"/>
+          <p:cNvSpPr>
+            <a:spLocks noGrp="1"/>
+          </p:cNvSpPr>
+          <p:nvPr>
+            <p:ph type="body" idx="1"/>
+          </p:nvPr>
+        </p:nvSpPr>
+        <p:spPr/>
+        <p:txBody>
+          <a:bodyPr/>
+          <a:lstStyle/>
+          <a:p>
+            <a:r>
+              <a:rPr lang="de-DE" dirty="0"/>
+              <a:t>Lassen Sie</a:t>
+            </a:r>
+            <a:r>
+              <a:rPr lang="de-DE" baseline="0" dirty="0"/>
+              <a:t> uns gemeinsam die Bausteine auf eine Linie bringen, um Ihr Projektantragsmanagement auf ein neues Level zu heben. Welche Funktionen können wir Ihnen anbieten um ihnen zukünftig entsprechenden Mehrwert zu bieten?</a:t>
+            </a:r>
+            <a:endParaRPr lang="de-DE" dirty="0"/>
+          </a:p>
+        </p:txBody>
+      </p:sp>
+      <p:sp>
+        <p:nvSpPr>
+          <p:cNvPr id="4" name="Foliennummernplatzhalter 3"/>
+          <p:cNvSpPr>
+            <a:spLocks noGrp="1"/>
+          </p:cNvSpPr>
+          <p:nvPr>
+            <p:ph type="sldNum" sz="quarter" idx="10"/>
+          </p:nvPr>
+        </p:nvSpPr>
+        <p:spPr/>
+        <p:txBody>
+          <a:bodyPr/>
+          <a:lstStyle/>
+          <a:p>
+            <a:fld id="{9FC0BF00-B122-482A-9408-566B5D066A28}" type="slidenum">
+              <a:rPr lang="de-DE" smtClean="0"/>
+              <a:t>5</a:t>
+            </a:fld>
+            <a:endParaRPr lang="de-DE"/>
+          </a:p>
+        </p:txBody>
+      </p:sp>
+    </p:spTree>
+    <p:extLst>
+      <p:ext uri="{BB962C8B-B14F-4D97-AF65-F5344CB8AC3E}">
+        <p14:creationId xmlns:p14="http://schemas.microsoft.com/office/powerpoint/2010/main" val="2891731583"/>
+      </p:ext>
+    </p:extLst>
+  </p:cSld>
+  <p:clrMapOvr>
+    <a:masterClrMapping/>
+  </p:clrMapOvr>
+</p:notes>
+</file>
+
+<file path=ppt/notesSlides/notesSlide6.xml><?xml version="1.0" encoding="utf-8"?>
+<p:notes xmlns:a="http://schemas.openxmlformats.org/drawingml/2006/main" xmlns:r="http://schemas.openxmlformats.org/officeDocument/2006/relationships" xmlns:p="http://schemas.openxmlformats.org/presentationml/2006/main">
+  <p:cSld>
+    <p:spTree>
+      <p:nvGrpSpPr>
+        <p:cNvPr id="1" name=""/>
+        <p:cNvGrpSpPr/>
+        <p:nvPr/>
+      </p:nvGrpSpPr>
+      <p:grpSpPr>
+        <a:xfrm>
+          <a:off x="0" y="0"/>
+          <a:ext cx="0" cy="0"/>
+          <a:chOff x="0" y="0"/>
+          <a:chExt cx="0" cy="0"/>
+        </a:xfrm>
+      </p:grpSpPr>
+      <p:sp>
+        <p:nvSpPr>
+          <p:cNvPr id="2" name="Folienbildplatzhalter 1"/>
+          <p:cNvSpPr>
+            <a:spLocks noGrp="1" noRot="1" noChangeAspect="1"/>
+          </p:cNvSpPr>
+          <p:nvPr>
+            <p:ph type="sldImg"/>
+          </p:nvPr>
+        </p:nvSpPr>
+        <p:spPr/>
+      </p:sp>
+      <p:sp>
+        <p:nvSpPr>
+          <p:cNvPr id="3" name="Notizenplatzhalter 2"/>
+          <p:cNvSpPr>
+            <a:spLocks noGrp="1"/>
+          </p:cNvSpPr>
+          <p:nvPr>
+            <p:ph type="body" idx="1"/>
+          </p:nvPr>
+        </p:nvSpPr>
+        <p:spPr/>
+        <p:txBody>
+          <a:bodyPr/>
+          <a:lstStyle/>
+          <a:p>
+            <a:r>
+              <a:rPr lang="de-DE" dirty="0"/>
+              <a:t>Welche Funktionen besitzt</a:t>
+            </a:r>
+            <a:r>
+              <a:rPr lang="de-DE" baseline="0" dirty="0"/>
+              <a:t> das PAMS. </a:t>
+            </a:r>
+            <a:r>
+              <a:rPr lang="de-DE" baseline="0" dirty="0" err="1"/>
+              <a:t>Informatio</a:t>
+            </a:r>
+            <a:endParaRPr lang="de-DE" dirty="0"/>
+          </a:p>
+        </p:txBody>
+      </p:sp>
+      <p:sp>
+        <p:nvSpPr>
+          <p:cNvPr id="4" name="Foliennummernplatzhalter 3"/>
+          <p:cNvSpPr>
+            <a:spLocks noGrp="1"/>
+          </p:cNvSpPr>
+          <p:nvPr>
+            <p:ph type="sldNum" sz="quarter" idx="10"/>
+          </p:nvPr>
+        </p:nvSpPr>
+        <p:spPr/>
+        <p:txBody>
+          <a:bodyPr/>
+          <a:lstStyle/>
+          <a:p>
+            <a:fld id="{9FC0BF00-B122-482A-9408-566B5D066A28}" type="slidenum">
+              <a:rPr lang="de-DE" smtClean="0"/>
+              <a:t>6</a:t>
+            </a:fld>
+            <a:endParaRPr lang="de-DE"/>
+          </a:p>
+        </p:txBody>
+      </p:sp>
+    </p:spTree>
+    <p:extLst>
+      <p:ext uri="{BB962C8B-B14F-4D97-AF65-F5344CB8AC3E}">
+        <p14:creationId xmlns:p14="http://schemas.microsoft.com/office/powerpoint/2010/main" val="3937256442"/>
+      </p:ext>
+    </p:extLst>
+  </p:cSld>
+  <p:clrMapOvr>
+    <a:masterClrMapping/>
+  </p:clrMapOvr>
+</p:notes>
+</file>
+
+<file path=ppt/notesSlides/notesSlide7.xml><?xml version="1.0" encoding="utf-8"?>
+<p:notes xmlns:a="http://schemas.openxmlformats.org/drawingml/2006/main" xmlns:r="http://schemas.openxmlformats.org/officeDocument/2006/relationships" xmlns:p="http://schemas.openxmlformats.org/presentationml/2006/main">
+  <p:cSld>
+    <p:spTree>
+      <p:nvGrpSpPr>
+        <p:cNvPr id="1" name=""/>
+        <p:cNvGrpSpPr/>
+        <p:nvPr/>
+      </p:nvGrpSpPr>
+      <p:grpSpPr>
+        <a:xfrm>
+          <a:off x="0" y="0"/>
+          <a:ext cx="0" cy="0"/>
+          <a:chOff x="0" y="0"/>
+          <a:chExt cx="0" cy="0"/>
+        </a:xfrm>
+      </p:grpSpPr>
+      <p:sp>
+        <p:nvSpPr>
+          <p:cNvPr id="2" name="Folienbildplatzhalter 1"/>
+          <p:cNvSpPr>
+            <a:spLocks noGrp="1" noRot="1" noChangeAspect="1"/>
+          </p:cNvSpPr>
+          <p:nvPr>
+            <p:ph type="sldImg"/>
+          </p:nvPr>
+        </p:nvSpPr>
+        <p:spPr/>
+      </p:sp>
+      <p:sp>
+        <p:nvSpPr>
+          <p:cNvPr id="3" name="Notizenplatzhalter 2"/>
+          <p:cNvSpPr>
+            <a:spLocks noGrp="1"/>
+          </p:cNvSpPr>
+          <p:nvPr>
+            <p:ph type="body" idx="1"/>
+          </p:nvPr>
+        </p:nvSpPr>
+        <p:spPr/>
+        <p:txBody>
+          <a:bodyPr/>
+          <a:lstStyle/>
+          <a:p>
+            <a:r>
+              <a:rPr lang="de-DE" dirty="0"/>
+              <a:t>Welchen Mehrwert</a:t>
+            </a:r>
+            <a:r>
+              <a:rPr lang="de-DE" baseline="0" dirty="0"/>
+              <a:t> können wir Ihnen bieten?</a:t>
+            </a:r>
+            <a:endParaRPr lang="de-DE" dirty="0"/>
+          </a:p>
+        </p:txBody>
+      </p:sp>
+      <p:sp>
+        <p:nvSpPr>
+          <p:cNvPr id="4" name="Foliennummernplatzhalter 3"/>
+          <p:cNvSpPr>
+            <a:spLocks noGrp="1"/>
+          </p:cNvSpPr>
+          <p:nvPr>
+            <p:ph type="sldNum" sz="quarter" idx="10"/>
+          </p:nvPr>
+        </p:nvSpPr>
+        <p:spPr/>
+        <p:txBody>
+          <a:bodyPr/>
+          <a:lstStyle/>
+          <a:p>
+            <a:fld id="{9FC0BF00-B122-482A-9408-566B5D066A28}" type="slidenum">
+              <a:rPr lang="de-DE" smtClean="0"/>
+              <a:t>8</a:t>
+            </a:fld>
+            <a:endParaRPr lang="de-DE"/>
+          </a:p>
+        </p:txBody>
+      </p:sp>
+    </p:spTree>
+    <p:extLst>
+      <p:ext uri="{BB962C8B-B14F-4D97-AF65-F5344CB8AC3E}">
+        <p14:creationId xmlns:p14="http://schemas.microsoft.com/office/powerpoint/2010/main" val="270456164"/>
+      </p:ext>
+    </p:extLst>
+  </p:cSld>
+  <p:clrMapOvr>
+    <a:masterClrMapping/>
+  </p:clrMapOvr>
+</p:notes>
+</file>
+
+<file path=ppt/notesSlides/notesSlide8.xml><?xml version="1.0" encoding="utf-8"?>
+<p:notes xmlns:a="http://schemas.openxmlformats.org/drawingml/2006/main" xmlns:r="http://schemas.openxmlformats.org/officeDocument/2006/relationships" xmlns:p="http://schemas.openxmlformats.org/presentationml/2006/main">
+  <p:cSld>
+    <p:spTree>
+      <p:nvGrpSpPr>
+        <p:cNvPr id="1" name=""/>
+        <p:cNvGrpSpPr/>
+        <p:nvPr/>
+      </p:nvGrpSpPr>
+      <p:grpSpPr>
+        <a:xfrm>
+          <a:off x="0" y="0"/>
+          <a:ext cx="0" cy="0"/>
+          <a:chOff x="0" y="0"/>
+          <a:chExt cx="0" cy="0"/>
+        </a:xfrm>
+      </p:grpSpPr>
+      <p:sp>
+        <p:nvSpPr>
+          <p:cNvPr id="2" name="Folienbildplatzhalter 1"/>
+          <p:cNvSpPr>
+            <a:spLocks noGrp="1" noRot="1" noChangeAspect="1"/>
+          </p:cNvSpPr>
+          <p:nvPr>
+            <p:ph type="sldImg"/>
+          </p:nvPr>
+        </p:nvSpPr>
+        <p:spPr/>
+      </p:sp>
+      <p:sp>
+        <p:nvSpPr>
+          <p:cNvPr id="3" name="Notizenplatzhalter 2"/>
+          <p:cNvSpPr>
+            <a:spLocks noGrp="1"/>
+          </p:cNvSpPr>
+          <p:nvPr>
+            <p:ph type="body" idx="1"/>
+          </p:nvPr>
+        </p:nvSpPr>
+        <p:spPr/>
+        <p:txBody>
+          <a:bodyPr/>
+          <a:lstStyle/>
+          <a:p>
+            <a:endParaRPr lang="de-DE" dirty="0"/>
+          </a:p>
+        </p:txBody>
+      </p:sp>
+      <p:sp>
+        <p:nvSpPr>
+          <p:cNvPr id="4" name="Foliennummernplatzhalter 3"/>
+          <p:cNvSpPr>
+            <a:spLocks noGrp="1"/>
+          </p:cNvSpPr>
+          <p:nvPr>
+            <p:ph type="sldNum" sz="quarter" idx="10"/>
+          </p:nvPr>
+        </p:nvSpPr>
+        <p:spPr/>
+        <p:txBody>
+          <a:bodyPr/>
+          <a:lstStyle/>
+          <a:p>
+            <a:fld id="{9FC0BF00-B122-482A-9408-566B5D066A28}" type="slidenum">
+              <a:rPr lang="de-DE" smtClean="0"/>
+              <a:t>9</a:t>
+            </a:fld>
+            <a:endParaRPr lang="de-DE"/>
+          </a:p>
+        </p:txBody>
+      </p:sp>
+    </p:spTree>
+    <p:extLst>
+      <p:ext uri="{BB962C8B-B14F-4D97-AF65-F5344CB8AC3E}">
+        <p14:creationId xmlns:p14="http://schemas.microsoft.com/office/powerpoint/2010/main" val="411894574"/>
+      </p:ext>
+    </p:extLst>
+  </p:cSld>
+  <p:clrMapOvr>
+    <a:masterClrMapping/>
+  </p:clrMapOvr>
+</p:notes>
+</file>
+
+<file path=ppt/notesSlides/notesSlide9.xml><?xml version="1.0" encoding="utf-8"?>
+<p:notes xmlns:a="http://schemas.openxmlformats.org/drawingml/2006/main" xmlns:r="http://schemas.openxmlformats.org/officeDocument/2006/relationships" xmlns:p="http://schemas.openxmlformats.org/presentationml/2006/main">
+  <p:cSld>
+    <p:spTree>
+      <p:nvGrpSpPr>
+        <p:cNvPr id="1" name=""/>
+        <p:cNvGrpSpPr/>
+        <p:nvPr/>
+      </p:nvGrpSpPr>
+      <p:grpSpPr>
+        <a:xfrm>
+          <a:off x="0" y="0"/>
+          <a:ext cx="0" cy="0"/>
+          <a:chOff x="0" y="0"/>
+          <a:chExt cx="0" cy="0"/>
+        </a:xfrm>
+      </p:grpSpPr>
+      <p:sp>
+        <p:nvSpPr>
+          <p:cNvPr id="2" name="Folienbildplatzhalter 1"/>
+          <p:cNvSpPr>
+            <a:spLocks noGrp="1" noRot="1" noChangeAspect="1"/>
+          </p:cNvSpPr>
+          <p:nvPr>
+            <p:ph type="sldImg"/>
+          </p:nvPr>
+        </p:nvSpPr>
+        <p:spPr/>
+      </p:sp>
+      <p:sp>
+        <p:nvSpPr>
+          <p:cNvPr id="3" name="Notizenplatzhalter 2"/>
+          <p:cNvSpPr>
+            <a:spLocks noGrp="1"/>
+          </p:cNvSpPr>
+          <p:nvPr>
+            <p:ph type="body" idx="1"/>
+          </p:nvPr>
+        </p:nvSpPr>
+        <p:spPr/>
+        <p:txBody>
+          <a:bodyPr/>
+          <a:lstStyle/>
+          <a:p>
+            <a:r>
+              <a:rPr lang="de-DE" dirty="0"/>
+              <a:t>Mitarbeiter Paul hat eine überragende</a:t>
+            </a:r>
+            <a:r>
+              <a:rPr lang="de-DE" baseline="0" dirty="0"/>
+              <a:t> Idee und hat vom neu eingeführten PAMS gehört. Also möchte er Seine Idee über den neuen Kanal einreichen.</a:t>
+            </a:r>
+            <a:endParaRPr lang="de-DE" dirty="0"/>
+          </a:p>
+        </p:txBody>
+      </p:sp>
+      <p:sp>
+        <p:nvSpPr>
+          <p:cNvPr id="4" name="Foliennummernplatzhalter 3"/>
+          <p:cNvSpPr>
+            <a:spLocks noGrp="1"/>
+          </p:cNvSpPr>
+          <p:nvPr>
+            <p:ph type="sldNum" sz="quarter" idx="10"/>
+          </p:nvPr>
+        </p:nvSpPr>
+        <p:spPr/>
+        <p:txBody>
+          <a:bodyPr/>
+          <a:lstStyle/>
+          <a:p>
+            <a:fld id="{9FC0BF00-B122-482A-9408-566B5D066A28}" type="slidenum">
+              <a:rPr lang="de-DE" smtClean="0"/>
+              <a:t>11</a:t>
+            </a:fld>
+            <a:endParaRPr lang="de-DE"/>
+          </a:p>
+        </p:txBody>
+      </p:sp>
+    </p:spTree>
+    <p:extLst>
+      <p:ext uri="{BB962C8B-B14F-4D97-AF65-F5344CB8AC3E}">
+        <p14:creationId xmlns:p14="http://schemas.microsoft.com/office/powerpoint/2010/main" val="3225346425"/>
+      </p:ext>
+    </p:extLst>
+  </p:cSld>
+  <p:clrMapOvr>
+    <a:masterClrMapping/>
+  </p:clrMapOvr>
+</p:notes>
+</file>
+
 <file path=ppt/slideLayouts/slideLayout1.xml><?xml version="1.0" encoding="utf-8"?>
 <p:sldLayout xmlns:a="http://schemas.openxmlformats.org/drawingml/2006/main" xmlns:r="http://schemas.openxmlformats.org/officeDocument/2006/relationships" xmlns:p="http://schemas.openxmlformats.org/presentationml/2006/main" type="title" preserve="1">
   <p:cSld name="Titelfolie">
@@ -27867,7 +28680,7 @@
           <a:p>
             <a:fld id="{939A55D9-6AB2-4364-AE5A-4B2CFFB043C1}" type="datetimeFigureOut">
               <a:rPr lang="de-DE" smtClean="0"/>
-              <a:t>07.09.2016</a:t>
+              <a:t>08.09.2016</a:t>
             </a:fld>
             <a:endParaRPr lang="de-DE"/>
           </a:p>
@@ -28035,7 +28848,7 @@
           <a:p>
             <a:fld id="{939A55D9-6AB2-4364-AE5A-4B2CFFB043C1}" type="datetimeFigureOut">
               <a:rPr lang="de-DE" smtClean="0"/>
-              <a:t>07.09.2016</a:t>
+              <a:t>08.09.2016</a:t>
             </a:fld>
             <a:endParaRPr lang="de-DE"/>
           </a:p>
@@ -28213,7 +29026,7 @@
           <a:p>
             <a:fld id="{939A55D9-6AB2-4364-AE5A-4B2CFFB043C1}" type="datetimeFigureOut">
               <a:rPr lang="de-DE" smtClean="0"/>
-              <a:t>07.09.2016</a:t>
+              <a:t>08.09.2016</a:t>
             </a:fld>
             <a:endParaRPr lang="de-DE"/>
           </a:p>
@@ -28381,7 +29194,7 @@
           <a:p>
             <a:fld id="{939A55D9-6AB2-4364-AE5A-4B2CFFB043C1}" type="datetimeFigureOut">
               <a:rPr lang="de-DE" smtClean="0"/>
-              <a:t>07.09.2016</a:t>
+              <a:t>08.09.2016</a:t>
             </a:fld>
             <a:endParaRPr lang="de-DE"/>
           </a:p>
@@ -28626,7 +29439,7 @@
           <a:p>
             <a:fld id="{939A55D9-6AB2-4364-AE5A-4B2CFFB043C1}" type="datetimeFigureOut">
               <a:rPr lang="de-DE" smtClean="0"/>
-              <a:t>07.09.2016</a:t>
+              <a:t>08.09.2016</a:t>
             </a:fld>
             <a:endParaRPr lang="de-DE"/>
           </a:p>
@@ -28855,7 +29668,7 @@
           <a:p>
             <a:fld id="{939A55D9-6AB2-4364-AE5A-4B2CFFB043C1}" type="datetimeFigureOut">
               <a:rPr lang="de-DE" smtClean="0"/>
-              <a:t>07.09.2016</a:t>
+              <a:t>08.09.2016</a:t>
             </a:fld>
             <a:endParaRPr lang="de-DE"/>
           </a:p>
@@ -29219,7 +30032,7 @@
           <a:p>
             <a:fld id="{939A55D9-6AB2-4364-AE5A-4B2CFFB043C1}" type="datetimeFigureOut">
               <a:rPr lang="de-DE" smtClean="0"/>
-              <a:t>07.09.2016</a:t>
+              <a:t>08.09.2016</a:t>
             </a:fld>
             <a:endParaRPr lang="de-DE"/>
           </a:p>
@@ -29336,7 +30149,7 @@
           <a:p>
             <a:fld id="{939A55D9-6AB2-4364-AE5A-4B2CFFB043C1}" type="datetimeFigureOut">
               <a:rPr lang="de-DE" smtClean="0"/>
-              <a:t>07.09.2016</a:t>
+              <a:t>08.09.2016</a:t>
             </a:fld>
             <a:endParaRPr lang="de-DE"/>
           </a:p>
@@ -29431,7 +30244,7 @@
           <a:p>
             <a:fld id="{939A55D9-6AB2-4364-AE5A-4B2CFFB043C1}" type="datetimeFigureOut">
               <a:rPr lang="de-DE" smtClean="0"/>
-              <a:t>07.09.2016</a:t>
+              <a:t>08.09.2016</a:t>
             </a:fld>
             <a:endParaRPr lang="de-DE"/>
           </a:p>
@@ -29706,7 +30519,7 @@
           <a:p>
             <a:fld id="{939A55D9-6AB2-4364-AE5A-4B2CFFB043C1}" type="datetimeFigureOut">
               <a:rPr lang="de-DE" smtClean="0"/>
-              <a:t>07.09.2016</a:t>
+              <a:t>08.09.2016</a:t>
             </a:fld>
             <a:endParaRPr lang="de-DE"/>
           </a:p>
@@ -29958,7 +30771,7 @@
           <a:p>
             <a:fld id="{939A55D9-6AB2-4364-AE5A-4B2CFFB043C1}" type="datetimeFigureOut">
               <a:rPr lang="de-DE" smtClean="0"/>
-              <a:t>07.09.2016</a:t>
+              <a:t>08.09.2016</a:t>
             </a:fld>
             <a:endParaRPr lang="de-DE"/>
           </a:p>
@@ -30169,7 +30982,7 @@
           <a:p>
             <a:fld id="{939A55D9-6AB2-4364-AE5A-4B2CFFB043C1}" type="datetimeFigureOut">
               <a:rPr lang="de-DE" smtClean="0"/>
-              <a:t>07.09.2016</a:t>
+              <a:t>08.09.2016</a:t>
             </a:fld>
             <a:endParaRPr lang="de-DE"/>
           </a:p>
@@ -30583,7 +31396,7 @@
           <p:nvPr/>
         </p:nvPicPr>
         <p:blipFill rotWithShape="1">
-          <a:blip r:embed="rId2">
+          <a:blip r:embed="rId3">
             <a:extLst>
               <a:ext uri="{28A0092B-C50C-407E-A947-70E740481C1C}">
                 <a14:useLocalDpi xmlns:a14="http://schemas.microsoft.com/office/drawing/2010/main" val="0"/>
@@ -30622,7 +31435,7 @@
           <p:nvPr>
             <p:extLst>
               <p:ext uri="{386F3935-93C4-4BCD-93E2-E3B085C9AB24}">
-                <p16:designElem xmlns="" xmlns:p16="http://schemas.microsoft.com/office/powerpoint/2015/main" val="1"/>
+                <p16:designElem xmlns:p16="http://schemas.microsoft.com/office/powerpoint/2015/main" val="1"/>
               </p:ext>
             </p:extLst>
           </p:nvPr>
@@ -30755,7 +31568,7 @@
           <p:nvPr>
             <p:extLst>
               <p:ext uri="{386F3935-93C4-4BCD-93E2-E3B085C9AB24}">
-                <p16:designElem xmlns="" xmlns:p16="http://schemas.microsoft.com/office/powerpoint/2015/main" val="1"/>
+                <p16:designElem xmlns:p16="http://schemas.microsoft.com/office/powerpoint/2015/main" val="1"/>
               </p:ext>
             </p:extLst>
           </p:nvPr>
@@ -30906,127 +31719,34 @@
               </a:lnSpc>
             </a:pPr>
             <a:r>
-              <a:rPr lang="de-DE" sz="4400" b="1" dirty="0" smtClean="0">
+              <a:rPr lang="de-DE" sz="4400" b="1" dirty="0">
                 <a:latin typeface="Consolas" panose="020B0609020204030204" pitchFamily="49" charset="0"/>
                 <a:cs typeface="Consolas" panose="020B0609020204030204" pitchFamily="49" charset="0"/>
               </a:rPr>
-              <a:t>P  </a:t>
-            </a:r>
-            <a:r>
-              <a:rPr lang="de-DE" sz="4400" dirty="0" smtClean="0">
-                <a:latin typeface="Consolas" panose="020B0609020204030204" pitchFamily="49" charset="0"/>
-                <a:cs typeface="Consolas" panose="020B0609020204030204" pitchFamily="49" charset="0"/>
-              </a:rPr>
-              <a:t>A  M  S</a:t>
+              <a:t>P  A  M  S</a:t>
             </a:r>
             <a:br>
-              <a:rPr lang="de-DE" sz="4400" dirty="0" smtClean="0">
+              <a:rPr lang="de-DE" sz="4400" dirty="0">
                 <a:latin typeface="Consolas" panose="020B0609020204030204" pitchFamily="49" charset="0"/>
                 <a:cs typeface="Consolas" panose="020B0609020204030204" pitchFamily="49" charset="0"/>
               </a:rPr>
             </a:br>
             <a:r>
-              <a:rPr lang="de-DE" sz="4400" b="1" dirty="0" smtClean="0">
+              <a:rPr lang="de-DE" sz="4400" b="1" dirty="0">
                 <a:latin typeface="Consolas" panose="020B0609020204030204" pitchFamily="49" charset="0"/>
                 <a:cs typeface="Consolas" panose="020B0609020204030204" pitchFamily="49" charset="0"/>
               </a:rPr>
               <a:t>r  </a:t>
             </a:r>
             <a:r>
-              <a:rPr lang="de-DE" sz="4400" dirty="0" smtClean="0">
+              <a:rPr lang="de-DE" sz="4400" dirty="0">
                 <a:latin typeface="Consolas" panose="020B0609020204030204" pitchFamily="49" charset="0"/>
                 <a:cs typeface="Consolas" panose="020B0609020204030204" pitchFamily="49" charset="0"/>
               </a:rPr>
               <a:t>n  a  y</a:t>
             </a:r>
             <a:br>
-              <a:rPr lang="de-DE" sz="4400" dirty="0" smtClean="0">
-                <a:latin typeface="Consolas" panose="020B0609020204030204" pitchFamily="49" charset="0"/>
-                <a:cs typeface="Consolas" panose="020B0609020204030204" pitchFamily="49" charset="0"/>
-              </a:rPr>
-            </a:br>
-            <a:r>
-              <a:rPr lang="de-DE" sz="4400" dirty="0" smtClean="0">
-                <a:latin typeface="Consolas" panose="020B0609020204030204" pitchFamily="49" charset="0"/>
-                <a:cs typeface="Consolas" panose="020B0609020204030204" pitchFamily="49" charset="0"/>
-              </a:rPr>
-              <a:t>o</a:t>
-            </a:r>
-            <a:r>
-              <a:rPr lang="de-DE" sz="4400" b="1" dirty="0" smtClean="0">
-                <a:latin typeface="Consolas" panose="020B0609020204030204" pitchFamily="49" charset="0"/>
-                <a:cs typeface="Consolas" panose="020B0609020204030204" pitchFamily="49" charset="0"/>
-              </a:rPr>
-              <a:t>  t  n  s</a:t>
-            </a:r>
-            <a:r>
-              <a:rPr lang="de-DE" sz="4400" dirty="0" smtClean="0">
-                <a:latin typeface="Consolas" panose="020B0609020204030204" pitchFamily="49" charset="0"/>
-                <a:cs typeface="Consolas" panose="020B0609020204030204" pitchFamily="49" charset="0"/>
-              </a:rPr>
-              <a:t/>
-            </a:r>
-            <a:br>
-              <a:rPr lang="de-DE" sz="4400" dirty="0" smtClean="0">
-                <a:latin typeface="Consolas" panose="020B0609020204030204" pitchFamily="49" charset="0"/>
-                <a:cs typeface="Consolas" panose="020B0609020204030204" pitchFamily="49" charset="0"/>
-              </a:rPr>
-            </a:br>
-            <a:r>
-              <a:rPr lang="de-DE" sz="4400" dirty="0" smtClean="0">
-                <a:latin typeface="Consolas" panose="020B0609020204030204" pitchFamily="49" charset="0"/>
-                <a:cs typeface="Consolas" panose="020B0609020204030204" pitchFamily="49" charset="0"/>
-              </a:rPr>
-              <a:t>j</a:t>
-            </a:r>
-            <a:r>
-              <a:rPr lang="de-DE" sz="4400" dirty="0" smtClean="0">
-                <a:latin typeface="Consolas" panose="020B0609020204030204" pitchFamily="49" charset="0"/>
-                <a:cs typeface="Consolas" panose="020B0609020204030204" pitchFamily="49" charset="0"/>
-              </a:rPr>
-              <a:t>  r  a  t</a:t>
-            </a:r>
-            <a:br>
-              <a:rPr lang="de-DE" sz="4400" dirty="0" smtClean="0">
-                <a:latin typeface="Consolas" panose="020B0609020204030204" pitchFamily="49" charset="0"/>
-                <a:cs typeface="Consolas" panose="020B0609020204030204" pitchFamily="49" charset="0"/>
-              </a:rPr>
-            </a:br>
-            <a:r>
-              <a:rPr lang="de-DE" sz="4400" dirty="0" smtClean="0">
-                <a:latin typeface="Consolas" panose="020B0609020204030204" pitchFamily="49" charset="0"/>
-                <a:cs typeface="Consolas" panose="020B0609020204030204" pitchFamily="49" charset="0"/>
-              </a:rPr>
-              <a:t>e  a  g  e</a:t>
-            </a:r>
-            <a:br>
-              <a:rPr lang="de-DE" sz="4400" dirty="0" smtClean="0">
-                <a:latin typeface="Consolas" panose="020B0609020204030204" pitchFamily="49" charset="0"/>
-                <a:cs typeface="Consolas" panose="020B0609020204030204" pitchFamily="49" charset="0"/>
-              </a:rPr>
-            </a:br>
-            <a:r>
-              <a:rPr lang="de-DE" sz="4400" dirty="0" smtClean="0">
-                <a:latin typeface="Consolas" panose="020B0609020204030204" pitchFamily="49" charset="0"/>
-                <a:cs typeface="Consolas" panose="020B0609020204030204" pitchFamily="49" charset="0"/>
-              </a:rPr>
-              <a:t>k  g  e  m</a:t>
-            </a:r>
-            <a:br>
-              <a:rPr lang="de-DE" sz="4400" dirty="0" smtClean="0">
-                <a:latin typeface="Consolas" panose="020B0609020204030204" pitchFamily="49" charset="0"/>
-                <a:cs typeface="Consolas" panose="020B0609020204030204" pitchFamily="49" charset="0"/>
-              </a:rPr>
-            </a:br>
-            <a:r>
-              <a:rPr lang="de-DE" sz="4400" dirty="0" smtClean="0">
-                <a:latin typeface="Consolas" panose="020B0609020204030204" pitchFamily="49" charset="0"/>
-                <a:cs typeface="Consolas" panose="020B0609020204030204" pitchFamily="49" charset="0"/>
-              </a:rPr>
-              <a:t>t  s  m</a:t>
-            </a:r>
-            <a:br>
-              <a:rPr lang="de-DE" sz="4400" dirty="0" smtClean="0">
+              <a:rPr lang="de-DE" sz="4400" dirty="0">
                 <a:latin typeface="Consolas" panose="020B0609020204030204" pitchFamily="49" charset="0"/>
                 <a:cs typeface="Consolas" panose="020B0609020204030204" pitchFamily="49" charset="0"/>
               </a:rPr>
@@ -31036,17 +31756,17 @@
                 <a:latin typeface="Consolas" panose="020B0609020204030204" pitchFamily="49" charset="0"/>
                 <a:cs typeface="Consolas" panose="020B0609020204030204" pitchFamily="49" charset="0"/>
               </a:rPr>
-              <a:t> </a:t>
+              <a:t>o</a:t>
             </a:r>
             <a:r>
-              <a:rPr lang="de-DE" sz="4400" dirty="0" smtClean="0">
+              <a:rPr lang="de-DE" sz="4400" b="1" dirty="0">
                 <a:latin typeface="Consolas" panose="020B0609020204030204" pitchFamily="49" charset="0"/>
                 <a:cs typeface="Consolas" panose="020B0609020204030204" pitchFamily="49" charset="0"/>
               </a:rPr>
-              <a:t>     e</a:t>
+              <a:t>  t  n  s</a:t>
             </a:r>
             <a:br>
-              <a:rPr lang="de-DE" sz="4400" dirty="0" smtClean="0">
+              <a:rPr lang="de-DE" sz="4400" dirty="0">
                 <a:latin typeface="Consolas" panose="020B0609020204030204" pitchFamily="49" charset="0"/>
                 <a:cs typeface="Consolas" panose="020B0609020204030204" pitchFamily="49" charset="0"/>
               </a:rPr>
@@ -31056,17 +31776,10 @@
                 <a:latin typeface="Consolas" panose="020B0609020204030204" pitchFamily="49" charset="0"/>
                 <a:cs typeface="Consolas" panose="020B0609020204030204" pitchFamily="49" charset="0"/>
               </a:rPr>
-              <a:t> </a:t>
-            </a:r>
-            <a:r>
-              <a:rPr lang="de-DE" sz="4400" dirty="0" smtClean="0">
-                <a:latin typeface="Consolas" panose="020B0609020204030204" pitchFamily="49" charset="0"/>
-                <a:cs typeface="Consolas" panose="020B0609020204030204" pitchFamily="49" charset="0"/>
-              </a:rPr>
-              <a:t>     n</a:t>
+              <a:t>j  r  a  t</a:t>
             </a:r>
             <a:br>
-              <a:rPr lang="de-DE" sz="4400" dirty="0" smtClean="0">
+              <a:rPr lang="de-DE" sz="4400" dirty="0">
                 <a:latin typeface="Consolas" panose="020B0609020204030204" pitchFamily="49" charset="0"/>
                 <a:cs typeface="Consolas" panose="020B0609020204030204" pitchFamily="49" charset="0"/>
               </a:rPr>
@@ -31076,19 +31789,73 @@
                 <a:latin typeface="Consolas" panose="020B0609020204030204" pitchFamily="49" charset="0"/>
                 <a:cs typeface="Consolas" panose="020B0609020204030204" pitchFamily="49" charset="0"/>
               </a:rPr>
-              <a:t> </a:t>
+              <a:t>e  a  g  e</a:t>
             </a:r>
-            <a:r>
-              <a:rPr lang="de-DE" sz="4400" dirty="0" smtClean="0">
+            <a:br>
+              <a:rPr lang="de-DE" sz="4400" dirty="0">
                 <a:latin typeface="Consolas" panose="020B0609020204030204" pitchFamily="49" charset="0"/>
                 <a:cs typeface="Consolas" panose="020B0609020204030204" pitchFamily="49" charset="0"/>
               </a:rPr>
-              <a:t>     t</a:t>
+            </a:br>
+            <a:r>
+              <a:rPr lang="de-DE" sz="4400" dirty="0">
+                <a:latin typeface="Consolas" panose="020B0609020204030204" pitchFamily="49" charset="0"/>
+                <a:cs typeface="Consolas" panose="020B0609020204030204" pitchFamily="49" charset="0"/>
+              </a:rPr>
+              <a:t>k  g  e  m</a:t>
             </a:r>
-            <a:endParaRPr lang="de-DE" sz="4400" dirty="0">
-              <a:latin typeface="Consolas" panose="020B0609020204030204" pitchFamily="49" charset="0"/>
-              <a:cs typeface="Consolas" panose="020B0609020204030204" pitchFamily="49" charset="0"/>
-            </a:endParaRPr>
+            <a:br>
+              <a:rPr lang="de-DE" sz="4400" dirty="0">
+                <a:latin typeface="Consolas" panose="020B0609020204030204" pitchFamily="49" charset="0"/>
+                <a:cs typeface="Consolas" panose="020B0609020204030204" pitchFamily="49" charset="0"/>
+              </a:rPr>
+            </a:br>
+            <a:r>
+              <a:rPr lang="de-DE" sz="4400" dirty="0">
+                <a:latin typeface="Consolas" panose="020B0609020204030204" pitchFamily="49" charset="0"/>
+                <a:cs typeface="Consolas" panose="020B0609020204030204" pitchFamily="49" charset="0"/>
+              </a:rPr>
+              <a:t>t  s  m</a:t>
+            </a:r>
+            <a:br>
+              <a:rPr lang="de-DE" sz="4400" dirty="0">
+                <a:latin typeface="Consolas" panose="020B0609020204030204" pitchFamily="49" charset="0"/>
+                <a:cs typeface="Consolas" panose="020B0609020204030204" pitchFamily="49" charset="0"/>
+              </a:rPr>
+            </a:br>
+            <a:r>
+              <a:rPr lang="de-DE" sz="4400" dirty="0">
+                <a:latin typeface="Consolas" panose="020B0609020204030204" pitchFamily="49" charset="0"/>
+                <a:cs typeface="Consolas" panose="020B0609020204030204" pitchFamily="49" charset="0"/>
+              </a:rPr>
+              <a:t>      e</a:t>
+            </a:r>
+            <a:br>
+              <a:rPr lang="de-DE" sz="4400" dirty="0">
+                <a:latin typeface="Consolas" panose="020B0609020204030204" pitchFamily="49" charset="0"/>
+                <a:cs typeface="Consolas" panose="020B0609020204030204" pitchFamily="49" charset="0"/>
+              </a:rPr>
+            </a:br>
+            <a:r>
+              <a:rPr lang="de-DE" sz="4400" dirty="0">
+                <a:latin typeface="Consolas" panose="020B0609020204030204" pitchFamily="49" charset="0"/>
+                <a:cs typeface="Consolas" panose="020B0609020204030204" pitchFamily="49" charset="0"/>
+              </a:rPr>
+              <a:t>      n</a:t>
+            </a:r>
+            <a:br>
+              <a:rPr lang="de-DE" sz="4400" dirty="0">
+                <a:latin typeface="Consolas" panose="020B0609020204030204" pitchFamily="49" charset="0"/>
+                <a:cs typeface="Consolas" panose="020B0609020204030204" pitchFamily="49" charset="0"/>
+              </a:rPr>
+            </a:br>
+            <a:r>
+              <a:rPr lang="de-DE" sz="4400" dirty="0">
+                <a:latin typeface="Consolas" panose="020B0609020204030204" pitchFamily="49" charset="0"/>
+                <a:cs typeface="Consolas" panose="020B0609020204030204" pitchFamily="49" charset="0"/>
+              </a:rPr>
+              <a:t>      t</a:t>
+            </a:r>
           </a:p>
         </p:txBody>
       </p:sp>
@@ -31150,18 +31917,11 @@
   <p:clrMapOvr>
     <a:overrideClrMapping bg1="dk1" tx1="lt1" bg2="dk2" tx2="lt2" accent1="accent1" accent2="accent2" accent3="accent3" accent4="accent4" accent5="accent5" accent6="accent6" hlink="hlink" folHlink="folHlink"/>
   </p:clrMapOvr>
-  <p:timing>
-    <p:tnLst>
-      <p:par>
-        <p:cTn id="1" dur="indefinite" restart="never" nodeType="tmRoot"/>
-      </p:par>
-    </p:tnLst>
-  </p:timing>
 </p:sld>
 </file>
 
 <file path=ppt/slides/slide10.xml><?xml version="1.0" encoding="utf-8"?>
-<p:sld xmlns:a="http://schemas.openxmlformats.org/drawingml/2006/main" xmlns:r="http://schemas.openxmlformats.org/officeDocument/2006/relationships" xmlns:p="http://schemas.openxmlformats.org/presentationml/2006/main">
+<p:sld xmlns:a="http://schemas.openxmlformats.org/drawingml/2006/main" xmlns:r="http://schemas.openxmlformats.org/officeDocument/2006/relationships" xmlns:p="http://schemas.openxmlformats.org/presentationml/2006/main" show="0">
   <p:cSld>
     <p:spTree>
       <p:nvGrpSpPr>
@@ -31270,17 +32030,1131 @@
   <p:clrMapOvr>
     <a:masterClrMapping/>
   </p:clrMapOvr>
-  <p:timing>
-    <p:tnLst>
-      <p:par>
-        <p:cTn id="1" dur="indefinite" restart="never" nodeType="tmRoot"/>
-      </p:par>
-    </p:tnLst>
-  </p:timing>
 </p:sld>
 </file>
 
 <file path=ppt/slides/slide11.xml><?xml version="1.0" encoding="utf-8"?>
+<p:sld xmlns:a="http://schemas.openxmlformats.org/drawingml/2006/main" xmlns:r="http://schemas.openxmlformats.org/officeDocument/2006/relationships" xmlns:p="http://schemas.openxmlformats.org/presentationml/2006/main">
+  <p:cSld>
+    <p:spTree>
+      <p:nvGrpSpPr>
+        <p:cNvPr id="1" name=""/>
+        <p:cNvGrpSpPr/>
+        <p:nvPr/>
+      </p:nvGrpSpPr>
+      <p:grpSpPr>
+        <a:xfrm>
+          <a:off x="0" y="0"/>
+          <a:ext cx="0" cy="0"/>
+          <a:chOff x="0" y="0"/>
+          <a:chExt cx="0" cy="0"/>
+        </a:xfrm>
+      </p:grpSpPr>
+      <p:sp>
+        <p:nvSpPr>
+          <p:cNvPr id="2" name="Titel 1"/>
+          <p:cNvSpPr>
+            <a:spLocks noGrp="1"/>
+          </p:cNvSpPr>
+          <p:nvPr>
+            <p:ph type="title"/>
+          </p:nvPr>
+        </p:nvSpPr>
+        <p:spPr/>
+        <p:txBody>
+          <a:bodyPr/>
+          <a:lstStyle/>
+          <a:p>
+            <a:r>
+              <a:rPr lang="de-DE" dirty="0">
+                <a:solidFill>
+                  <a:srgbClr val="009CA2"/>
+                </a:solidFill>
+              </a:rPr>
+              <a:t>Was werden wir Ihnen zeigen?</a:t>
+            </a:r>
+          </a:p>
+        </p:txBody>
+      </p:sp>
+      <p:sp>
+        <p:nvSpPr>
+          <p:cNvPr id="3" name="Inhaltsplatzhalter 2"/>
+          <p:cNvSpPr>
+            <a:spLocks noGrp="1"/>
+          </p:cNvSpPr>
+          <p:nvPr>
+            <p:ph idx="1"/>
+          </p:nvPr>
+        </p:nvSpPr>
+        <p:spPr/>
+        <p:txBody>
+          <a:bodyPr/>
+          <a:lstStyle/>
+          <a:p>
+            <a:pPr marL="0" indent="0">
+              <a:buNone/>
+            </a:pPr>
+            <a:r>
+              <a:rPr lang="de-DE" dirty="0"/>
+              <a:t>1.</a:t>
+            </a:r>
+          </a:p>
+        </p:txBody>
+      </p:sp>
+      <p:pic>
+        <p:nvPicPr>
+          <p:cNvPr id="1026" name="Picture 2" descr="https://image.freepik.com/freie-ikonen/mitarbeiter_318-2085.jpg"/>
+          <p:cNvPicPr>
+            <a:picLocks noChangeAspect="1" noChangeArrowheads="1"/>
+          </p:cNvPicPr>
+          <p:nvPr/>
+        </p:nvPicPr>
+        <p:blipFill>
+          <a:blip r:embed="rId3">
+            <a:extLst>
+              <a:ext uri="{28A0092B-C50C-407E-A947-70E740481C1C}">
+                <a14:useLocalDpi xmlns:a14="http://schemas.microsoft.com/office/drawing/2010/main" val="0"/>
+              </a:ext>
+            </a:extLst>
+          </a:blip>
+          <a:srcRect/>
+          <a:stretch>
+            <a:fillRect/>
+          </a:stretch>
+        </p:blipFill>
+        <p:spPr bwMode="auto">
+          <a:xfrm>
+            <a:off x="1057699" y="2474260"/>
+            <a:ext cx="2694347" cy="3176387"/>
+          </a:xfrm>
+          <a:prstGeom prst="rect">
+            <a:avLst/>
+          </a:prstGeom>
+          <a:noFill/>
+          <a:extLst>
+            <a:ext uri="{909E8E84-426E-40DD-AFC4-6F175D3DCCD1}">
+              <a14:hiddenFill xmlns:a14="http://schemas.microsoft.com/office/drawing/2010/main">
+                <a:solidFill>
+                  <a:srgbClr val="FFFFFF"/>
+                </a:solidFill>
+              </a14:hiddenFill>
+            </a:ext>
+          </a:extLst>
+        </p:spPr>
+      </p:pic>
+      <p:sp>
+        <p:nvSpPr>
+          <p:cNvPr id="4" name="Textfeld 3"/>
+          <p:cNvSpPr txBox="1"/>
+          <p:nvPr/>
+        </p:nvSpPr>
+        <p:spPr>
+          <a:xfrm>
+            <a:off x="1535124" y="5281315"/>
+            <a:ext cx="1739496" cy="369332"/>
+          </a:xfrm>
+          <a:prstGeom prst="rect">
+            <a:avLst/>
+          </a:prstGeom>
+          <a:noFill/>
+        </p:spPr>
+        <p:txBody>
+          <a:bodyPr wrap="square" rtlCol="0">
+            <a:spAutoFit/>
+          </a:bodyPr>
+          <a:lstStyle/>
+          <a:p>
+            <a:r>
+              <a:rPr lang="de-DE" dirty="0"/>
+              <a:t>Mitarbeiter Paul</a:t>
+            </a:r>
+          </a:p>
+        </p:txBody>
+      </p:sp>
+      <p:sp>
+        <p:nvSpPr>
+          <p:cNvPr id="5" name="Wolkenförmige Legende 4"/>
+          <p:cNvSpPr/>
+          <p:nvPr/>
+        </p:nvSpPr>
+        <p:spPr>
+          <a:xfrm>
+            <a:off x="2797195" y="2062194"/>
+            <a:ext cx="2049691" cy="1411331"/>
+          </a:xfrm>
+          <a:prstGeom prst="cloudCallout">
+            <a:avLst>
+              <a:gd name="adj1" fmla="val -43738"/>
+              <a:gd name="adj2" fmla="val 54067"/>
+            </a:avLst>
+          </a:prstGeom>
+          <a:noFill/>
+          <a:ln>
+            <a:solidFill>
+              <a:srgbClr val="009CA2"/>
+            </a:solidFill>
+          </a:ln>
+        </p:spPr>
+        <p:style>
+          <a:lnRef idx="2">
+            <a:schemeClr val="accent1">
+              <a:shade val="50000"/>
+            </a:schemeClr>
+          </a:lnRef>
+          <a:fillRef idx="1">
+            <a:schemeClr val="accent1"/>
+          </a:fillRef>
+          <a:effectRef idx="0">
+            <a:schemeClr val="accent1"/>
+          </a:effectRef>
+          <a:fontRef idx="minor">
+            <a:schemeClr val="lt1"/>
+          </a:fontRef>
+        </p:style>
+        <p:txBody>
+          <a:bodyPr rtlCol="0" anchor="ctr"/>
+          <a:lstStyle/>
+          <a:p>
+            <a:pPr algn="ctr"/>
+            <a:r>
+              <a:rPr lang="de-DE" dirty="0">
+                <a:solidFill>
+                  <a:srgbClr val="009CA2"/>
+                </a:solidFill>
+              </a:rPr>
+              <a:t>Idee</a:t>
+            </a:r>
+          </a:p>
+        </p:txBody>
+      </p:sp>
+      <p:cxnSp>
+        <p:nvCxnSpPr>
+          <p:cNvPr id="7" name="Gerade Verbindung mit Pfeil 6"/>
+          <p:cNvCxnSpPr/>
+          <p:nvPr/>
+        </p:nvCxnSpPr>
+        <p:spPr>
+          <a:xfrm>
+            <a:off x="3338713" y="4377978"/>
+            <a:ext cx="4884027" cy="0"/>
+          </a:xfrm>
+          <a:prstGeom prst="straightConnector1">
+            <a:avLst/>
+          </a:prstGeom>
+          <a:ln w="28575">
+            <a:solidFill>
+              <a:srgbClr val="009CA2"/>
+            </a:solidFill>
+            <a:tailEnd type="triangle"/>
+          </a:ln>
+        </p:spPr>
+        <p:style>
+          <a:lnRef idx="1">
+            <a:schemeClr val="accent1"/>
+          </a:lnRef>
+          <a:fillRef idx="0">
+            <a:schemeClr val="accent1"/>
+          </a:fillRef>
+          <a:effectRef idx="0">
+            <a:schemeClr val="accent1"/>
+          </a:effectRef>
+          <a:fontRef idx="minor">
+            <a:schemeClr val="tx1"/>
+          </a:fontRef>
+        </p:style>
+      </p:cxnSp>
+      <p:pic>
+        <p:nvPicPr>
+          <p:cNvPr id="9" name="Picture 4" descr="https://image.freepik.com/freie-ikonen/computer-bildschirm_318-32677.png"/>
+          <p:cNvPicPr>
+            <a:picLocks noChangeAspect="1" noChangeArrowheads="1"/>
+          </p:cNvPicPr>
+          <p:nvPr/>
+        </p:nvPicPr>
+        <p:blipFill>
+          <a:blip r:embed="rId4">
+            <a:extLst>
+              <a:ext uri="{28A0092B-C50C-407E-A947-70E740481C1C}">
+                <a14:useLocalDpi xmlns:a14="http://schemas.microsoft.com/office/drawing/2010/main" val="0"/>
+              </a:ext>
+            </a:extLst>
+          </a:blip>
+          <a:srcRect/>
+          <a:stretch>
+            <a:fillRect/>
+          </a:stretch>
+        </p:blipFill>
+        <p:spPr bwMode="auto">
+          <a:xfrm>
+            <a:off x="8356436" y="2962272"/>
+            <a:ext cx="2831412" cy="2831412"/>
+          </a:xfrm>
+          <a:prstGeom prst="rect">
+            <a:avLst/>
+          </a:prstGeom>
+          <a:noFill/>
+          <a:extLst>
+            <a:ext uri="{909E8E84-426E-40DD-AFC4-6F175D3DCCD1}">
+              <a14:hiddenFill xmlns:a14="http://schemas.microsoft.com/office/drawing/2010/main">
+                <a:solidFill>
+                  <a:srgbClr val="FFFFFF"/>
+                </a:solidFill>
+              </a14:hiddenFill>
+            </a:ext>
+          </a:extLst>
+        </p:spPr>
+      </p:pic>
+      <p:sp>
+        <p:nvSpPr>
+          <p:cNvPr id="10" name="Rechteck 9"/>
+          <p:cNvSpPr/>
+          <p:nvPr/>
+        </p:nvSpPr>
+        <p:spPr>
+          <a:xfrm>
+            <a:off x="9003410" y="3703907"/>
+            <a:ext cx="1622244" cy="1105205"/>
+          </a:xfrm>
+          <a:prstGeom prst="rect">
+            <a:avLst/>
+          </a:prstGeom>
+          <a:noFill/>
+          <a:ln w="38100">
+            <a:solidFill>
+              <a:schemeClr val="bg1"/>
+            </a:solidFill>
+          </a:ln>
+        </p:spPr>
+        <p:style>
+          <a:lnRef idx="2">
+            <a:schemeClr val="accent1">
+              <a:shade val="50000"/>
+            </a:schemeClr>
+          </a:lnRef>
+          <a:fillRef idx="1">
+            <a:schemeClr val="accent1"/>
+          </a:fillRef>
+          <a:effectRef idx="0">
+            <a:schemeClr val="accent1"/>
+          </a:effectRef>
+          <a:fontRef idx="minor">
+            <a:schemeClr val="lt1"/>
+          </a:fontRef>
+        </p:style>
+        <p:txBody>
+          <a:bodyPr rtlCol="0" anchor="ctr"/>
+          <a:lstStyle/>
+          <a:p>
+            <a:pPr algn="ctr"/>
+            <a:r>
+              <a:rPr lang="de-DE" sz="2400" dirty="0">
+                <a:solidFill>
+                  <a:srgbClr val="009CA2"/>
+                </a:solidFill>
+              </a:rPr>
+              <a:t>PAMS</a:t>
+            </a:r>
+          </a:p>
+        </p:txBody>
+      </p:sp>
+      <p:sp>
+        <p:nvSpPr>
+          <p:cNvPr id="8" name="Textfeld 7"/>
+          <p:cNvSpPr txBox="1"/>
+          <p:nvPr/>
+        </p:nvSpPr>
+        <p:spPr>
+          <a:xfrm>
+            <a:off x="4980065" y="3873709"/>
+            <a:ext cx="1601321" cy="369332"/>
+          </a:xfrm>
+          <a:prstGeom prst="rect">
+            <a:avLst/>
+          </a:prstGeom>
+          <a:noFill/>
+        </p:spPr>
+        <p:txBody>
+          <a:bodyPr wrap="square" rtlCol="0">
+            <a:spAutoFit/>
+          </a:bodyPr>
+          <a:lstStyle/>
+          <a:p>
+            <a:r>
+              <a:rPr lang="de-DE" dirty="0"/>
+              <a:t>Anlegen </a:t>
+            </a:r>
+            <a:r>
+              <a:rPr lang="de-DE" dirty="0">
+                <a:sym typeface="Wingdings" panose="05000000000000000000" pitchFamily="2" charset="2"/>
+              </a:rPr>
+              <a:t></a:t>
+            </a:r>
+            <a:endParaRPr lang="de-DE" dirty="0"/>
+          </a:p>
+        </p:txBody>
+      </p:sp>
+    </p:spTree>
+    <p:extLst>
+      <p:ext uri="{BB962C8B-B14F-4D97-AF65-F5344CB8AC3E}">
+        <p14:creationId xmlns:p14="http://schemas.microsoft.com/office/powerpoint/2010/main" val="1138784371"/>
+      </p:ext>
+    </p:extLst>
+  </p:cSld>
+  <p:clrMapOvr>
+    <a:masterClrMapping/>
+  </p:clrMapOvr>
+</p:sld>
+</file>
+
+<file path=ppt/slides/slide12.xml><?xml version="1.0" encoding="utf-8"?>
+<p:sld xmlns:a="http://schemas.openxmlformats.org/drawingml/2006/main" xmlns:r="http://schemas.openxmlformats.org/officeDocument/2006/relationships" xmlns:p="http://schemas.openxmlformats.org/presentationml/2006/main">
+  <p:cSld>
+    <p:spTree>
+      <p:nvGrpSpPr>
+        <p:cNvPr id="1" name=""/>
+        <p:cNvGrpSpPr/>
+        <p:nvPr/>
+      </p:nvGrpSpPr>
+      <p:grpSpPr>
+        <a:xfrm>
+          <a:off x="0" y="0"/>
+          <a:ext cx="0" cy="0"/>
+          <a:chOff x="0" y="0"/>
+          <a:chExt cx="0" cy="0"/>
+        </a:xfrm>
+      </p:grpSpPr>
+      <p:sp>
+        <p:nvSpPr>
+          <p:cNvPr id="2" name="Titel 1"/>
+          <p:cNvSpPr>
+            <a:spLocks noGrp="1"/>
+          </p:cNvSpPr>
+          <p:nvPr>
+            <p:ph type="title"/>
+          </p:nvPr>
+        </p:nvSpPr>
+        <p:spPr/>
+        <p:txBody>
+          <a:bodyPr/>
+          <a:lstStyle/>
+          <a:p>
+            <a:r>
+              <a:rPr lang="de-DE" dirty="0">
+                <a:solidFill>
+                  <a:srgbClr val="009CA2"/>
+                </a:solidFill>
+              </a:rPr>
+              <a:t>Was werden wir Ihnen zeigen?</a:t>
+            </a:r>
+            <a:endParaRPr lang="de-DE" dirty="0"/>
+          </a:p>
+        </p:txBody>
+      </p:sp>
+      <p:sp>
+        <p:nvSpPr>
+          <p:cNvPr id="3" name="Inhaltsplatzhalter 2"/>
+          <p:cNvSpPr>
+            <a:spLocks noGrp="1"/>
+          </p:cNvSpPr>
+          <p:nvPr>
+            <p:ph idx="1"/>
+          </p:nvPr>
+        </p:nvSpPr>
+        <p:spPr/>
+        <p:txBody>
+          <a:bodyPr/>
+          <a:lstStyle/>
+          <a:p>
+            <a:pPr marL="0" indent="0">
+              <a:buNone/>
+            </a:pPr>
+            <a:r>
+              <a:rPr lang="de-DE" dirty="0"/>
+              <a:t>2.</a:t>
+            </a:r>
+          </a:p>
+        </p:txBody>
+      </p:sp>
+      <p:pic>
+        <p:nvPicPr>
+          <p:cNvPr id="3074" name="Picture 2" descr="https://d30y9cdsu7xlg0.cloudfront.net/png/95188-200.png"/>
+          <p:cNvPicPr>
+            <a:picLocks noChangeAspect="1" noChangeArrowheads="1"/>
+          </p:cNvPicPr>
+          <p:nvPr/>
+        </p:nvPicPr>
+        <p:blipFill>
+          <a:blip r:embed="rId3">
+            <a:extLst>
+              <a:ext uri="{28A0092B-C50C-407E-A947-70E740481C1C}">
+                <a14:useLocalDpi xmlns:a14="http://schemas.microsoft.com/office/drawing/2010/main" val="0"/>
+              </a:ext>
+            </a:extLst>
+          </a:blip>
+          <a:srcRect/>
+          <a:stretch>
+            <a:fillRect/>
+          </a:stretch>
+        </p:blipFill>
+        <p:spPr bwMode="auto">
+          <a:xfrm>
+            <a:off x="1039554" y="3048793"/>
+            <a:ext cx="2391533" cy="2391533"/>
+          </a:xfrm>
+          <a:prstGeom prst="rect">
+            <a:avLst/>
+          </a:prstGeom>
+          <a:noFill/>
+          <a:extLst>
+            <a:ext uri="{909E8E84-426E-40DD-AFC4-6F175D3DCCD1}">
+              <a14:hiddenFill xmlns:a14="http://schemas.microsoft.com/office/drawing/2010/main">
+                <a:solidFill>
+                  <a:srgbClr val="FFFFFF"/>
+                </a:solidFill>
+              </a14:hiddenFill>
+            </a:ext>
+          </a:extLst>
+        </p:spPr>
+      </p:pic>
+      <p:sp>
+        <p:nvSpPr>
+          <p:cNvPr id="6" name="Wolkenförmige Legende 5"/>
+          <p:cNvSpPr/>
+          <p:nvPr/>
+        </p:nvSpPr>
+        <p:spPr>
+          <a:xfrm>
+            <a:off x="2953950" y="2009941"/>
+            <a:ext cx="2049691" cy="1411331"/>
+          </a:xfrm>
+          <a:prstGeom prst="cloudCallout">
+            <a:avLst>
+              <a:gd name="adj1" fmla="val -60308"/>
+              <a:gd name="adj2" fmla="val 52216"/>
+            </a:avLst>
+          </a:prstGeom>
+          <a:noFill/>
+          <a:ln>
+            <a:solidFill>
+              <a:srgbClr val="009CA2"/>
+            </a:solidFill>
+          </a:ln>
+        </p:spPr>
+        <p:style>
+          <a:lnRef idx="2">
+            <a:schemeClr val="accent1">
+              <a:shade val="50000"/>
+            </a:schemeClr>
+          </a:lnRef>
+          <a:fillRef idx="1">
+            <a:schemeClr val="accent1"/>
+          </a:fillRef>
+          <a:effectRef idx="0">
+            <a:schemeClr val="accent1"/>
+          </a:effectRef>
+          <a:fontRef idx="minor">
+            <a:schemeClr val="lt1"/>
+          </a:fontRef>
+        </p:style>
+        <p:txBody>
+          <a:bodyPr rtlCol="0" anchor="ctr"/>
+          <a:lstStyle/>
+          <a:p>
+            <a:pPr algn="ctr"/>
+            <a:r>
+              <a:rPr lang="de-DE" dirty="0">
+                <a:solidFill>
+                  <a:srgbClr val="009CA2"/>
+                </a:solidFill>
+              </a:rPr>
+              <a:t>Projekte?</a:t>
+            </a:r>
+          </a:p>
+        </p:txBody>
+      </p:sp>
+      <p:sp>
+        <p:nvSpPr>
+          <p:cNvPr id="7" name="Textfeld 6"/>
+          <p:cNvSpPr txBox="1"/>
+          <p:nvPr/>
+        </p:nvSpPr>
+        <p:spPr>
+          <a:xfrm>
+            <a:off x="1077505" y="5390597"/>
+            <a:ext cx="2261208" cy="369332"/>
+          </a:xfrm>
+          <a:prstGeom prst="rect">
+            <a:avLst/>
+          </a:prstGeom>
+          <a:noFill/>
+        </p:spPr>
+        <p:txBody>
+          <a:bodyPr wrap="square" rtlCol="0">
+            <a:spAutoFit/>
+          </a:bodyPr>
+          <a:lstStyle/>
+          <a:p>
+            <a:r>
+              <a:rPr lang="de-DE" dirty="0"/>
+              <a:t>Führungskraft Martin</a:t>
+            </a:r>
+          </a:p>
+        </p:txBody>
+      </p:sp>
+      <p:cxnSp>
+        <p:nvCxnSpPr>
+          <p:cNvPr id="8" name="Gerade Verbindung mit Pfeil 7"/>
+          <p:cNvCxnSpPr/>
+          <p:nvPr/>
+        </p:nvCxnSpPr>
+        <p:spPr>
+          <a:xfrm>
+            <a:off x="3338713" y="4377978"/>
+            <a:ext cx="4884027" cy="0"/>
+          </a:xfrm>
+          <a:prstGeom prst="straightConnector1">
+            <a:avLst/>
+          </a:prstGeom>
+          <a:ln w="28575">
+            <a:solidFill>
+              <a:srgbClr val="009CA2"/>
+            </a:solidFill>
+            <a:tailEnd type="triangle"/>
+          </a:ln>
+        </p:spPr>
+        <p:style>
+          <a:lnRef idx="1">
+            <a:schemeClr val="accent1"/>
+          </a:lnRef>
+          <a:fillRef idx="0">
+            <a:schemeClr val="accent1"/>
+          </a:fillRef>
+          <a:effectRef idx="0">
+            <a:schemeClr val="accent1"/>
+          </a:effectRef>
+          <a:fontRef idx="minor">
+            <a:schemeClr val="tx1"/>
+          </a:fontRef>
+        </p:style>
+      </p:cxnSp>
+      <p:pic>
+        <p:nvPicPr>
+          <p:cNvPr id="9" name="Picture 4" descr="https://image.freepik.com/freie-ikonen/computer-bildschirm_318-32677.png"/>
+          <p:cNvPicPr>
+            <a:picLocks noChangeAspect="1" noChangeArrowheads="1"/>
+          </p:cNvPicPr>
+          <p:nvPr/>
+        </p:nvPicPr>
+        <p:blipFill>
+          <a:blip r:embed="rId4">
+            <a:extLst>
+              <a:ext uri="{28A0092B-C50C-407E-A947-70E740481C1C}">
+                <a14:useLocalDpi xmlns:a14="http://schemas.microsoft.com/office/drawing/2010/main" val="0"/>
+              </a:ext>
+            </a:extLst>
+          </a:blip>
+          <a:srcRect/>
+          <a:stretch>
+            <a:fillRect/>
+          </a:stretch>
+        </p:blipFill>
+        <p:spPr bwMode="auto">
+          <a:xfrm>
+            <a:off x="8356436" y="2962272"/>
+            <a:ext cx="2831412" cy="2831412"/>
+          </a:xfrm>
+          <a:prstGeom prst="rect">
+            <a:avLst/>
+          </a:prstGeom>
+          <a:noFill/>
+          <a:extLst>
+            <a:ext uri="{909E8E84-426E-40DD-AFC4-6F175D3DCCD1}">
+              <a14:hiddenFill xmlns:a14="http://schemas.microsoft.com/office/drawing/2010/main">
+                <a:solidFill>
+                  <a:srgbClr val="FFFFFF"/>
+                </a:solidFill>
+              </a14:hiddenFill>
+            </a:ext>
+          </a:extLst>
+        </p:spPr>
+      </p:pic>
+      <p:sp>
+        <p:nvSpPr>
+          <p:cNvPr id="10" name="Rechteck 9"/>
+          <p:cNvSpPr/>
+          <p:nvPr/>
+        </p:nvSpPr>
+        <p:spPr>
+          <a:xfrm>
+            <a:off x="9003410" y="3703907"/>
+            <a:ext cx="1622244" cy="1105205"/>
+          </a:xfrm>
+          <a:prstGeom prst="rect">
+            <a:avLst/>
+          </a:prstGeom>
+          <a:noFill/>
+          <a:ln w="38100">
+            <a:solidFill>
+              <a:schemeClr val="bg1"/>
+            </a:solidFill>
+          </a:ln>
+        </p:spPr>
+        <p:style>
+          <a:lnRef idx="2">
+            <a:schemeClr val="accent1">
+              <a:shade val="50000"/>
+            </a:schemeClr>
+          </a:lnRef>
+          <a:fillRef idx="1">
+            <a:schemeClr val="accent1"/>
+          </a:fillRef>
+          <a:effectRef idx="0">
+            <a:schemeClr val="accent1"/>
+          </a:effectRef>
+          <a:fontRef idx="minor">
+            <a:schemeClr val="lt1"/>
+          </a:fontRef>
+        </p:style>
+        <p:txBody>
+          <a:bodyPr rtlCol="0" anchor="ctr"/>
+          <a:lstStyle/>
+          <a:p>
+            <a:pPr algn="ctr"/>
+            <a:r>
+              <a:rPr lang="de-DE" sz="2400" dirty="0">
+                <a:solidFill>
+                  <a:srgbClr val="009CA2"/>
+                </a:solidFill>
+              </a:rPr>
+              <a:t>PAMS</a:t>
+            </a:r>
+          </a:p>
+        </p:txBody>
+      </p:sp>
+      <p:sp>
+        <p:nvSpPr>
+          <p:cNvPr id="11" name="Textfeld 10"/>
+          <p:cNvSpPr txBox="1"/>
+          <p:nvPr/>
+        </p:nvSpPr>
+        <p:spPr>
+          <a:xfrm>
+            <a:off x="4569439" y="3941178"/>
+            <a:ext cx="2648644" cy="369332"/>
+          </a:xfrm>
+          <a:prstGeom prst="rect">
+            <a:avLst/>
+          </a:prstGeom>
+          <a:noFill/>
+        </p:spPr>
+        <p:txBody>
+          <a:bodyPr wrap="square" rtlCol="0">
+            <a:spAutoFit/>
+          </a:bodyPr>
+          <a:lstStyle/>
+          <a:p>
+            <a:r>
+              <a:rPr lang="de-DE" dirty="0"/>
+              <a:t>Überblick / Statistiken </a:t>
+            </a:r>
+            <a:r>
+              <a:rPr lang="de-DE" dirty="0">
+                <a:sym typeface="Wingdings" panose="05000000000000000000" pitchFamily="2" charset="2"/>
+              </a:rPr>
+              <a:t></a:t>
+            </a:r>
+            <a:endParaRPr lang="de-DE" dirty="0"/>
+          </a:p>
+        </p:txBody>
+      </p:sp>
+    </p:spTree>
+    <p:extLst>
+      <p:ext uri="{BB962C8B-B14F-4D97-AF65-F5344CB8AC3E}">
+        <p14:creationId xmlns:p14="http://schemas.microsoft.com/office/powerpoint/2010/main" val="1022683089"/>
+      </p:ext>
+    </p:extLst>
+  </p:cSld>
+  <p:clrMapOvr>
+    <a:masterClrMapping/>
+  </p:clrMapOvr>
+</p:sld>
+</file>
+
+<file path=ppt/slides/slide13.xml><?xml version="1.0" encoding="utf-8"?>
+<p:sld xmlns:a="http://schemas.openxmlformats.org/drawingml/2006/main" xmlns:r="http://schemas.openxmlformats.org/officeDocument/2006/relationships" xmlns:p="http://schemas.openxmlformats.org/presentationml/2006/main">
+  <p:cSld>
+    <p:spTree>
+      <p:nvGrpSpPr>
+        <p:cNvPr id="1" name=""/>
+        <p:cNvGrpSpPr/>
+        <p:nvPr/>
+      </p:nvGrpSpPr>
+      <p:grpSpPr>
+        <a:xfrm>
+          <a:off x="0" y="0"/>
+          <a:ext cx="0" cy="0"/>
+          <a:chOff x="0" y="0"/>
+          <a:chExt cx="0" cy="0"/>
+        </a:xfrm>
+      </p:grpSpPr>
+      <p:sp>
+        <p:nvSpPr>
+          <p:cNvPr id="2" name="Titel 1"/>
+          <p:cNvSpPr>
+            <a:spLocks noGrp="1"/>
+          </p:cNvSpPr>
+          <p:nvPr>
+            <p:ph type="title"/>
+          </p:nvPr>
+        </p:nvSpPr>
+        <p:spPr/>
+        <p:txBody>
+          <a:bodyPr/>
+          <a:lstStyle/>
+          <a:p>
+            <a:r>
+              <a:rPr lang="de-DE" dirty="0">
+                <a:solidFill>
+                  <a:srgbClr val="009CA2"/>
+                </a:solidFill>
+              </a:rPr>
+              <a:t>Was werden wir Ihnen zeigen?</a:t>
+            </a:r>
+            <a:endParaRPr lang="de-DE" dirty="0"/>
+          </a:p>
+        </p:txBody>
+      </p:sp>
+      <p:sp>
+        <p:nvSpPr>
+          <p:cNvPr id="3" name="Inhaltsplatzhalter 2"/>
+          <p:cNvSpPr>
+            <a:spLocks noGrp="1"/>
+          </p:cNvSpPr>
+          <p:nvPr>
+            <p:ph idx="1"/>
+          </p:nvPr>
+        </p:nvSpPr>
+        <p:spPr/>
+        <p:txBody>
+          <a:bodyPr/>
+          <a:lstStyle/>
+          <a:p>
+            <a:pPr marL="0" indent="0">
+              <a:buNone/>
+            </a:pPr>
+            <a:r>
+              <a:rPr lang="de-DE" dirty="0"/>
+              <a:t>3. </a:t>
+            </a:r>
+          </a:p>
+        </p:txBody>
+      </p:sp>
+      <p:pic>
+        <p:nvPicPr>
+          <p:cNvPr id="5" name="Picture 2" descr="http://www.iconsdb.com/icons/preview/black/manager-xxl.png"/>
+          <p:cNvPicPr>
+            <a:picLocks noChangeAspect="1" noChangeArrowheads="1"/>
+          </p:cNvPicPr>
+          <p:nvPr/>
+        </p:nvPicPr>
+        <p:blipFill>
+          <a:blip r:embed="rId3">
+            <a:extLst>
+              <a:ext uri="{28A0092B-C50C-407E-A947-70E740481C1C}">
+                <a14:useLocalDpi xmlns:a14="http://schemas.microsoft.com/office/drawing/2010/main" val="0"/>
+              </a:ext>
+            </a:extLst>
+          </a:blip>
+          <a:srcRect/>
+          <a:stretch>
+            <a:fillRect/>
+          </a:stretch>
+        </p:blipFill>
+        <p:spPr bwMode="auto">
+          <a:xfrm>
+            <a:off x="1383867" y="3000266"/>
+            <a:ext cx="2062632" cy="2062632"/>
+          </a:xfrm>
+          <a:prstGeom prst="rect">
+            <a:avLst/>
+          </a:prstGeom>
+          <a:noFill/>
+          <a:extLst>
+            <a:ext uri="{909E8E84-426E-40DD-AFC4-6F175D3DCCD1}">
+              <a14:hiddenFill xmlns:a14="http://schemas.microsoft.com/office/drawing/2010/main">
+                <a:solidFill>
+                  <a:srgbClr val="FFFFFF"/>
+                </a:solidFill>
+              </a14:hiddenFill>
+            </a:ext>
+          </a:extLst>
+        </p:spPr>
+      </p:pic>
+      <p:sp>
+        <p:nvSpPr>
+          <p:cNvPr id="6" name="Wolkenförmige Legende 5"/>
+          <p:cNvSpPr/>
+          <p:nvPr/>
+        </p:nvSpPr>
+        <p:spPr>
+          <a:xfrm>
+            <a:off x="2862510" y="1983816"/>
+            <a:ext cx="2049691" cy="1411331"/>
+          </a:xfrm>
+          <a:prstGeom prst="cloudCallout">
+            <a:avLst>
+              <a:gd name="adj1" fmla="val -43738"/>
+              <a:gd name="adj2" fmla="val 54067"/>
+            </a:avLst>
+          </a:prstGeom>
+          <a:noFill/>
+          <a:ln>
+            <a:solidFill>
+              <a:srgbClr val="009CA2"/>
+            </a:solidFill>
+          </a:ln>
+        </p:spPr>
+        <p:style>
+          <a:lnRef idx="2">
+            <a:schemeClr val="accent1">
+              <a:shade val="50000"/>
+            </a:schemeClr>
+          </a:lnRef>
+          <a:fillRef idx="1">
+            <a:schemeClr val="accent1"/>
+          </a:fillRef>
+          <a:effectRef idx="0">
+            <a:schemeClr val="accent1"/>
+          </a:effectRef>
+          <a:fontRef idx="minor">
+            <a:schemeClr val="lt1"/>
+          </a:fontRef>
+        </p:style>
+        <p:txBody>
+          <a:bodyPr rtlCol="0" anchor="ctr"/>
+          <a:lstStyle/>
+          <a:p>
+            <a:pPr algn="ctr"/>
+            <a:r>
+              <a:rPr lang="de-DE" dirty="0">
+                <a:solidFill>
+                  <a:srgbClr val="009CA2"/>
+                </a:solidFill>
+              </a:rPr>
+              <a:t>Expansion</a:t>
+            </a:r>
+          </a:p>
+        </p:txBody>
+      </p:sp>
+      <p:sp>
+        <p:nvSpPr>
+          <p:cNvPr id="7" name="Textfeld 6"/>
+          <p:cNvSpPr txBox="1"/>
+          <p:nvPr/>
+        </p:nvSpPr>
+        <p:spPr>
+          <a:xfrm>
+            <a:off x="1214846" y="5250598"/>
+            <a:ext cx="2377440" cy="369332"/>
+          </a:xfrm>
+          <a:prstGeom prst="rect">
+            <a:avLst/>
+          </a:prstGeom>
+          <a:noFill/>
+        </p:spPr>
+        <p:txBody>
+          <a:bodyPr wrap="square" rtlCol="0">
+            <a:spAutoFit/>
+          </a:bodyPr>
+          <a:lstStyle/>
+          <a:p>
+            <a:r>
+              <a:rPr lang="de-DE" dirty="0"/>
+              <a:t>Geschäftsführer Fabian</a:t>
+            </a:r>
+          </a:p>
+        </p:txBody>
+      </p:sp>
+      <p:cxnSp>
+        <p:nvCxnSpPr>
+          <p:cNvPr id="8" name="Gerade Verbindung mit Pfeil 7"/>
+          <p:cNvCxnSpPr/>
+          <p:nvPr/>
+        </p:nvCxnSpPr>
+        <p:spPr>
+          <a:xfrm>
+            <a:off x="3338713" y="4377978"/>
+            <a:ext cx="4884027" cy="0"/>
+          </a:xfrm>
+          <a:prstGeom prst="straightConnector1">
+            <a:avLst/>
+          </a:prstGeom>
+          <a:ln w="28575">
+            <a:solidFill>
+              <a:srgbClr val="009CA2"/>
+            </a:solidFill>
+            <a:tailEnd type="triangle"/>
+          </a:ln>
+        </p:spPr>
+        <p:style>
+          <a:lnRef idx="1">
+            <a:schemeClr val="accent1"/>
+          </a:lnRef>
+          <a:fillRef idx="0">
+            <a:schemeClr val="accent1"/>
+          </a:fillRef>
+          <a:effectRef idx="0">
+            <a:schemeClr val="accent1"/>
+          </a:effectRef>
+          <a:fontRef idx="minor">
+            <a:schemeClr val="tx1"/>
+          </a:fontRef>
+        </p:style>
+      </p:cxnSp>
+      <p:pic>
+        <p:nvPicPr>
+          <p:cNvPr id="9" name="Picture 4" descr="https://image.freepik.com/freie-ikonen/computer-bildschirm_318-32677.png"/>
+          <p:cNvPicPr>
+            <a:picLocks noChangeAspect="1" noChangeArrowheads="1"/>
+          </p:cNvPicPr>
+          <p:nvPr/>
+        </p:nvPicPr>
+        <p:blipFill>
+          <a:blip r:embed="rId4">
+            <a:extLst>
+              <a:ext uri="{28A0092B-C50C-407E-A947-70E740481C1C}">
+                <a14:useLocalDpi xmlns:a14="http://schemas.microsoft.com/office/drawing/2010/main" val="0"/>
+              </a:ext>
+            </a:extLst>
+          </a:blip>
+          <a:srcRect/>
+          <a:stretch>
+            <a:fillRect/>
+          </a:stretch>
+        </p:blipFill>
+        <p:spPr bwMode="auto">
+          <a:xfrm>
+            <a:off x="8356436" y="2962272"/>
+            <a:ext cx="2831412" cy="2831412"/>
+          </a:xfrm>
+          <a:prstGeom prst="rect">
+            <a:avLst/>
+          </a:prstGeom>
+          <a:noFill/>
+          <a:extLst>
+            <a:ext uri="{909E8E84-426E-40DD-AFC4-6F175D3DCCD1}">
+              <a14:hiddenFill xmlns:a14="http://schemas.microsoft.com/office/drawing/2010/main">
+                <a:solidFill>
+                  <a:srgbClr val="FFFFFF"/>
+                </a:solidFill>
+              </a14:hiddenFill>
+            </a:ext>
+          </a:extLst>
+        </p:spPr>
+      </p:pic>
+      <p:sp>
+        <p:nvSpPr>
+          <p:cNvPr id="10" name="Rechteck 9"/>
+          <p:cNvSpPr/>
+          <p:nvPr/>
+        </p:nvSpPr>
+        <p:spPr>
+          <a:xfrm>
+            <a:off x="9003410" y="3703907"/>
+            <a:ext cx="1622244" cy="1105205"/>
+          </a:xfrm>
+          <a:prstGeom prst="rect">
+            <a:avLst/>
+          </a:prstGeom>
+          <a:noFill/>
+          <a:ln w="38100">
+            <a:solidFill>
+              <a:schemeClr val="bg1"/>
+            </a:solidFill>
+          </a:ln>
+        </p:spPr>
+        <p:style>
+          <a:lnRef idx="2">
+            <a:schemeClr val="accent1">
+              <a:shade val="50000"/>
+            </a:schemeClr>
+          </a:lnRef>
+          <a:fillRef idx="1">
+            <a:schemeClr val="accent1"/>
+          </a:fillRef>
+          <a:effectRef idx="0">
+            <a:schemeClr val="accent1"/>
+          </a:effectRef>
+          <a:fontRef idx="minor">
+            <a:schemeClr val="lt1"/>
+          </a:fontRef>
+        </p:style>
+        <p:txBody>
+          <a:bodyPr rtlCol="0" anchor="ctr"/>
+          <a:lstStyle/>
+          <a:p>
+            <a:pPr algn="ctr"/>
+            <a:r>
+              <a:rPr lang="de-DE" sz="2400" dirty="0">
+                <a:solidFill>
+                  <a:srgbClr val="009CA2"/>
+                </a:solidFill>
+              </a:rPr>
+              <a:t>PAMS</a:t>
+            </a:r>
+          </a:p>
+        </p:txBody>
+      </p:sp>
+      <p:sp>
+        <p:nvSpPr>
+          <p:cNvPr id="11" name="Textfeld 10"/>
+          <p:cNvSpPr txBox="1"/>
+          <p:nvPr/>
+        </p:nvSpPr>
+        <p:spPr>
+          <a:xfrm>
+            <a:off x="4980065" y="3873709"/>
+            <a:ext cx="1601321" cy="369332"/>
+          </a:xfrm>
+          <a:prstGeom prst="rect">
+            <a:avLst/>
+          </a:prstGeom>
+          <a:noFill/>
+        </p:spPr>
+        <p:txBody>
+          <a:bodyPr wrap="square" rtlCol="0">
+            <a:spAutoFit/>
+          </a:bodyPr>
+          <a:lstStyle/>
+          <a:p>
+            <a:r>
+              <a:rPr lang="de-DE" dirty="0"/>
+              <a:t>Erweitern </a:t>
+            </a:r>
+            <a:r>
+              <a:rPr lang="de-DE" dirty="0">
+                <a:sym typeface="Wingdings" panose="05000000000000000000" pitchFamily="2" charset="2"/>
+              </a:rPr>
+              <a:t></a:t>
+            </a:r>
+            <a:endParaRPr lang="de-DE" dirty="0"/>
+          </a:p>
+        </p:txBody>
+      </p:sp>
+    </p:spTree>
+    <p:extLst>
+      <p:ext uri="{BB962C8B-B14F-4D97-AF65-F5344CB8AC3E}">
+        <p14:creationId xmlns:p14="http://schemas.microsoft.com/office/powerpoint/2010/main" val="2922696379"/>
+      </p:ext>
+    </p:extLst>
+  </p:cSld>
+  <p:clrMapOvr>
+    <a:masterClrMapping/>
+  </p:clrMapOvr>
+</p:sld>
+</file>
+
+<file path=ppt/slides/slide14.xml><?xml version="1.0" encoding="utf-8"?>
 <p:sld xmlns:a="http://schemas.openxmlformats.org/drawingml/2006/main" xmlns:r="http://schemas.openxmlformats.org/officeDocument/2006/relationships" xmlns:p="http://schemas.openxmlformats.org/presentationml/2006/main">
   <p:cSld>
     <p:spTree>
@@ -31341,17 +33215,10 @@
   <p:clrMapOvr>
     <a:masterClrMapping/>
   </p:clrMapOvr>
-  <p:timing>
-    <p:tnLst>
-      <p:par>
-        <p:cTn id="1" dur="indefinite" restart="never" nodeType="tmRoot"/>
-      </p:par>
-    </p:tnLst>
-  </p:timing>
 </p:sld>
 </file>
 
-<file path=ppt/slides/slide12.xml><?xml version="1.0" encoding="utf-8"?>
+<file path=ppt/slides/slide15.xml><?xml version="1.0" encoding="utf-8"?>
 <p:sld xmlns:a="http://schemas.openxmlformats.org/drawingml/2006/main" xmlns:r="http://schemas.openxmlformats.org/officeDocument/2006/relationships" xmlns:p="http://schemas.openxmlformats.org/presentationml/2006/main">
   <p:cSld>
     <p:spTree>
@@ -31385,22 +33252,10 @@
           <a:p>
             <a:r>
               <a:rPr lang="de-DE" dirty="0"/>
-              <a:t>N</a:t>
-            </a:r>
-            <a:r>
-              <a:rPr lang="de-DE" dirty="0" smtClean="0"/>
-              <a:t>och </a:t>
-            </a:r>
-            <a:r>
-              <a:rPr lang="de-DE" dirty="0"/>
-              <a:t>nicht überzeugt</a:t>
-            </a:r>
-            <a:r>
-              <a:rPr lang="de-DE" dirty="0" smtClean="0"/>
-              <a:t>?</a:t>
+              <a:t>Noch nicht überzeugt?</a:t>
             </a:r>
             <a:br>
-              <a:rPr lang="de-DE" dirty="0" smtClean="0"/>
+              <a:rPr lang="de-DE" dirty="0"/>
             </a:br>
             <a:endParaRPr lang="de-DE" dirty="0"/>
           </a:p>
@@ -31416,191 +33271,10 @@
   <p:clrMapOvr>
     <a:masterClrMapping/>
   </p:clrMapOvr>
-  <p:timing>
-    <p:tnLst>
-      <p:par>
-        <p:cTn id="1" dur="indefinite" restart="never" nodeType="tmRoot"/>
-      </p:par>
-    </p:tnLst>
-  </p:timing>
 </p:sld>
 </file>
 
-<file path=ppt/slides/slide13.xml><?xml version="1.0" encoding="utf-8"?>
-<p:sld xmlns:a="http://schemas.openxmlformats.org/drawingml/2006/main" xmlns:r="http://schemas.openxmlformats.org/officeDocument/2006/relationships" xmlns:p="http://schemas.openxmlformats.org/presentationml/2006/main">
-  <p:cSld>
-    <p:spTree>
-      <p:nvGrpSpPr>
-        <p:cNvPr id="1" name=""/>
-        <p:cNvGrpSpPr/>
-        <p:nvPr/>
-      </p:nvGrpSpPr>
-      <p:grpSpPr>
-        <a:xfrm>
-          <a:off x="0" y="0"/>
-          <a:ext cx="0" cy="0"/>
-          <a:chOff x="0" y="0"/>
-          <a:chExt cx="0" cy="0"/>
-        </a:xfrm>
-      </p:grpSpPr>
-      <p:pic>
-        <p:nvPicPr>
-          <p:cNvPr id="2050" name="Picture 2" descr="http://contromed.com/wp-content/uploads/2015/11/Service-3.jpg"/>
-          <p:cNvPicPr>
-            <a:picLocks noChangeAspect="1" noChangeArrowheads="1"/>
-          </p:cNvPicPr>
-          <p:nvPr/>
-        </p:nvPicPr>
-        <p:blipFill>
-          <a:blip r:embed="rId2">
-            <a:extLst>
-              <a:ext uri="{28A0092B-C50C-407E-A947-70E740481C1C}">
-                <a14:useLocalDpi xmlns:a14="http://schemas.microsoft.com/office/drawing/2010/main" val="0"/>
-              </a:ext>
-            </a:extLst>
-          </a:blip>
-          <a:srcRect/>
-          <a:stretch>
-            <a:fillRect/>
-          </a:stretch>
-        </p:blipFill>
-        <p:spPr bwMode="auto">
-          <a:xfrm>
-            <a:off x="0" y="0"/>
-            <a:ext cx="12181774" cy="6858000"/>
-          </a:xfrm>
-          <a:prstGeom prst="rect">
-            <a:avLst/>
-          </a:prstGeom>
-          <a:noFill/>
-          <a:extLst>
-            <a:ext uri="{909E8E84-426E-40DD-AFC4-6F175D3DCCD1}">
-              <a14:hiddenFill xmlns:a14="http://schemas.microsoft.com/office/drawing/2010/main">
-                <a:solidFill>
-                  <a:srgbClr val="FFFFFF"/>
-                </a:solidFill>
-              </a14:hiddenFill>
-            </a:ext>
-          </a:extLst>
-        </p:spPr>
-      </p:pic>
-      <p:sp>
-        <p:nvSpPr>
-          <p:cNvPr id="5" name="Rechteck 4"/>
-          <p:cNvSpPr/>
-          <p:nvPr/>
-        </p:nvSpPr>
-        <p:spPr>
-          <a:xfrm>
-            <a:off x="800099" y="-4764"/>
-            <a:ext cx="3333749" cy="2395037"/>
-          </a:xfrm>
-          <a:prstGeom prst="rect">
-            <a:avLst/>
-          </a:prstGeom>
-        </p:spPr>
-        <p:style>
-          <a:lnRef idx="2">
-            <a:schemeClr val="dk1">
-              <a:shade val="50000"/>
-            </a:schemeClr>
-          </a:lnRef>
-          <a:fillRef idx="1">
-            <a:schemeClr val="dk1"/>
-          </a:fillRef>
-          <a:effectRef idx="0">
-            <a:schemeClr val="dk1"/>
-          </a:effectRef>
-          <a:fontRef idx="minor">
-            <a:schemeClr val="lt1"/>
-          </a:fontRef>
-        </p:style>
-        <p:txBody>
-          <a:bodyPr rtlCol="0" anchor="ctr"/>
-          <a:lstStyle/>
-          <a:p>
-            <a:pPr algn="ctr"/>
-            <a:endParaRPr lang="en-US" sz="3600" dirty="0">
-              <a:solidFill>
-                <a:schemeClr val="bg1"/>
-              </a:solidFill>
-            </a:endParaRPr>
-          </a:p>
-          <a:p>
-            <a:pPr algn="ctr"/>
-            <a:r>
-              <a:rPr lang="en-US" sz="3600" dirty="0">
-                <a:solidFill>
-                  <a:schemeClr val="bg1"/>
-                </a:solidFill>
-              </a:rPr>
-              <a:t>Service</a:t>
-            </a:r>
-            <a:endParaRPr lang="de-DE" dirty="0"/>
-          </a:p>
-        </p:txBody>
-      </p:sp>
-      <p:sp>
-        <p:nvSpPr>
-          <p:cNvPr id="6" name="Gleichschenkliges Dreieck 5"/>
-          <p:cNvSpPr/>
-          <p:nvPr/>
-        </p:nvSpPr>
-        <p:spPr>
-          <a:xfrm rot="10800000">
-            <a:off x="800097" y="2390272"/>
-            <a:ext cx="3333750" cy="673770"/>
-          </a:xfrm>
-          <a:prstGeom prst="triangle">
-            <a:avLst/>
-          </a:prstGeom>
-        </p:spPr>
-        <p:style>
-          <a:lnRef idx="2">
-            <a:schemeClr val="dk1">
-              <a:shade val="50000"/>
-            </a:schemeClr>
-          </a:lnRef>
-          <a:fillRef idx="1">
-            <a:schemeClr val="dk1"/>
-          </a:fillRef>
-          <a:effectRef idx="0">
-            <a:schemeClr val="dk1"/>
-          </a:effectRef>
-          <a:fontRef idx="minor">
-            <a:schemeClr val="lt1"/>
-          </a:fontRef>
-        </p:style>
-        <p:txBody>
-          <a:bodyPr rtlCol="0" anchor="ctr"/>
-          <a:lstStyle/>
-          <a:p>
-            <a:pPr algn="ctr"/>
-            <a:endParaRPr lang="de-DE"/>
-          </a:p>
-        </p:txBody>
-      </p:sp>
-    </p:spTree>
-    <p:extLst>
-      <p:ext uri="{BB962C8B-B14F-4D97-AF65-F5344CB8AC3E}">
-        <p14:creationId xmlns:p14="http://schemas.microsoft.com/office/powerpoint/2010/main" val="2628804621"/>
-      </p:ext>
-    </p:extLst>
-  </p:cSld>
-  <p:clrMapOvr>
-    <a:masterClrMapping/>
-  </p:clrMapOvr>
-  <p:timing>
-    <p:tnLst>
-      <p:par>
-        <p:cTn id="1" dur="indefinite" restart="never" nodeType="tmRoot"/>
-      </p:par>
-    </p:tnLst>
-  </p:timing>
-</p:sld>
-</file>
-
-<file path=ppt/slides/slide14.xml><?xml version="1.0" encoding="utf-8"?>
+<file path=ppt/slides/slide16.xml><?xml version="1.0" encoding="utf-8"?>
 <p:sld xmlns:a="http://schemas.openxmlformats.org/drawingml/2006/main" xmlns:r="http://schemas.openxmlformats.org/officeDocument/2006/relationships" xmlns:p="http://schemas.openxmlformats.org/presentationml/2006/main">
   <p:cSld>
     <p:spTree>
@@ -31679,17 +33353,10 @@
   <p:clrMapOvr>
     <a:masterClrMapping/>
   </p:clrMapOvr>
-  <p:timing>
-    <p:tnLst>
-      <p:par>
-        <p:cTn id="1" dur="indefinite" restart="never" nodeType="tmRoot"/>
-      </p:par>
-    </p:tnLst>
-  </p:timing>
 </p:sld>
 </file>
 
-<file path=ppt/slides/slide15.xml><?xml version="1.0" encoding="utf-8"?>
+<file path=ppt/slides/slide17.xml><?xml version="1.0" encoding="utf-8"?>
 <p:sld xmlns:a="http://schemas.openxmlformats.org/drawingml/2006/main" xmlns:r="http://schemas.openxmlformats.org/officeDocument/2006/relationships" xmlns:p="http://schemas.openxmlformats.org/presentationml/2006/main">
   <p:cSld>
     <p:spTree>
@@ -31767,17 +33434,10 @@
   <p:clrMapOvr>
     <a:masterClrMapping/>
   </p:clrMapOvr>
-  <p:timing>
-    <p:tnLst>
-      <p:par>
-        <p:cTn id="1" dur="indefinite" restart="never" nodeType="tmRoot"/>
-      </p:par>
-    </p:tnLst>
-  </p:timing>
 </p:sld>
 </file>
 
-<file path=ppt/slides/slide16.xml><?xml version="1.0" encoding="utf-8"?>
+<file path=ppt/slides/slide18.xml><?xml version="1.0" encoding="utf-8"?>
 <p:sld xmlns:a="http://schemas.openxmlformats.org/drawingml/2006/main" xmlns:r="http://schemas.openxmlformats.org/officeDocument/2006/relationships" xmlns:p="http://schemas.openxmlformats.org/presentationml/2006/main">
   <p:cSld>
     <p:spTree>
@@ -31810,11 +33470,11 @@
           <a:lstStyle/>
           <a:p>
             <a:r>
-              <a:rPr lang="de-DE" dirty="0" smtClean="0"/>
+              <a:rPr lang="de-DE" dirty="0"/>
               <a:t>Brechen Sie mit uns in die </a:t>
             </a:r>
             <a:r>
-              <a:rPr lang="de-DE" dirty="0" smtClean="0">
+              <a:rPr lang="de-DE" dirty="0">
                 <a:solidFill>
                   <a:srgbClr val="009CA2"/>
                 </a:solidFill>
@@ -31822,10 +33482,9 @@
               <a:t>Zukunft</a:t>
             </a:r>
             <a:r>
-              <a:rPr lang="de-DE" dirty="0" smtClean="0"/>
+              <a:rPr lang="de-DE" dirty="0"/>
               <a:t> auf!</a:t>
             </a:r>
-            <a:endParaRPr lang="de-DE" dirty="0"/>
           </a:p>
         </p:txBody>
       </p:sp>
@@ -31861,13 +33520,6 @@
   <p:clrMapOvr>
     <a:masterClrMapping/>
   </p:clrMapOvr>
-  <p:timing>
-    <p:tnLst>
-      <p:par>
-        <p:cTn id="1" dur="indefinite" restart="never" nodeType="tmRoot"/>
-      </p:par>
-    </p:tnLst>
-  </p:timing>
 </p:sld>
 </file>
 
@@ -31904,11 +33556,11 @@
           <a:lstStyle/>
           <a:p>
             <a:r>
-              <a:rPr lang="de-DE" dirty="0" smtClean="0"/>
+              <a:rPr lang="de-DE" dirty="0"/>
               <a:t>Willkommen in einem neuen </a:t>
             </a:r>
             <a:r>
-              <a:rPr lang="de-DE" dirty="0" smtClean="0">
+              <a:rPr lang="de-DE" dirty="0">
                 <a:solidFill>
                   <a:srgbClr val="009CA2"/>
                 </a:solidFill>
@@ -31916,10 +33568,9 @@
               <a:t>Zeitalter</a:t>
             </a:r>
             <a:r>
-              <a:rPr lang="de-DE" dirty="0" smtClean="0"/>
+              <a:rPr lang="de-DE" dirty="0"/>
               <a:t> der Projektantragserfassung.</a:t>
             </a:r>
-            <a:endParaRPr lang="de-DE" dirty="0"/>
           </a:p>
         </p:txBody>
       </p:sp>
@@ -31933,13 +33584,6 @@
   <p:clrMapOvr>
     <a:masterClrMapping/>
   </p:clrMapOvr>
-  <p:timing>
-    <p:tnLst>
-      <p:par>
-        <p:cTn id="1" dur="indefinite" restart="never" nodeType="tmRoot"/>
-      </p:par>
-    </p:tnLst>
-  </p:timing>
 </p:sld>
 </file>
 
@@ -31969,7 +33613,7 @@
           <p:nvPr/>
         </p:nvPicPr>
         <p:blipFill>
-          <a:blip r:embed="rId2">
+          <a:blip r:embed="rId3">
             <a:extLst>
               <a:ext uri="{28A0092B-C50C-407E-A947-70E740481C1C}">
                 <a14:useLocalDpi xmlns:a14="http://schemas.microsoft.com/office/drawing/2010/main" val="0"/>
@@ -32024,10 +33668,9 @@
           <a:lstStyle/>
           <a:p>
             <a:r>
-              <a:rPr lang="de-DE" sz="5400" b="1" dirty="0" smtClean="0"/>
+              <a:rPr lang="de-DE" sz="5400" b="1" dirty="0"/>
               <a:t>Orientierungslos</a:t>
             </a:r>
-            <a:endParaRPr lang="de-DE" sz="5400" b="1" dirty="0"/>
           </a:p>
         </p:txBody>
       </p:sp>
@@ -32040,7 +33683,7 @@
           <p:nvPr/>
         </p:nvPicPr>
         <p:blipFill>
-          <a:blip r:embed="rId3" cstate="print">
+          <a:blip r:embed="rId4" cstate="print">
             <a:extLst>
               <a:ext uri="{28A0092B-C50C-407E-A947-70E740481C1C}">
                 <a14:useLocalDpi xmlns:a14="http://schemas.microsoft.com/office/drawing/2010/main" val="0"/>
@@ -32070,7 +33713,7 @@
           <p:nvPr/>
         </p:nvPicPr>
         <p:blipFill>
-          <a:blip r:embed="rId3" cstate="print">
+          <a:blip r:embed="rId4" cstate="print">
             <a:extLst>
               <a:ext uri="{28A0092B-C50C-407E-A947-70E740481C1C}">
                 <a14:useLocalDpi xmlns:a14="http://schemas.microsoft.com/office/drawing/2010/main" val="0"/>
@@ -32100,7 +33743,7 @@
           <p:nvPr/>
         </p:nvPicPr>
         <p:blipFill>
-          <a:blip r:embed="rId4" cstate="print">
+          <a:blip r:embed="rId5" cstate="print">
             <a:extLst>
               <a:ext uri="{28A0092B-C50C-407E-A947-70E740481C1C}">
                 <a14:useLocalDpi xmlns:a14="http://schemas.microsoft.com/office/drawing/2010/main" val="0"/>
@@ -32144,10 +33787,9 @@
           <a:lstStyle/>
           <a:p>
             <a:r>
-              <a:rPr lang="de-DE" sz="2000" dirty="0" smtClean="0"/>
+              <a:rPr lang="de-DE" sz="2000" dirty="0"/>
               <a:t>Auswertungen</a:t>
             </a:r>
-            <a:endParaRPr lang="de-DE" sz="2000" dirty="0"/>
           </a:p>
         </p:txBody>
       </p:sp>
@@ -32174,10 +33816,9 @@
           <a:lstStyle/>
           <a:p>
             <a:r>
-              <a:rPr lang="de-DE" sz="2000" dirty="0" smtClean="0"/>
+              <a:rPr lang="de-DE" sz="2000" dirty="0"/>
               <a:t>Übersicht</a:t>
             </a:r>
-            <a:endParaRPr lang="de-DE" sz="2000" dirty="0"/>
           </a:p>
         </p:txBody>
       </p:sp>
@@ -32204,10 +33845,9 @@
           <a:lstStyle/>
           <a:p>
             <a:r>
-              <a:rPr lang="de-DE" sz="2000" dirty="0" smtClean="0"/>
+              <a:rPr lang="de-DE" sz="2000" dirty="0"/>
               <a:t>Ganzheitliche Erfassung</a:t>
             </a:r>
-            <a:endParaRPr lang="de-DE" sz="2000" dirty="0"/>
           </a:p>
         </p:txBody>
       </p:sp>
@@ -32255,6 +33895,222 @@
                                           </p:stCondLst>
                                         </p:cTn>
                                         <p:tgtEl>
+                                          <p:spTgt spid="13"/>
+                                        </p:tgtEl>
+                                        <p:attrNameLst>
+                                          <p:attrName>style.visibility</p:attrName>
+                                        </p:attrNameLst>
+                                      </p:cBhvr>
+                                      <p:to>
+                                        <p:strVal val="visible"/>
+                                      </p:to>
+                                    </p:set>
+                                  </p:childTnLst>
+                                </p:cTn>
+                              </p:par>
+                              <p:par>
+                                <p:cTn id="7" presetID="1" presetClass="entr" presetSubtype="0" fill="hold" nodeType="withEffect">
+                                  <p:stCondLst>
+                                    <p:cond delay="0"/>
+                                  </p:stCondLst>
+                                  <p:childTnLst>
+                                    <p:set>
+                                      <p:cBhvr>
+                                        <p:cTn id="8" dur="1" fill="hold">
+                                          <p:stCondLst>
+                                            <p:cond delay="0"/>
+                                          </p:stCondLst>
+                                        </p:cTn>
+                                        <p:tgtEl>
+                                          <p:spTgt spid="10"/>
+                                        </p:tgtEl>
+                                        <p:attrNameLst>
+                                          <p:attrName>style.visibility</p:attrName>
+                                        </p:attrNameLst>
+                                      </p:cBhvr>
+                                      <p:to>
+                                        <p:strVal val="visible"/>
+                                      </p:to>
+                                    </p:set>
+                                  </p:childTnLst>
+                                </p:cTn>
+                              </p:par>
+                            </p:childTnLst>
+                          </p:cTn>
+                        </p:par>
+                      </p:childTnLst>
+                    </p:cTn>
+                  </p:par>
+                  <p:par>
+                    <p:cTn id="9" fill="hold">
+                      <p:stCondLst>
+                        <p:cond delay="indefinite"/>
+                      </p:stCondLst>
+                      <p:childTnLst>
+                        <p:par>
+                          <p:cTn id="10" fill="hold">
+                            <p:stCondLst>
+                              <p:cond delay="0"/>
+                            </p:stCondLst>
+                            <p:childTnLst>
+                              <p:par>
+                                <p:cTn id="11" presetID="1" presetClass="entr" presetSubtype="0" fill="hold" grpId="0" nodeType="clickEffect">
+                                  <p:stCondLst>
+                                    <p:cond delay="0"/>
+                                  </p:stCondLst>
+                                  <p:childTnLst>
+                                    <p:set>
+                                      <p:cBhvr>
+                                        <p:cTn id="12" dur="1" fill="hold">
+                                          <p:stCondLst>
+                                            <p:cond delay="0"/>
+                                          </p:stCondLst>
+                                        </p:cTn>
+                                        <p:tgtEl>
+                                          <p:spTgt spid="12"/>
+                                        </p:tgtEl>
+                                        <p:attrNameLst>
+                                          <p:attrName>style.visibility</p:attrName>
+                                        </p:attrNameLst>
+                                      </p:cBhvr>
+                                      <p:to>
+                                        <p:strVal val="visible"/>
+                                      </p:to>
+                                    </p:set>
+                                  </p:childTnLst>
+                                </p:cTn>
+                              </p:par>
+                              <p:par>
+                                <p:cTn id="13" presetID="1" presetClass="entr" presetSubtype="0" fill="hold" nodeType="withEffect">
+                                  <p:stCondLst>
+                                    <p:cond delay="0"/>
+                                  </p:stCondLst>
+                                  <p:childTnLst>
+                                    <p:set>
+                                      <p:cBhvr>
+                                        <p:cTn id="14" dur="1" fill="hold">
+                                          <p:stCondLst>
+                                            <p:cond delay="0"/>
+                                          </p:stCondLst>
+                                        </p:cTn>
+                                        <p:tgtEl>
+                                          <p:spTgt spid="9"/>
+                                        </p:tgtEl>
+                                        <p:attrNameLst>
+                                          <p:attrName>style.visibility</p:attrName>
+                                        </p:attrNameLst>
+                                      </p:cBhvr>
+                                      <p:to>
+                                        <p:strVal val="visible"/>
+                                      </p:to>
+                                    </p:set>
+                                  </p:childTnLst>
+                                </p:cTn>
+                              </p:par>
+                            </p:childTnLst>
+                          </p:cTn>
+                        </p:par>
+                      </p:childTnLst>
+                    </p:cTn>
+                  </p:par>
+                  <p:par>
+                    <p:cTn id="15" fill="hold">
+                      <p:stCondLst>
+                        <p:cond delay="indefinite"/>
+                      </p:stCondLst>
+                      <p:childTnLst>
+                        <p:par>
+                          <p:cTn id="16" fill="hold">
+                            <p:stCondLst>
+                              <p:cond delay="0"/>
+                            </p:stCondLst>
+                            <p:childTnLst>
+                              <p:par>
+                                <p:cTn id="17" presetID="1" presetClass="entr" presetSubtype="0" fill="hold" nodeType="clickEffect">
+                                  <p:stCondLst>
+                                    <p:cond delay="0"/>
+                                  </p:stCondLst>
+                                  <p:childTnLst>
+                                    <p:set>
+                                      <p:cBhvr>
+                                        <p:cTn id="18" dur="1" fill="hold">
+                                          <p:stCondLst>
+                                            <p:cond delay="0"/>
+                                          </p:stCondLst>
+                                        </p:cTn>
+                                        <p:tgtEl>
+                                          <p:spTgt spid="3"/>
+                                        </p:tgtEl>
+                                        <p:attrNameLst>
+                                          <p:attrName>style.visibility</p:attrName>
+                                        </p:attrNameLst>
+                                      </p:cBhvr>
+                                      <p:to>
+                                        <p:strVal val="visible"/>
+                                      </p:to>
+                                    </p:set>
+                                  </p:childTnLst>
+                                </p:cTn>
+                              </p:par>
+                              <p:par>
+                                <p:cTn id="19" presetID="1" presetClass="entr" presetSubtype="0" fill="hold" grpId="0" nodeType="withEffect">
+                                  <p:stCondLst>
+                                    <p:cond delay="0"/>
+                                  </p:stCondLst>
+                                  <p:childTnLst>
+                                    <p:set>
+                                      <p:cBhvr>
+                                        <p:cTn id="20" dur="1" fill="hold">
+                                          <p:stCondLst>
+                                            <p:cond delay="0"/>
+                                          </p:stCondLst>
+                                        </p:cTn>
+                                        <p:tgtEl>
+                                          <p:spTgt spid="8"/>
+                                        </p:tgtEl>
+                                        <p:attrNameLst>
+                                          <p:attrName>style.visibility</p:attrName>
+                                        </p:attrNameLst>
+                                      </p:cBhvr>
+                                      <p:to>
+                                        <p:strVal val="visible"/>
+                                      </p:to>
+                                    </p:set>
+                                  </p:childTnLst>
+                                </p:cTn>
+                              </p:par>
+                            </p:childTnLst>
+                          </p:cTn>
+                        </p:par>
+                      </p:childTnLst>
+                    </p:cTn>
+                  </p:par>
+                  <p:par>
+                    <p:cTn id="21" fill="hold">
+                      <p:stCondLst>
+                        <p:cond delay="indefinite"/>
+                      </p:stCondLst>
+                      <p:childTnLst>
+                        <p:par>
+                          <p:cTn id="22" fill="hold">
+                            <p:stCondLst>
+                              <p:cond delay="0"/>
+                            </p:stCondLst>
+                            <p:childTnLst>
+                              <p:par>
+                                <p:cTn id="23" presetID="1" presetClass="entr" presetSubtype="0" fill="hold" grpId="0" nodeType="clickEffect">
+                                  <p:stCondLst>
+                                    <p:cond delay="0"/>
+                                  </p:stCondLst>
+                                  <p:childTnLst>
+                                    <p:set>
+                                      <p:cBhvr>
+                                        <p:cTn id="24" dur="1" fill="hold">
+                                          <p:stCondLst>
+                                            <p:cond delay="0"/>
+                                          </p:stCondLst>
+                                        </p:cTn>
+                                        <p:tgtEl>
                                           <p:spTgt spid="5"/>
                                         </p:tgtEl>
                                         <p:attrNameLst>
@@ -32297,6 +34153,9 @@
     </p:tnLst>
     <p:bldLst>
       <p:bldP spid="5" grpId="0"/>
+      <p:bldP spid="8" grpId="0"/>
+      <p:bldP spid="12" grpId="0"/>
+      <p:bldP spid="13" grpId="0"/>
     </p:bldLst>
   </p:timing>
 </p:sld>
@@ -32335,11 +34194,11 @@
           <a:lstStyle/>
           <a:p>
             <a:r>
-              <a:rPr lang="de-DE" dirty="0" smtClean="0"/>
+              <a:rPr lang="de-DE" dirty="0"/>
               <a:t>Wir helfen Ihnen, sich zu </a:t>
             </a:r>
             <a:r>
-              <a:rPr lang="de-DE" dirty="0" smtClean="0">
+              <a:rPr lang="de-DE" dirty="0">
                 <a:solidFill>
                   <a:srgbClr val="009CA2"/>
                 </a:solidFill>
@@ -32347,10 +34206,9 @@
               <a:t>orientieren</a:t>
             </a:r>
             <a:r>
-              <a:rPr lang="de-DE" dirty="0" smtClean="0"/>
+              <a:rPr lang="de-DE" dirty="0"/>
               <a:t>.</a:t>
             </a:r>
-            <a:endParaRPr lang="de-DE" dirty="0"/>
           </a:p>
         </p:txBody>
       </p:sp>
@@ -32364,13 +34222,6 @@
   <p:clrMapOvr>
     <a:masterClrMapping/>
   </p:clrMapOvr>
-  <p:timing>
-    <p:tnLst>
-      <p:par>
-        <p:cTn id="1" dur="indefinite" restart="never" nodeType="tmRoot"/>
-      </p:par>
-    </p:tnLst>
-  </p:timing>
 </p:sld>
 </file>
 
@@ -32400,7 +34251,7 @@
           <p:nvPr/>
         </p:nvPicPr>
         <p:blipFill>
-          <a:blip r:embed="rId2">
+          <a:blip r:embed="rId3">
             <a:extLst>
               <a:ext uri="{28A0092B-C50C-407E-A947-70E740481C1C}">
                 <a14:useLocalDpi xmlns:a14="http://schemas.microsoft.com/office/drawing/2010/main" val="0"/>
@@ -32492,7 +34343,7 @@
           <p:nvPr/>
         </p:nvPicPr>
         <p:blipFill>
-          <a:blip r:embed="rId3" cstate="print">
+          <a:blip r:embed="rId4" cstate="print">
             <a:extLst>
               <a:ext uri="{28A0092B-C50C-407E-A947-70E740481C1C}">
                 <a14:useLocalDpi xmlns:a14="http://schemas.microsoft.com/office/drawing/2010/main" val="0"/>
@@ -32522,7 +34373,7 @@
           <p:nvPr/>
         </p:nvPicPr>
         <p:blipFill>
-          <a:blip r:embed="rId3" cstate="print">
+          <a:blip r:embed="rId4" cstate="print">
             <a:extLst>
               <a:ext uri="{28A0092B-C50C-407E-A947-70E740481C1C}">
                 <a14:useLocalDpi xmlns:a14="http://schemas.microsoft.com/office/drawing/2010/main" val="0"/>
@@ -32552,7 +34403,7 @@
           <p:nvPr/>
         </p:nvPicPr>
         <p:blipFill>
-          <a:blip r:embed="rId4" cstate="print">
+          <a:blip r:embed="rId5" cstate="print">
             <a:extLst>
               <a:ext uri="{28A0092B-C50C-407E-A947-70E740481C1C}">
                 <a14:useLocalDpi xmlns:a14="http://schemas.microsoft.com/office/drawing/2010/main" val="0"/>
@@ -32596,10 +34447,9 @@
           <a:lstStyle/>
           <a:p>
             <a:r>
-              <a:rPr lang="de-DE" sz="2000" dirty="0" smtClean="0"/>
+              <a:rPr lang="de-DE" sz="2000" dirty="0"/>
               <a:t>Auswertungen</a:t>
             </a:r>
-            <a:endParaRPr lang="de-DE" sz="2000" dirty="0"/>
           </a:p>
         </p:txBody>
       </p:sp>
@@ -32626,10 +34476,9 @@
           <a:lstStyle/>
           <a:p>
             <a:r>
-              <a:rPr lang="de-DE" sz="2000" dirty="0" smtClean="0"/>
+              <a:rPr lang="de-DE" sz="2000" dirty="0"/>
               <a:t>Übersicht</a:t>
             </a:r>
-            <a:endParaRPr lang="de-DE" sz="2000" dirty="0"/>
           </a:p>
         </p:txBody>
       </p:sp>
@@ -32656,10 +34505,9 @@
           <a:lstStyle/>
           <a:p>
             <a:r>
-              <a:rPr lang="de-DE" sz="2000" dirty="0" smtClean="0"/>
+              <a:rPr lang="de-DE" sz="2000" dirty="0"/>
               <a:t>Ganzheitliche Erfassung</a:t>
             </a:r>
-            <a:endParaRPr lang="de-DE" sz="2000" dirty="0"/>
           </a:p>
         </p:txBody>
       </p:sp>
@@ -32673,13 +34521,6 @@
   <p:clrMapOvr>
     <a:masterClrMapping/>
   </p:clrMapOvr>
-  <p:timing>
-    <p:tnLst>
-      <p:par>
-        <p:cTn id="1" dur="indefinite" restart="never" nodeType="tmRoot"/>
-      </p:par>
-    </p:tnLst>
-  </p:timing>
 </p:sld>
 </file>
 
@@ -32709,7 +34550,7 @@
           <p:nvPr/>
         </p:nvPicPr>
         <p:blipFill>
-          <a:blip r:embed="rId2">
+          <a:blip r:embed="rId3">
             <a:extLst>
               <a:ext uri="{28A0092B-C50C-407E-A947-70E740481C1C}">
                 <a14:useLocalDpi xmlns:a14="http://schemas.microsoft.com/office/drawing/2010/main" val="0"/>
@@ -32812,7 +34653,7 @@
         </p:xfrm>
         <a:graphic>
           <a:graphicData uri="http://schemas.openxmlformats.org/drawingml/2006/diagram">
-            <dgm:relIds xmlns:dgm="http://schemas.openxmlformats.org/drawingml/2006/diagram" xmlns:r="http://schemas.openxmlformats.org/officeDocument/2006/relationships" r:dm="rId3" r:lo="rId4" r:qs="rId5" r:cs="rId6"/>
+            <dgm:relIds xmlns:dgm="http://schemas.openxmlformats.org/drawingml/2006/diagram" xmlns:r="http://schemas.openxmlformats.org/officeDocument/2006/relationships" r:dm="rId4" r:lo="rId5" r:qs="rId6" r:cs="rId7"/>
           </a:graphicData>
         </a:graphic>
       </p:graphicFrame>
@@ -32834,7 +34675,7 @@
         </p:xfrm>
         <a:graphic>
           <a:graphicData uri="http://schemas.openxmlformats.org/drawingml/2006/diagram">
-            <dgm:relIds xmlns:dgm="http://schemas.openxmlformats.org/drawingml/2006/diagram" xmlns:r="http://schemas.openxmlformats.org/officeDocument/2006/relationships" r:dm="rId8" r:lo="rId9" r:qs="rId10" r:cs="rId11"/>
+            <dgm:relIds xmlns:dgm="http://schemas.openxmlformats.org/drawingml/2006/diagram" xmlns:r="http://schemas.openxmlformats.org/officeDocument/2006/relationships" r:dm="rId9" r:lo="rId10" r:qs="rId11" r:cs="rId12"/>
           </a:graphicData>
         </a:graphic>
       </p:graphicFrame>
@@ -32856,7 +34697,7 @@
         </p:xfrm>
         <a:graphic>
           <a:graphicData uri="http://schemas.openxmlformats.org/drawingml/2006/diagram">
-            <dgm:relIds xmlns:dgm="http://schemas.openxmlformats.org/drawingml/2006/diagram" xmlns:r="http://schemas.openxmlformats.org/officeDocument/2006/relationships" r:dm="rId13" r:lo="rId14" r:qs="rId15" r:cs="rId16"/>
+            <dgm:relIds xmlns:dgm="http://schemas.openxmlformats.org/drawingml/2006/diagram" xmlns:r="http://schemas.openxmlformats.org/officeDocument/2006/relationships" r:dm="rId14" r:lo="rId15" r:qs="rId16" r:cs="rId17"/>
           </a:graphicData>
         </a:graphic>
       </p:graphicFrame>
@@ -32878,7 +34719,7 @@
         </p:xfrm>
         <a:graphic>
           <a:graphicData uri="http://schemas.openxmlformats.org/drawingml/2006/diagram">
-            <dgm:relIds xmlns:dgm="http://schemas.openxmlformats.org/drawingml/2006/diagram" xmlns:r="http://schemas.openxmlformats.org/officeDocument/2006/relationships" r:dm="rId18" r:lo="rId19" r:qs="rId20" r:cs="rId21"/>
+            <dgm:relIds xmlns:dgm="http://schemas.openxmlformats.org/drawingml/2006/diagram" xmlns:r="http://schemas.openxmlformats.org/officeDocument/2006/relationships" r:dm="rId19" r:lo="rId20" r:qs="rId21" r:cs="rId22"/>
           </a:graphicData>
         </a:graphic>
       </p:graphicFrame>
@@ -32900,7 +34741,7 @@
         </p:xfrm>
         <a:graphic>
           <a:graphicData uri="http://schemas.openxmlformats.org/drawingml/2006/diagram">
-            <dgm:relIds xmlns:dgm="http://schemas.openxmlformats.org/drawingml/2006/diagram" xmlns:r="http://schemas.openxmlformats.org/officeDocument/2006/relationships" r:dm="rId23" r:lo="rId24" r:qs="rId25" r:cs="rId26"/>
+            <dgm:relIds xmlns:dgm="http://schemas.openxmlformats.org/drawingml/2006/diagram" xmlns:r="http://schemas.openxmlformats.org/officeDocument/2006/relationships" r:dm="rId24" r:lo="rId25" r:qs="rId26" r:cs="rId27"/>
           </a:graphicData>
         </a:graphic>
       </p:graphicFrame>
@@ -32922,10 +34763,104 @@
         </p:xfrm>
         <a:graphic>
           <a:graphicData uri="http://schemas.openxmlformats.org/drawingml/2006/diagram">
-            <dgm:relIds xmlns:dgm="http://schemas.openxmlformats.org/drawingml/2006/diagram" xmlns:r="http://schemas.openxmlformats.org/officeDocument/2006/relationships" r:dm="rId28" r:lo="rId29" r:qs="rId30" r:cs="rId31"/>
+            <dgm:relIds xmlns:dgm="http://schemas.openxmlformats.org/drawingml/2006/diagram" xmlns:r="http://schemas.openxmlformats.org/officeDocument/2006/relationships" r:dm="rId29" r:lo="rId30" r:qs="rId31" r:cs="rId32"/>
           </a:graphicData>
         </a:graphic>
       </p:graphicFrame>
+      <p:pic>
+        <p:nvPicPr>
+          <p:cNvPr id="15" name="Picture 4" descr="https://image.freepik.com/freie-ikonen/computer-bildschirm_318-32677.png"/>
+          <p:cNvPicPr>
+            <a:picLocks noChangeAspect="1" noChangeArrowheads="1"/>
+          </p:cNvPicPr>
+          <p:nvPr/>
+        </p:nvPicPr>
+        <p:blipFill>
+          <a:blip r:embed="rId3">
+            <a:extLst>
+              <a:ext uri="{28A0092B-C50C-407E-A947-70E740481C1C}">
+                <a14:useLocalDpi xmlns:a14="http://schemas.microsoft.com/office/drawing/2010/main" val="0"/>
+              </a:ext>
+            </a:extLst>
+          </a:blip>
+          <a:srcRect/>
+          <a:stretch>
+            <a:fillRect/>
+          </a:stretch>
+        </p:blipFill>
+        <p:spPr bwMode="auto">
+          <a:xfrm>
+            <a:off x="1263306" y="1444987"/>
+            <a:ext cx="4716870" cy="4716870"/>
+          </a:xfrm>
+          <a:prstGeom prst="rect">
+            <a:avLst/>
+          </a:prstGeom>
+          <a:noFill/>
+          <a:extLst>
+            <a:ext uri="{909E8E84-426E-40DD-AFC4-6F175D3DCCD1}">
+              <a14:hiddenFill xmlns:a14="http://schemas.microsoft.com/office/drawing/2010/main">
+                <a:solidFill>
+                  <a:srgbClr val="FFFFFF"/>
+                </a:solidFill>
+              </a14:hiddenFill>
+            </a:ext>
+          </a:extLst>
+        </p:spPr>
+      </p:pic>
+      <p:sp>
+        <p:nvSpPr>
+          <p:cNvPr id="16" name="Rechteck 15"/>
+          <p:cNvSpPr/>
+          <p:nvPr/>
+        </p:nvSpPr>
+        <p:spPr>
+          <a:xfrm>
+            <a:off x="581426" y="679268"/>
+            <a:ext cx="6080631" cy="5748425"/>
+          </a:xfrm>
+          <a:prstGeom prst="rect">
+            <a:avLst/>
+          </a:prstGeom>
+          <a:noFill/>
+          <a:ln w="38100">
+            <a:solidFill>
+              <a:schemeClr val="bg1"/>
+            </a:solidFill>
+          </a:ln>
+        </p:spPr>
+        <p:style>
+          <a:lnRef idx="2">
+            <a:schemeClr val="accent1">
+              <a:shade val="50000"/>
+            </a:schemeClr>
+          </a:lnRef>
+          <a:fillRef idx="1">
+            <a:schemeClr val="accent1"/>
+          </a:fillRef>
+          <a:effectRef idx="0">
+            <a:schemeClr val="accent1"/>
+          </a:effectRef>
+          <a:fontRef idx="minor">
+            <a:schemeClr val="lt1"/>
+          </a:fontRef>
+        </p:style>
+        <p:txBody>
+          <a:bodyPr rtlCol="0" anchor="ctr"/>
+          <a:lstStyle/>
+          <a:p>
+            <a:pPr algn="ctr"/>
+            <a:r>
+              <a:rPr lang="de-DE" sz="8000" dirty="0">
+                <a:solidFill>
+                  <a:srgbClr val="009CA2"/>
+                </a:solidFill>
+              </a:rPr>
+              <a:t>PAMS</a:t>
+            </a:r>
+          </a:p>
+        </p:txBody>
+      </p:sp>
     </p:spTree>
     <p:extLst>
       <p:ext uri="{BB962C8B-B14F-4D97-AF65-F5344CB8AC3E}">
@@ -32936,13 +34871,6 @@
   <p:clrMapOvr>
     <a:masterClrMapping/>
   </p:clrMapOvr>
-  <p:timing>
-    <p:tnLst>
-      <p:par>
-        <p:cTn id="1" dur="indefinite" restart="never" nodeType="tmRoot"/>
-      </p:par>
-    </p:tnLst>
-  </p:timing>
 </p:sld>
 </file>
 
@@ -33039,21 +34967,6 @@
   <p:clrMapOvr>
     <a:masterClrMapping/>
   </p:clrMapOvr>
-  <mc:AlternateContent xmlns:mc="http://schemas.openxmlformats.org/markup-compatibility/2006" xmlns:p14="http://schemas.microsoft.com/office/powerpoint/2010/main">
-    <mc:Choice Requires="p14">
-      <p:transition spd="slow" p14:dur="2000"/>
-    </mc:Choice>
-    <mc:Fallback xmlns="">
-      <p:transition spd="slow"/>
-    </mc:Fallback>
-  </mc:AlternateContent>
-  <p:timing>
-    <p:tnLst>
-      <p:par>
-        <p:cTn id="1" dur="indefinite" restart="never" nodeType="tmRoot"/>
-      </p:par>
-    </p:tnLst>
-  </p:timing>
 </p:sld>
 </file>
 
@@ -33083,7 +34996,7 @@
           <p:nvPr/>
         </p:nvPicPr>
         <p:blipFill>
-          <a:blip r:embed="rId2">
+          <a:blip r:embed="rId3">
             <a:extLst>
               <a:ext uri="{28A0092B-C50C-407E-A947-70E740481C1C}">
                 <a14:useLocalDpi xmlns:a14="http://schemas.microsoft.com/office/drawing/2010/main" val="0"/>
@@ -33159,17 +35072,8 @@
             <a:pPr algn="ctr"/>
             <a:r>
               <a:rPr lang="de-DE" sz="2800" dirty="0"/>
-              <a:t>Welchen Mehrwert </a:t>
+              <a:t>Welchen Mehrwert bieten wir Ihnen?</a:t>
             </a:r>
-            <a:r>
-              <a:rPr lang="de-DE" sz="2800" dirty="0" smtClean="0"/>
-              <a:t>bieten</a:t>
-            </a:r>
-            <a:r>
-              <a:rPr lang="de-DE" sz="2800" dirty="0" smtClean="0"/>
-              <a:t> wir Ihnen?</a:t>
-            </a:r>
-            <a:endParaRPr lang="de-DE" sz="2800" dirty="0"/>
           </a:p>
         </p:txBody>
       </p:sp>
@@ -33183,13 +35087,6 @@
   <p:clrMapOvr>
     <a:masterClrMapping/>
   </p:clrMapOvr>
-  <p:timing>
-    <p:tnLst>
-      <p:par>
-        <p:cTn id="1" dur="indefinite" restart="never" nodeType="tmRoot"/>
-      </p:par>
-    </p:tnLst>
-  </p:timing>
 </p:sld>
 </file>
 
@@ -33226,18 +35123,13 @@
           <a:lstStyle/>
           <a:p>
             <a:r>
-              <a:rPr lang="de-DE" dirty="0" smtClean="0">
+              <a:rPr lang="de-DE" dirty="0">
                 <a:solidFill>
                   <a:srgbClr val="009CA2"/>
                 </a:solidFill>
               </a:rPr>
-              <a:t>Unsere Leistung für Sie</a:t>
+              <a:t>Mehrwerte</a:t>
             </a:r>
-            <a:endParaRPr lang="de-DE" dirty="0">
-              <a:solidFill>
-                <a:srgbClr val="009CA2"/>
-              </a:solidFill>
-            </a:endParaRPr>
           </a:p>
         </p:txBody>
       </p:sp>
@@ -33251,7 +35143,7 @@
             <p:ph idx="1"/>
             <p:extLst>
               <p:ext uri="{D42A27DB-BD31-4B8C-83A1-F6EECF244321}">
-                <p14:modId xmlns:p14="http://schemas.microsoft.com/office/powerpoint/2010/main" val="2366530519"/>
+                <p14:modId xmlns:p14="http://schemas.microsoft.com/office/powerpoint/2010/main" val="770848671"/>
               </p:ext>
             </p:extLst>
           </p:nvPr>
@@ -33262,7 +35154,7 @@
         </p:xfrm>
         <a:graphic>
           <a:graphicData uri="http://schemas.openxmlformats.org/drawingml/2006/diagram">
-            <dgm:relIds xmlns:dgm="http://schemas.openxmlformats.org/drawingml/2006/diagram" xmlns:r="http://schemas.openxmlformats.org/officeDocument/2006/relationships" r:dm="rId2" r:lo="rId3" r:qs="rId4" r:cs="rId5"/>
+            <dgm:relIds xmlns:dgm="http://schemas.openxmlformats.org/drawingml/2006/diagram" xmlns:r="http://schemas.openxmlformats.org/officeDocument/2006/relationships" r:dm="rId3" r:lo="rId4" r:qs="rId5" r:cs="rId6"/>
           </a:graphicData>
         </a:graphic>
       </p:graphicFrame>
@@ -33276,13 +35168,6 @@
   <p:clrMapOvr>
     <a:masterClrMapping/>
   </p:clrMapOvr>
-  <p:timing>
-    <p:tnLst>
-      <p:par>
-        <p:cTn id="1" dur="indefinite" restart="never" nodeType="tmRoot"/>
-      </p:par>
-    </p:tnLst>
-  </p:timing>
 </p:sld>
 </file>
 

</xml_diff>